<commit_message>
Updates per team meeting
</commit_message>
<xml_diff>
--- a/Project Proposal/Team_6_Prop_Vid_Slides.pptx
+++ b/Project Proposal/Team_6_Prop_Vid_Slides.pptx
@@ -8,11 +8,15 @@
     <p:sldId id="256" r:id="rId2"/>
     <p:sldId id="258" r:id="rId3"/>
     <p:sldId id="259" r:id="rId4"/>
-    <p:sldId id="261" r:id="rId5"/>
-    <p:sldId id="263" r:id="rId6"/>
-    <p:sldId id="262" r:id="rId7"/>
-    <p:sldId id="260" r:id="rId8"/>
-    <p:sldId id="257" r:id="rId9"/>
+    <p:sldId id="265" r:id="rId5"/>
+    <p:sldId id="264" r:id="rId6"/>
+    <p:sldId id="261" r:id="rId7"/>
+    <p:sldId id="266" r:id="rId8"/>
+    <p:sldId id="267" r:id="rId9"/>
+    <p:sldId id="263" r:id="rId10"/>
+    <p:sldId id="262" r:id="rId11"/>
+    <p:sldId id="260" r:id="rId12"/>
+    <p:sldId id="257" r:id="rId13"/>
   </p:sldIdLst>
   <p:sldSz cx="12192000" cy="6858000"/>
   <p:notesSz cx="6858000" cy="9144000"/>
@@ -119,12 +123,127 @@
 </p:presentation>
 </file>
 
+<file path=ppt/authors.xml><?xml version="1.0" encoding="utf-8"?>
+<p188:authorLst xmlns:a="http://schemas.openxmlformats.org/drawingml/2006/main" xmlns:r="http://schemas.openxmlformats.org/officeDocument/2006/relationships" xmlns:p188="http://schemas.microsoft.com/office/powerpoint/2018/8/main">
+  <p188:author id="{133CA2F9-9923-0511-69E9-E80E997BA532}" name="Alejandro Martinez" initials="AM" userId="c8a9d50c0e1f062a" providerId="Windows Live"/>
+</p188:authorLst>
+</file>
+
 <file path=ppt/revisionInfo.xml><?xml version="1.0" encoding="utf-8"?>
 <p1510:revInfo xmlns:a="http://schemas.openxmlformats.org/drawingml/2006/main" xmlns:r="http://schemas.openxmlformats.org/officeDocument/2006/relationships" xmlns:p1510="http://schemas.microsoft.com/office/powerpoint/2015/10/main">
   <p1510:revLst>
     <p1510:client id="{9757891F-3C8C-4916-A6EE-E31F03D6D428}" v="11" dt="2023-06-25T18:19:27.447"/>
   </p1510:revLst>
 </p1510:revInfo>
+</file>
+
+<file path=ppt/comments/modernComment_103_B1A0DF69.xml><?xml version="1.0" encoding="utf-8"?>
+<p188:cmLst xmlns:a="http://schemas.openxmlformats.org/drawingml/2006/main" xmlns:r="http://schemas.openxmlformats.org/officeDocument/2006/relationships" xmlns:p188="http://schemas.microsoft.com/office/powerpoint/2018/8/main">
+  <p188:cm id="{F23589DE-20B1-4DCE-922D-239D87486492}" authorId="{133CA2F9-9923-0511-69E9-E80E997BA532}" created="2023-06-27T00:13:59.550">
+    <pc:sldMkLst xmlns:pc="http://schemas.microsoft.com/office/powerpoint/2013/main/command">
+      <pc:docMk/>
+      <pc:sldMk cId="2980110185" sldId="259"/>
+    </pc:sldMkLst>
+    <p188:txBody>
+      <a:bodyPr/>
+      <a:lstStyle/>
+      <a:p>
+        <a:r>
+          <a:rPr lang="en-US"/>
+          <a:t>Mention that satisfaction is the target value.</a:t>
+        </a:r>
+      </a:p>
+    </p188:txBody>
+  </p188:cm>
+</p188:cmLst>
+</file>
+
+<file path=ppt/comments/modernComment_105_999C5ECB.xml><?xml version="1.0" encoding="utf-8"?>
+<p188:cmLst xmlns:a="http://schemas.openxmlformats.org/drawingml/2006/main" xmlns:r="http://schemas.openxmlformats.org/officeDocument/2006/relationships" xmlns:p188="http://schemas.microsoft.com/office/powerpoint/2018/8/main">
+  <p188:cm id="{00B38BB2-6690-4CB0-ABAF-1B3ABB27C9B9}" authorId="{133CA2F9-9923-0511-69E9-E80E997BA532}" created="2023-06-27T01:30:04.704">
+    <pc:sldMkLst xmlns:pc="http://schemas.microsoft.com/office/powerpoint/2013/main/command">
+      <pc:docMk/>
+      <pc:sldMk cId="2577161931" sldId="261"/>
+    </pc:sldMkLst>
+    <p188:txBody>
+      <a:bodyPr/>
+      <a:lstStyle/>
+      <a:p>
+        <a:r>
+          <a:rPr lang="en-US"/>
+          <a:t>Data is pretty clean.
+Flight distance according to linear regression
+</a:t>
+        </a:r>
+      </a:p>
+    </p188:txBody>
+  </p188:cm>
+</p188:cmLst>
+</file>
+
+<file path=ppt/comments/modernComment_106_14759D0F.xml><?xml version="1.0" encoding="utf-8"?>
+<p188:cmLst xmlns:a="http://schemas.openxmlformats.org/drawingml/2006/main" xmlns:r="http://schemas.openxmlformats.org/officeDocument/2006/relationships" xmlns:p188="http://schemas.microsoft.com/office/powerpoint/2018/8/main">
+  <p188:cm id="{25C0C763-40F9-4F86-8B11-77D74F7918C5}" authorId="{133CA2F9-9923-0511-69E9-E80E997BA532}" created="2023-06-27T01:33:38.328">
+    <pc:sldMkLst xmlns:pc="http://schemas.microsoft.com/office/powerpoint/2013/main/command">
+      <pc:docMk/>
+      <pc:sldMk cId="343252239" sldId="262"/>
+    </pc:sldMkLst>
+    <p188:txBody>
+      <a:bodyPr/>
+      <a:lstStyle/>
+      <a:p>
+        <a:r>
+          <a:rPr lang="en-US"/>
+          <a:t>Age and Gender P values were 0.618 and 0.231 respecitvely in the ACSI, contradicting the Logistic Regression model on Kaggle data
+American Consumer Satisfaction Index.</a:t>
+        </a:r>
+      </a:p>
+    </p188:txBody>
+  </p188:cm>
+</p188:cmLst>
+</file>
+
+<file path=ppt/comments/modernComment_108_4BD5E816.xml><?xml version="1.0" encoding="utf-8"?>
+<p188:cmLst xmlns:a="http://schemas.openxmlformats.org/drawingml/2006/main" xmlns:r="http://schemas.openxmlformats.org/officeDocument/2006/relationships" xmlns:p188="http://schemas.microsoft.com/office/powerpoint/2018/8/main">
+  <p188:cm id="{38508D64-7DAF-431A-8FCA-03C06A3D6254}" authorId="{133CA2F9-9923-0511-69E9-E80E997BA532}" created="2023-06-27T00:13:09.373">
+    <pc:sldMkLst xmlns:pc="http://schemas.microsoft.com/office/powerpoint/2013/main/command">
+      <pc:docMk/>
+      <pc:sldMk cId="1272309782" sldId="264"/>
+    </pc:sldMkLst>
+    <p188:txBody>
+      <a:bodyPr/>
+      <a:lstStyle/>
+      <a:p>
+        <a:r>
+          <a:rPr lang="en-US"/>
+          <a:t>Getting rid of arrival time because it is highly correlated and has a lot of NA values.
+</a:t>
+        </a:r>
+      </a:p>
+    </p188:txBody>
+  </p188:cm>
+</p188:cmLst>
+</file>
+
+<file path=ppt/comments/modernComment_10A_6CE8E97.xml><?xml version="1.0" encoding="utf-8"?>
+<p188:cmLst xmlns:a="http://schemas.openxmlformats.org/drawingml/2006/main" xmlns:r="http://schemas.openxmlformats.org/officeDocument/2006/relationships" xmlns:p188="http://schemas.microsoft.com/office/powerpoint/2018/8/main">
+  <p188:cm id="{44C3BEFE-83F8-4F1C-81D0-B0358F9273E7}" authorId="{133CA2F9-9923-0511-69E9-E80E997BA532}" created="2023-06-27T01:42:20.020">
+    <pc:sldMkLst xmlns:pc="http://schemas.microsoft.com/office/powerpoint/2013/main/command">
+      <pc:docMk/>
+      <pc:sldMk cId="114200215" sldId="266"/>
+    </pc:sldMkLst>
+    <p188:txBody>
+      <a:bodyPr/>
+      <a:lstStyle/>
+      <a:p>
+        <a:r>
+          <a:rPr lang="en-US"/>
+          <a:t>No transformations done, initial pass.</a:t>
+        </a:r>
+      </a:p>
+    </p188:txBody>
+  </p188:cm>
+</p188:cmLst>
 </file>
 
 <file path=ppt/slideLayouts/slideLayout1.xml><?xml version="1.0" encoding="utf-8"?>
@@ -351,7 +470,7 @@
           <a:p>
             <a:fld id="{1955A8DF-052F-408C-B32C-6128C7E474DA}" type="datetimeFigureOut">
               <a:rPr lang="en-US" smtClean="0"/>
-              <a:t>6/25/2023</a:t>
+              <a:t>6/26/2023</a:t>
             </a:fld>
             <a:endParaRPr lang="en-US"/>
           </a:p>
@@ -521,7 +640,7 @@
           <a:p>
             <a:fld id="{1955A8DF-052F-408C-B32C-6128C7E474DA}" type="datetimeFigureOut">
               <a:rPr lang="en-US" smtClean="0"/>
-              <a:t>6/25/2023</a:t>
+              <a:t>6/26/2023</a:t>
             </a:fld>
             <a:endParaRPr lang="en-US"/>
           </a:p>
@@ -701,7 +820,7 @@
           <a:p>
             <a:fld id="{1955A8DF-052F-408C-B32C-6128C7E474DA}" type="datetimeFigureOut">
               <a:rPr lang="en-US" smtClean="0"/>
-              <a:t>6/25/2023</a:t>
+              <a:t>6/26/2023</a:t>
             </a:fld>
             <a:endParaRPr lang="en-US"/>
           </a:p>
@@ -871,7 +990,7 @@
           <a:p>
             <a:fld id="{1955A8DF-052F-408C-B32C-6128C7E474DA}" type="datetimeFigureOut">
               <a:rPr lang="en-US" smtClean="0"/>
-              <a:t>6/25/2023</a:t>
+              <a:t>6/26/2023</a:t>
             </a:fld>
             <a:endParaRPr lang="en-US"/>
           </a:p>
@@ -1125,7 +1244,7 @@
           <a:p>
             <a:fld id="{1955A8DF-052F-408C-B32C-6128C7E474DA}" type="datetimeFigureOut">
               <a:rPr lang="en-US" smtClean="0"/>
-              <a:t>6/25/2023</a:t>
+              <a:t>6/26/2023</a:t>
             </a:fld>
             <a:endParaRPr lang="en-US"/>
           </a:p>
@@ -1413,7 +1532,7 @@
           <a:p>
             <a:fld id="{1955A8DF-052F-408C-B32C-6128C7E474DA}" type="datetimeFigureOut">
               <a:rPr lang="en-US" smtClean="0"/>
-              <a:t>6/25/2023</a:t>
+              <a:t>6/26/2023</a:t>
             </a:fld>
             <a:endParaRPr lang="en-US"/>
           </a:p>
@@ -1855,7 +1974,7 @@
           <a:p>
             <a:fld id="{1955A8DF-052F-408C-B32C-6128C7E474DA}" type="datetimeFigureOut">
               <a:rPr lang="en-US" smtClean="0"/>
-              <a:t>6/25/2023</a:t>
+              <a:t>6/26/2023</a:t>
             </a:fld>
             <a:endParaRPr lang="en-US"/>
           </a:p>
@@ -1973,7 +2092,7 @@
           <a:p>
             <a:fld id="{1955A8DF-052F-408C-B32C-6128C7E474DA}" type="datetimeFigureOut">
               <a:rPr lang="en-US" smtClean="0"/>
-              <a:t>6/25/2023</a:t>
+              <a:t>6/26/2023</a:t>
             </a:fld>
             <a:endParaRPr lang="en-US"/>
           </a:p>
@@ -2068,7 +2187,7 @@
           <a:p>
             <a:fld id="{1955A8DF-052F-408C-B32C-6128C7E474DA}" type="datetimeFigureOut">
               <a:rPr lang="en-US" smtClean="0"/>
-              <a:t>6/25/2023</a:t>
+              <a:t>6/26/2023</a:t>
             </a:fld>
             <a:endParaRPr lang="en-US"/>
           </a:p>
@@ -2356,7 +2475,7 @@
           <a:p>
             <a:fld id="{1955A8DF-052F-408C-B32C-6128C7E474DA}" type="datetimeFigureOut">
               <a:rPr lang="en-US" smtClean="0"/>
-              <a:t>6/25/2023</a:t>
+              <a:t>6/26/2023</a:t>
             </a:fld>
             <a:endParaRPr lang="en-US"/>
           </a:p>
@@ -2629,7 +2748,7 @@
           <a:p>
             <a:fld id="{1955A8DF-052F-408C-B32C-6128C7E474DA}" type="datetimeFigureOut">
               <a:rPr lang="en-US" smtClean="0"/>
-              <a:t>6/25/2023</a:t>
+              <a:t>6/26/2023</a:t>
             </a:fld>
             <a:endParaRPr lang="en-US"/>
           </a:p>
@@ -2926,7 +3045,7 @@
           <a:p>
             <a:fld id="{1955A8DF-052F-408C-B32C-6128C7E474DA}" type="datetimeFigureOut">
               <a:rPr lang="en-US" smtClean="0"/>
-              <a:t>6/25/2023</a:t>
+              <a:t>6/26/2023</a:t>
             </a:fld>
             <a:endParaRPr lang="en-US"/>
           </a:p>
@@ -3527,6 +3646,762 @@
 </p:sld>
 </file>
 
+<file path=ppt/slides/slide10.xml><?xml version="1.0" encoding="utf-8"?>
+<p:sld xmlns:a="http://schemas.openxmlformats.org/drawingml/2006/main" xmlns:r="http://schemas.openxmlformats.org/officeDocument/2006/relationships" xmlns:p="http://schemas.openxmlformats.org/presentationml/2006/main">
+  <p:cSld>
+    <p:spTree>
+      <p:nvGrpSpPr>
+        <p:cNvPr id="1" name=""/>
+        <p:cNvGrpSpPr/>
+        <p:nvPr/>
+      </p:nvGrpSpPr>
+      <p:grpSpPr>
+        <a:xfrm>
+          <a:off x="0" y="0"/>
+          <a:ext cx="0" cy="0"/>
+          <a:chOff x="0" y="0"/>
+          <a:chExt cx="0" cy="0"/>
+        </a:xfrm>
+      </p:grpSpPr>
+      <p:sp>
+        <p:nvSpPr>
+          <p:cNvPr id="2" name="Title 1">
+            <a:extLst>
+              <a:ext uri="{FF2B5EF4-FFF2-40B4-BE49-F238E27FC236}">
+                <a16:creationId xmlns:a16="http://schemas.microsoft.com/office/drawing/2014/main" id="{BC8107AF-A697-F007-FBC6-663EEACE8539}"/>
+              </a:ext>
+            </a:extLst>
+          </p:cNvPr>
+          <p:cNvSpPr>
+            <a:spLocks noGrp="1"/>
+          </p:cNvSpPr>
+          <p:nvPr>
+            <p:ph type="title"/>
+          </p:nvPr>
+        </p:nvSpPr>
+        <p:spPr/>
+        <p:txBody>
+          <a:bodyPr/>
+          <a:lstStyle/>
+          <a:p>
+            <a:r>
+              <a:rPr lang="en-US" dirty="0"/>
+              <a:t>Other Datasets and Research Findings</a:t>
+            </a:r>
+          </a:p>
+        </p:txBody>
+      </p:sp>
+      <p:sp>
+        <p:nvSpPr>
+          <p:cNvPr id="3" name="Content Placeholder 2">
+            <a:extLst>
+              <a:ext uri="{FF2B5EF4-FFF2-40B4-BE49-F238E27FC236}">
+                <a16:creationId xmlns:a16="http://schemas.microsoft.com/office/drawing/2014/main" id="{AC68744F-2AB0-9C00-83B2-5DA833BC80DC}"/>
+              </a:ext>
+            </a:extLst>
+          </p:cNvPr>
+          <p:cNvSpPr>
+            <a:spLocks noGrp="1"/>
+          </p:cNvSpPr>
+          <p:nvPr>
+            <p:ph idx="1"/>
+          </p:nvPr>
+        </p:nvSpPr>
+        <p:spPr/>
+        <p:txBody>
+          <a:bodyPr>
+            <a:normAutofit/>
+          </a:bodyPr>
+          <a:lstStyle/>
+          <a:p>
+            <a:pPr algn="l"/>
+            <a:r>
+              <a:rPr lang="en-US" dirty="0"/>
+              <a:t>ACSI Dataset seems to contradict some of the findings from the primary dataset</a:t>
+            </a:r>
+            <a:r>
+              <a:rPr lang="en-US" baseline="30000" dirty="0"/>
+              <a:t>3</a:t>
+            </a:r>
+            <a:endParaRPr lang="en-US" dirty="0"/>
+          </a:p>
+          <a:p>
+            <a:pPr algn="l"/>
+            <a:r>
+              <a:rPr lang="en-US" dirty="0"/>
+              <a:t>Impact of COVID-19 pandemic on airlines’ passenger satisfaction contains references to a lot of previous research done on the topic</a:t>
+            </a:r>
+            <a:r>
+              <a:rPr lang="en-US" baseline="30000" dirty="0"/>
+              <a:t>4</a:t>
+            </a:r>
+          </a:p>
+          <a:p>
+            <a:pPr algn="l"/>
+            <a:endParaRPr lang="en-US" dirty="0"/>
+          </a:p>
+        </p:txBody>
+      </p:sp>
+    </p:spTree>
+    <p:extLst>
+      <p:ext uri="{BB962C8B-B14F-4D97-AF65-F5344CB8AC3E}">
+        <p14:creationId xmlns:p14="http://schemas.microsoft.com/office/powerpoint/2010/main" val="343252239"/>
+      </p:ext>
+    </p:extLst>
+  </p:cSld>
+  <p:clrMapOvr>
+    <a:masterClrMapping/>
+  </p:clrMapOvr>
+  <p:extLst>
+    <p:ext uri="{6950BFC3-D8DA-4A85-94F7-54DA5524770B}">
+      <p188:commentRel xmlns:p188="http://schemas.microsoft.com/office/powerpoint/2018/8/main" r:id="rId2"/>
+    </p:ext>
+  </p:extLst>
+</p:sld>
+</file>
+
+<file path=ppt/slides/slide11.xml><?xml version="1.0" encoding="utf-8"?>
+<p:sld xmlns:a="http://schemas.openxmlformats.org/drawingml/2006/main" xmlns:r="http://schemas.openxmlformats.org/officeDocument/2006/relationships" xmlns:p="http://schemas.openxmlformats.org/presentationml/2006/main">
+  <p:cSld>
+    <p:spTree>
+      <p:nvGrpSpPr>
+        <p:cNvPr id="1" name=""/>
+        <p:cNvGrpSpPr/>
+        <p:nvPr/>
+      </p:nvGrpSpPr>
+      <p:grpSpPr>
+        <a:xfrm>
+          <a:off x="0" y="0"/>
+          <a:ext cx="0" cy="0"/>
+          <a:chOff x="0" y="0"/>
+          <a:chExt cx="0" cy="0"/>
+        </a:xfrm>
+      </p:grpSpPr>
+      <p:sp>
+        <p:nvSpPr>
+          <p:cNvPr id="2" name="Title 1">
+            <a:extLst>
+              <a:ext uri="{FF2B5EF4-FFF2-40B4-BE49-F238E27FC236}">
+                <a16:creationId xmlns:a16="http://schemas.microsoft.com/office/drawing/2014/main" id="{49241911-89D4-97F0-FABA-ADD4726EFB7A}"/>
+              </a:ext>
+            </a:extLst>
+          </p:cNvPr>
+          <p:cNvSpPr>
+            <a:spLocks noGrp="1"/>
+          </p:cNvSpPr>
+          <p:nvPr>
+            <p:ph type="title"/>
+          </p:nvPr>
+        </p:nvSpPr>
+        <p:spPr/>
+        <p:txBody>
+          <a:bodyPr/>
+          <a:lstStyle/>
+          <a:p>
+            <a:r>
+              <a:rPr lang="en-US" dirty="0"/>
+              <a:t>Sources</a:t>
+            </a:r>
+          </a:p>
+        </p:txBody>
+      </p:sp>
+      <p:sp>
+        <p:nvSpPr>
+          <p:cNvPr id="3" name="Content Placeholder 2">
+            <a:extLst>
+              <a:ext uri="{FF2B5EF4-FFF2-40B4-BE49-F238E27FC236}">
+                <a16:creationId xmlns:a16="http://schemas.microsoft.com/office/drawing/2014/main" id="{39FCF39E-D111-3122-EA43-D55DA132BB63}"/>
+              </a:ext>
+            </a:extLst>
+          </p:cNvPr>
+          <p:cNvSpPr>
+            <a:spLocks noGrp="1"/>
+          </p:cNvSpPr>
+          <p:nvPr>
+            <p:ph idx="1"/>
+          </p:nvPr>
+        </p:nvSpPr>
+        <p:spPr/>
+        <p:txBody>
+          <a:bodyPr/>
+          <a:lstStyle/>
+          <a:p>
+            <a:pPr marL="457200" indent="-457200">
+              <a:buAutoNum type="arabicPeriod"/>
+            </a:pPr>
+            <a:r>
+              <a:rPr lang="en-US" dirty="0">
+                <a:hlinkClick r:id="rId2"/>
+              </a:rPr>
+              <a:t>https://www.forbes.com/sites/forbesbusinesscouncil/2022/12/12/customer-retention-versus-customer-acquisition/?sh=3cef46fc1c7d</a:t>
+            </a:r>
+            <a:endParaRPr lang="en-US" dirty="0"/>
+          </a:p>
+          <a:p>
+            <a:pPr marL="457200" indent="-457200">
+              <a:buAutoNum type="arabicPeriod"/>
+            </a:pPr>
+            <a:r>
+              <a:rPr lang="en-US" dirty="0">
+                <a:hlinkClick r:id="rId3"/>
+              </a:rPr>
+              <a:t>https://www.kaggle.com/datasets/teejmahal20/airline-passenger-satisfaction</a:t>
+            </a:r>
+            <a:endParaRPr lang="en-US" dirty="0"/>
+          </a:p>
+          <a:p>
+            <a:pPr marL="457200" indent="-457200">
+              <a:buAutoNum type="arabicPeriod"/>
+            </a:pPr>
+            <a:r>
+              <a:rPr lang="en-US" dirty="0">
+                <a:hlinkClick r:id="rId4"/>
+              </a:rPr>
+              <a:t>https://www.sciencedirect.com/science/article/pii/S2352340923002421</a:t>
+            </a:r>
+            <a:endParaRPr lang="en-US" dirty="0"/>
+          </a:p>
+          <a:p>
+            <a:pPr marL="457200" indent="-457200">
+              <a:buAutoNum type="arabicPeriod"/>
+            </a:pPr>
+            <a:r>
+              <a:rPr lang="en-US" dirty="0">
+                <a:hlinkClick r:id="rId5"/>
+              </a:rPr>
+              <a:t>https://www.sciencedirect.com/science/article/pii/S0969699723000844#bib20</a:t>
+            </a:r>
+            <a:endParaRPr lang="en-US" dirty="0"/>
+          </a:p>
+          <a:p>
+            <a:pPr marL="457200" indent="-457200">
+              <a:buAutoNum type="arabicPeriod"/>
+            </a:pPr>
+            <a:r>
+              <a:rPr lang="en-US" dirty="0">
+                <a:hlinkClick r:id="rId6"/>
+              </a:rPr>
+              <a:t>https://www.sciencedirect.com/science/article/abs/pii/S0969699719302959</a:t>
+            </a:r>
+            <a:endParaRPr lang="en-US" dirty="0"/>
+          </a:p>
+          <a:p>
+            <a:pPr marL="457200" indent="-457200">
+              <a:buAutoNum type="arabicPeriod"/>
+            </a:pPr>
+            <a:r>
+              <a:rPr lang="en-US" dirty="0">
+                <a:hlinkClick r:id="rId7"/>
+              </a:rPr>
+              <a:t>https://psycnet.apa.org/record/1989-10632-001</a:t>
+            </a:r>
+            <a:endParaRPr lang="en-US" dirty="0"/>
+          </a:p>
+          <a:p>
+            <a:pPr marL="457200" indent="-457200">
+              <a:buAutoNum type="arabicPeriod"/>
+            </a:pPr>
+            <a:r>
+              <a:rPr lang="en-US" dirty="0">
+                <a:hlinkClick r:id="rId8"/>
+              </a:rPr>
+              <a:t>https://www.techscience.com/cmc/v75n1/51460/pdf</a:t>
+            </a:r>
+            <a:endParaRPr lang="en-US" dirty="0"/>
+          </a:p>
+        </p:txBody>
+      </p:sp>
+    </p:spTree>
+    <p:extLst>
+      <p:ext uri="{BB962C8B-B14F-4D97-AF65-F5344CB8AC3E}">
+        <p14:creationId xmlns:p14="http://schemas.microsoft.com/office/powerpoint/2010/main" val="1917321065"/>
+      </p:ext>
+    </p:extLst>
+  </p:cSld>
+  <p:clrMapOvr>
+    <a:masterClrMapping/>
+  </p:clrMapOvr>
+</p:sld>
+</file>
+
+<file path=ppt/slides/slide12.xml><?xml version="1.0" encoding="utf-8"?>
+<p:sld xmlns:a="http://schemas.openxmlformats.org/drawingml/2006/main" xmlns:r="http://schemas.openxmlformats.org/officeDocument/2006/relationships" xmlns:p="http://schemas.openxmlformats.org/presentationml/2006/main">
+  <p:cSld>
+    <p:spTree>
+      <p:nvGrpSpPr>
+        <p:cNvPr id="1" name=""/>
+        <p:cNvGrpSpPr/>
+        <p:nvPr/>
+      </p:nvGrpSpPr>
+      <p:grpSpPr>
+        <a:xfrm>
+          <a:off x="0" y="0"/>
+          <a:ext cx="0" cy="0"/>
+          <a:chOff x="0" y="0"/>
+          <a:chExt cx="0" cy="0"/>
+        </a:xfrm>
+      </p:grpSpPr>
+      <p:sp>
+        <p:nvSpPr>
+          <p:cNvPr id="4" name="Title 3">
+            <a:extLst>
+              <a:ext uri="{FF2B5EF4-FFF2-40B4-BE49-F238E27FC236}">
+                <a16:creationId xmlns:a16="http://schemas.microsoft.com/office/drawing/2014/main" id="{2A57183B-6D6C-F8E5-9A36-5D7DD1BFF97B}"/>
+              </a:ext>
+            </a:extLst>
+          </p:cNvPr>
+          <p:cNvSpPr>
+            <a:spLocks noGrp="1"/>
+          </p:cNvSpPr>
+          <p:nvPr>
+            <p:ph type="title"/>
+          </p:nvPr>
+        </p:nvSpPr>
+        <p:spPr/>
+        <p:txBody>
+          <a:bodyPr/>
+          <a:lstStyle/>
+          <a:p>
+            <a:r>
+              <a:rPr lang="en-US"/>
+              <a:t>Project Requirements</a:t>
+            </a:r>
+            <a:br>
+              <a:rPr lang="en-US"/>
+            </a:br>
+            <a:br>
+              <a:rPr lang="en-US"/>
+            </a:br>
+            <a:r>
+              <a:rPr lang="en-US"/>
+              <a:t>Delete once done</a:t>
+            </a:r>
+            <a:endParaRPr lang="en-US" dirty="0"/>
+          </a:p>
+        </p:txBody>
+      </p:sp>
+      <p:sp>
+        <p:nvSpPr>
+          <p:cNvPr id="5" name="Content Placeholder 4">
+            <a:extLst>
+              <a:ext uri="{FF2B5EF4-FFF2-40B4-BE49-F238E27FC236}">
+                <a16:creationId xmlns:a16="http://schemas.microsoft.com/office/drawing/2014/main" id="{84EBB694-C084-1AEB-4E61-EB59207B5ECC}"/>
+              </a:ext>
+            </a:extLst>
+          </p:cNvPr>
+          <p:cNvSpPr>
+            <a:spLocks noGrp="1"/>
+          </p:cNvSpPr>
+          <p:nvPr>
+            <p:ph idx="1"/>
+          </p:nvPr>
+        </p:nvSpPr>
+        <p:spPr/>
+        <p:txBody>
+          <a:bodyPr>
+            <a:normAutofit fontScale="85000" lnSpcReduction="20000"/>
+          </a:bodyPr>
+          <a:lstStyle/>
+          <a:p>
+            <a:pPr marL="0" marR="0">
+              <a:lnSpc>
+                <a:spcPct val="107000"/>
+              </a:lnSpc>
+              <a:spcBef>
+                <a:spcPts val="1600"/>
+              </a:spcBef>
+              <a:spcAft>
+                <a:spcPts val="400"/>
+              </a:spcAft>
+            </a:pPr>
+            <a:r>
+              <a:rPr lang="en-US" sz="1800" b="1" dirty="0">
+                <a:solidFill>
+                  <a:srgbClr val="434343"/>
+                </a:solidFill>
+                <a:effectLst/>
+                <a:ea typeface="Georgia" panose="02040502050405020303" pitchFamily="18" charset="0"/>
+                <a:cs typeface="Georgia" panose="02040502050405020303" pitchFamily="18" charset="0"/>
+              </a:rPr>
+              <a:t>What to Include &amp; What is Required? </a:t>
+            </a:r>
+          </a:p>
+          <a:p>
+            <a:pPr marL="342900" marR="0" lvl="0" indent="-342900">
+              <a:spcBef>
+                <a:spcPts val="0"/>
+              </a:spcBef>
+              <a:spcAft>
+                <a:spcPts val="0"/>
+              </a:spcAft>
+              <a:buFont typeface="+mj-lt"/>
+              <a:buAutoNum type="arabicPeriod"/>
+            </a:pPr>
+            <a:r>
+              <a:rPr lang="en-US" sz="1800" u="none" strike="noStrike" dirty="0">
+                <a:effectLst/>
+                <a:ea typeface="Nunito" pitchFamily="2" charset="0"/>
+                <a:cs typeface="Nunito" pitchFamily="2" charset="0"/>
+              </a:rPr>
+              <a:t>4-5 minutes of video/audio content that presents your group’s project proposal</a:t>
+            </a:r>
+          </a:p>
+          <a:p>
+            <a:pPr marL="342900" marR="0" lvl="0" indent="-342900">
+              <a:spcBef>
+                <a:spcPts val="0"/>
+              </a:spcBef>
+              <a:spcAft>
+                <a:spcPts val="0"/>
+              </a:spcAft>
+              <a:buFont typeface="+mj-lt"/>
+              <a:buAutoNum type="arabicPeriod"/>
+            </a:pPr>
+            <a:r>
+              <a:rPr lang="en-US" sz="1800" u="none" strike="noStrike" dirty="0">
+                <a:effectLst/>
+                <a:highlight>
+                  <a:srgbClr val="00FF00"/>
+                </a:highlight>
+                <a:ea typeface="Nunito" pitchFamily="2" charset="0"/>
+                <a:cs typeface="Nunito" pitchFamily="2" charset="0"/>
+              </a:rPr>
+              <a:t>Team members' names should be listed in the presentation.</a:t>
+            </a:r>
+          </a:p>
+          <a:p>
+            <a:pPr marL="342900" marR="0" lvl="0" indent="-342900">
+              <a:spcBef>
+                <a:spcPts val="0"/>
+              </a:spcBef>
+              <a:spcAft>
+                <a:spcPts val="0"/>
+              </a:spcAft>
+              <a:buFont typeface="+mj-lt"/>
+              <a:buAutoNum type="arabicPeriod"/>
+            </a:pPr>
+            <a:r>
+              <a:rPr lang="en-US" sz="1800" u="none" strike="noStrike" dirty="0">
+                <a:effectLst/>
+                <a:ea typeface="Nunito" pitchFamily="2" charset="0"/>
+                <a:cs typeface="Nunito" pitchFamily="2" charset="0"/>
+              </a:rPr>
+              <a:t>Speaker should mention who they are before speaking – during video</a:t>
+            </a:r>
+          </a:p>
+          <a:p>
+            <a:pPr marL="342900" marR="0" lvl="0" indent="-342900">
+              <a:spcBef>
+                <a:spcPts val="0"/>
+              </a:spcBef>
+              <a:spcAft>
+                <a:spcPts val="0"/>
+              </a:spcAft>
+              <a:buFont typeface="+mj-lt"/>
+              <a:buAutoNum type="arabicPeriod"/>
+            </a:pPr>
+            <a:r>
+              <a:rPr lang="en-US" sz="1800" u="none" strike="noStrike" dirty="0">
+                <a:effectLst/>
+                <a:highlight>
+                  <a:srgbClr val="00FF00"/>
+                </a:highlight>
+                <a:ea typeface="Nunito" pitchFamily="2" charset="0"/>
+                <a:cs typeface="Nunito" pitchFamily="2" charset="0"/>
+              </a:rPr>
+              <a:t>Necessary background information/framing of the problem.</a:t>
+            </a:r>
+          </a:p>
+          <a:p>
+            <a:pPr marL="342900" marR="0" lvl="0" indent="-342900">
+              <a:spcBef>
+                <a:spcPts val="0"/>
+              </a:spcBef>
+              <a:spcAft>
+                <a:spcPts val="0"/>
+              </a:spcAft>
+              <a:buFont typeface="+mj-lt"/>
+              <a:buAutoNum type="arabicPeriod"/>
+            </a:pPr>
+            <a:r>
+              <a:rPr lang="en-US" sz="1800" u="none" strike="noStrike" dirty="0">
+                <a:effectLst/>
+                <a:highlight>
+                  <a:srgbClr val="00FF00"/>
+                </a:highlight>
+                <a:ea typeface="Nunito" pitchFamily="2" charset="0"/>
+                <a:cs typeface="Nunito" pitchFamily="2" charset="0"/>
+              </a:rPr>
+              <a:t>Include an overview of the problem in general as well as your planned approach (it is ok if this approach changes later in the project as you learn more information)</a:t>
+            </a:r>
+          </a:p>
+          <a:p>
+            <a:pPr marL="342900" marR="0" lvl="0" indent="-342900">
+              <a:spcBef>
+                <a:spcPts val="0"/>
+              </a:spcBef>
+              <a:spcAft>
+                <a:spcPts val="0"/>
+              </a:spcAft>
+              <a:buFont typeface="+mj-lt"/>
+              <a:buAutoNum type="arabicPeriod"/>
+            </a:pPr>
+            <a:r>
+              <a:rPr lang="en-US" sz="1800" u="none" strike="noStrike" dirty="0">
+                <a:effectLst/>
+                <a:highlight>
+                  <a:srgbClr val="00FF00"/>
+                </a:highlight>
+                <a:ea typeface="Nunito" pitchFamily="2" charset="0"/>
+                <a:cs typeface="Nunito" pitchFamily="2" charset="0"/>
+              </a:rPr>
+              <a:t>Any initial hypotheses?</a:t>
+            </a:r>
+          </a:p>
+          <a:p>
+            <a:pPr marL="342900" marR="0" lvl="0" indent="-342900">
+              <a:spcBef>
+                <a:spcPts val="0"/>
+              </a:spcBef>
+              <a:spcAft>
+                <a:spcPts val="0"/>
+              </a:spcAft>
+              <a:buFont typeface="+mj-lt"/>
+              <a:buAutoNum type="arabicPeriod"/>
+            </a:pPr>
+            <a:r>
+              <a:rPr lang="en-US" sz="1800" u="none" strike="noStrike" dirty="0">
+                <a:effectLst/>
+                <a:ea typeface="Nunito" pitchFamily="2" charset="0"/>
+                <a:cs typeface="Nunito" pitchFamily="2" charset="0"/>
+              </a:rPr>
+              <a:t>What type of models do you plan to use?</a:t>
+            </a:r>
+          </a:p>
+          <a:p>
+            <a:pPr marL="342900" marR="0" lvl="0" indent="-342900">
+              <a:spcBef>
+                <a:spcPts val="0"/>
+              </a:spcBef>
+              <a:spcAft>
+                <a:spcPts val="0"/>
+              </a:spcAft>
+              <a:buFont typeface="+mj-lt"/>
+              <a:buAutoNum type="arabicPeriod"/>
+            </a:pPr>
+            <a:r>
+              <a:rPr lang="en-US" sz="1800" u="none" strike="noStrike" dirty="0">
+                <a:effectLst/>
+                <a:highlight>
+                  <a:srgbClr val="00FF00"/>
+                </a:highlight>
+                <a:ea typeface="Nunito" pitchFamily="2" charset="0"/>
+                <a:cs typeface="Nunito" pitchFamily="2" charset="0"/>
+              </a:rPr>
+              <a:t>How has your data cleaning progressed?</a:t>
+            </a:r>
+          </a:p>
+          <a:p>
+            <a:pPr marL="342900" marR="0" lvl="0" indent="-342900">
+              <a:spcBef>
+                <a:spcPts val="0"/>
+              </a:spcBef>
+              <a:spcAft>
+                <a:spcPts val="0"/>
+              </a:spcAft>
+              <a:buFont typeface="+mj-lt"/>
+              <a:buAutoNum type="arabicPeriod"/>
+            </a:pPr>
+            <a:r>
+              <a:rPr lang="en-US" sz="1800" u="none" strike="noStrike" dirty="0">
+                <a:effectLst/>
+                <a:highlight>
+                  <a:srgbClr val="00FF00"/>
+                </a:highlight>
+                <a:ea typeface="Nunito" pitchFamily="2" charset="0"/>
+                <a:cs typeface="Nunito" pitchFamily="2" charset="0"/>
+              </a:rPr>
+              <a:t>If you encounter any unexpected problems, challenges, or interesting findings please mention these. Discussion of things that didn’t work is also encouraged. </a:t>
+            </a:r>
+          </a:p>
+          <a:p>
+            <a:pPr marL="342900" marR="0" lvl="0" indent="-342900">
+              <a:spcBef>
+                <a:spcPts val="0"/>
+              </a:spcBef>
+              <a:spcAft>
+                <a:spcPts val="0"/>
+              </a:spcAft>
+              <a:buFont typeface="+mj-lt"/>
+              <a:buAutoNum type="arabicPeriod"/>
+            </a:pPr>
+            <a:r>
+              <a:rPr lang="en-US" sz="1800" u="none" strike="noStrike" dirty="0">
+                <a:effectLst/>
+                <a:highlight>
+                  <a:srgbClr val="00FF00"/>
+                </a:highlight>
+                <a:ea typeface="Nunito" pitchFamily="2" charset="0"/>
+                <a:cs typeface="Nunito" pitchFamily="2" charset="0"/>
+              </a:rPr>
+              <a:t>You could include things like any new datasets that you have found, any analysis that you have done on the datasets, or any other impactful and measurable progress that you have made thus far. </a:t>
+            </a:r>
+          </a:p>
+          <a:p>
+            <a:pPr marL="342900" marR="0" lvl="0" indent="-342900">
+              <a:spcBef>
+                <a:spcPts val="0"/>
+              </a:spcBef>
+              <a:spcAft>
+                <a:spcPts val="0"/>
+              </a:spcAft>
+              <a:buFont typeface="+mj-lt"/>
+              <a:buAutoNum type="arabicPeriod"/>
+            </a:pPr>
+            <a:r>
+              <a:rPr lang="en-US" sz="1800" u="none" strike="noStrike" dirty="0">
+                <a:effectLst/>
+                <a:ea typeface="Nunito" pitchFamily="2" charset="0"/>
+                <a:cs typeface="Nunito" pitchFamily="2" charset="0"/>
+              </a:rPr>
+              <a:t>The team should review 2-3 research articles/papers/Kaggle kernels/ etc. related to your problem statement and then discuss them.. Be sure to cite the reference at the end of the slide show or visual medium.</a:t>
+            </a:r>
+          </a:p>
+          <a:p>
+            <a:pPr marL="342900" marR="0" lvl="0" indent="-342900">
+              <a:spcBef>
+                <a:spcPts val="0"/>
+              </a:spcBef>
+              <a:spcAft>
+                <a:spcPts val="0"/>
+              </a:spcAft>
+              <a:buFont typeface="+mj-lt"/>
+              <a:buAutoNum type="arabicPeriod"/>
+            </a:pPr>
+            <a:r>
+              <a:rPr lang="en-US" sz="1800" u="none" strike="noStrike" dirty="0">
+                <a:effectLst/>
+                <a:ea typeface="Nunito" pitchFamily="2" charset="0"/>
+                <a:cs typeface="Nunito" pitchFamily="2" charset="0"/>
+              </a:rPr>
+              <a:t>If you have any graphs or key visuals to include, be sure to add titles, captions, labels, axes, legends, and most importantly context where necessary!</a:t>
+            </a:r>
+          </a:p>
+          <a:p>
+            <a:pPr marL="342900" marR="0" lvl="0" indent="-342900">
+              <a:spcBef>
+                <a:spcPts val="0"/>
+              </a:spcBef>
+              <a:spcAft>
+                <a:spcPts val="0"/>
+              </a:spcAft>
+              <a:buFont typeface="+mj-lt"/>
+              <a:buAutoNum type="arabicPeriod"/>
+            </a:pPr>
+            <a:r>
+              <a:rPr lang="en-US" sz="1800" u="none" strike="noStrike" dirty="0">
+                <a:effectLst/>
+                <a:ea typeface="Nunito" pitchFamily="2" charset="0"/>
+                <a:cs typeface="Nunito" pitchFamily="2" charset="0"/>
+              </a:rPr>
+              <a:t>Visuals and Slides are necessary; DO NOT just read your written project proposal</a:t>
+            </a:r>
+          </a:p>
+          <a:p>
+            <a:pPr marL="342900" marR="0" lvl="0" indent="-342900">
+              <a:spcBef>
+                <a:spcPts val="0"/>
+              </a:spcBef>
+              <a:spcAft>
+                <a:spcPts val="0"/>
+              </a:spcAft>
+              <a:buFont typeface="+mj-lt"/>
+              <a:buAutoNum type="arabicPeriod"/>
+            </a:pPr>
+            <a:r>
+              <a:rPr lang="en-US" sz="1800" u="none" strike="noStrike" dirty="0">
+                <a:effectLst/>
+                <a:ea typeface="Nunito" pitchFamily="2" charset="0"/>
+                <a:cs typeface="Nunito" pitchFamily="2" charset="0"/>
+              </a:rPr>
+              <a:t>Include audio narration</a:t>
+            </a:r>
+          </a:p>
+          <a:p>
+            <a:pPr marL="342900" marR="0" lvl="0" indent="-342900">
+              <a:spcBef>
+                <a:spcPts val="0"/>
+              </a:spcBef>
+              <a:spcAft>
+                <a:spcPts val="0"/>
+              </a:spcAft>
+              <a:buFont typeface="+mj-lt"/>
+              <a:buAutoNum type="arabicPeriod"/>
+            </a:pPr>
+            <a:r>
+              <a:rPr lang="en-US" sz="1800" u="none" strike="noStrike" dirty="0">
+                <a:effectLst/>
+                <a:ea typeface="Nunito" pitchFamily="2" charset="0"/>
+                <a:cs typeface="Nunito" pitchFamily="2" charset="0"/>
+              </a:rPr>
+              <a:t>We do not require all group members to be part of the video given the limited time allocated </a:t>
+            </a:r>
+          </a:p>
+          <a:p>
+            <a:pPr marL="342900" marR="0" lvl="0" indent="-342900">
+              <a:spcBef>
+                <a:spcPts val="0"/>
+              </a:spcBef>
+              <a:spcAft>
+                <a:spcPts val="0"/>
+              </a:spcAft>
+              <a:buFont typeface="+mj-lt"/>
+              <a:buAutoNum type="arabicPeriod"/>
+            </a:pPr>
+            <a:r>
+              <a:rPr lang="en-US" sz="1800" u="none" strike="noStrike" dirty="0">
+                <a:effectLst/>
+                <a:ea typeface="Nunito" pitchFamily="2" charset="0"/>
+                <a:cs typeface="Nunito" pitchFamily="2" charset="0"/>
+              </a:rPr>
+              <a:t>Sources cited on the last slide (no need to read them just include them).</a:t>
+            </a:r>
+          </a:p>
+          <a:p>
+            <a:pPr marL="342900" marR="0" lvl="0" indent="-342900">
+              <a:spcBef>
+                <a:spcPts val="0"/>
+              </a:spcBef>
+              <a:spcAft>
+                <a:spcPts val="0"/>
+              </a:spcAft>
+              <a:buFont typeface="+mj-lt"/>
+              <a:buAutoNum type="arabicPeriod"/>
+            </a:pPr>
+            <a:r>
+              <a:rPr lang="en-US" sz="1800" u="none" strike="noStrike" dirty="0">
+                <a:effectLst/>
+                <a:ea typeface="Nunito" pitchFamily="2" charset="0"/>
+                <a:cs typeface="Nunito" pitchFamily="2" charset="0"/>
+              </a:rPr>
+              <a:t>4-5 minutes is a limited time window to cover all these things but do your best to manage this time wisely and play to your strengths and present a clear idea of your project</a:t>
+            </a:r>
+          </a:p>
+        </p:txBody>
+      </p:sp>
+    </p:spTree>
+    <p:extLst>
+      <p:ext uri="{BB962C8B-B14F-4D97-AF65-F5344CB8AC3E}">
+        <p14:creationId xmlns:p14="http://schemas.microsoft.com/office/powerpoint/2010/main" val="2259079471"/>
+      </p:ext>
+    </p:extLst>
+  </p:cSld>
+  <p:clrMapOvr>
+    <a:masterClrMapping/>
+  </p:clrMapOvr>
+</p:sld>
+</file>
+
 <file path=ppt/slides/slide2.xml><?xml version="1.0" encoding="utf-8"?>
 <p:sld xmlns:a="http://schemas.openxmlformats.org/drawingml/2006/main" xmlns:r="http://schemas.openxmlformats.org/officeDocument/2006/relationships" xmlns:p="http://schemas.openxmlformats.org/presentationml/2006/main">
   <p:cSld>
@@ -3681,6 +4556,217 @@
 </file>
 
 <file path=ppt/slides/slide3.xml><?xml version="1.0" encoding="utf-8"?>
+<p:sld xmlns:a="http://schemas.openxmlformats.org/drawingml/2006/main" xmlns:r="http://schemas.openxmlformats.org/officeDocument/2006/relationships" xmlns:p="http://schemas.openxmlformats.org/presentationml/2006/main">
+  <p:cSld>
+    <p:spTree>
+      <p:nvGrpSpPr>
+        <p:cNvPr id="1" name=""/>
+        <p:cNvGrpSpPr/>
+        <p:nvPr/>
+      </p:nvGrpSpPr>
+      <p:grpSpPr>
+        <a:xfrm>
+          <a:off x="0" y="0"/>
+          <a:ext cx="0" cy="0"/>
+          <a:chOff x="0" y="0"/>
+          <a:chExt cx="0" cy="0"/>
+        </a:xfrm>
+      </p:grpSpPr>
+      <p:sp>
+        <p:nvSpPr>
+          <p:cNvPr id="2" name="Title 1">
+            <a:extLst>
+              <a:ext uri="{FF2B5EF4-FFF2-40B4-BE49-F238E27FC236}">
+                <a16:creationId xmlns:a16="http://schemas.microsoft.com/office/drawing/2014/main" id="{BC8107AF-A697-F007-FBC6-663EEACE8539}"/>
+              </a:ext>
+            </a:extLst>
+          </p:cNvPr>
+          <p:cNvSpPr>
+            <a:spLocks noGrp="1"/>
+          </p:cNvSpPr>
+          <p:nvPr>
+            <p:ph type="title"/>
+          </p:nvPr>
+        </p:nvSpPr>
+        <p:spPr/>
+        <p:txBody>
+          <a:bodyPr/>
+          <a:lstStyle/>
+          <a:p>
+            <a:r>
+              <a:rPr lang="en-US" dirty="0"/>
+              <a:t>Dataset Overview</a:t>
+            </a:r>
+          </a:p>
+        </p:txBody>
+      </p:sp>
+      <p:sp>
+        <p:nvSpPr>
+          <p:cNvPr id="3" name="Content Placeholder 2">
+            <a:extLst>
+              <a:ext uri="{FF2B5EF4-FFF2-40B4-BE49-F238E27FC236}">
+                <a16:creationId xmlns:a16="http://schemas.microsoft.com/office/drawing/2014/main" id="{AC68744F-2AB0-9C00-83B2-5DA833BC80DC}"/>
+              </a:ext>
+            </a:extLst>
+          </p:cNvPr>
+          <p:cNvSpPr>
+            <a:spLocks noGrp="1"/>
+          </p:cNvSpPr>
+          <p:nvPr>
+            <p:ph idx="1"/>
+          </p:nvPr>
+        </p:nvSpPr>
+        <p:spPr/>
+        <p:txBody>
+          <a:bodyPr>
+            <a:normAutofit/>
+          </a:bodyPr>
+          <a:lstStyle/>
+          <a:p>
+            <a:pPr algn="l"/>
+            <a:r>
+              <a:rPr lang="en-US" dirty="0"/>
+              <a:t>The dataset is taken from surveys from a US airline. It includes user ratings for multiple aspects of air travel such as food and drink and seat comfort, as well as customer information such as age and gender.</a:t>
+            </a:r>
+            <a:r>
+              <a:rPr lang="en-US" baseline="30000" dirty="0"/>
+              <a:t>2</a:t>
+            </a:r>
+            <a:r>
+              <a:rPr lang="en-US" dirty="0"/>
+              <a:t> </a:t>
+            </a:r>
+          </a:p>
+          <a:p>
+            <a:pPr algn="l"/>
+            <a:endParaRPr lang="en-US" dirty="0"/>
+          </a:p>
+          <a:p>
+            <a:pPr algn="l"/>
+            <a:endParaRPr lang="en-US" dirty="0"/>
+          </a:p>
+          <a:p>
+            <a:pPr algn="l"/>
+            <a:endParaRPr lang="en-US" dirty="0"/>
+          </a:p>
+          <a:p>
+            <a:pPr algn="l"/>
+            <a:endParaRPr lang="en-US" dirty="0"/>
+          </a:p>
+          <a:p>
+            <a:pPr algn="l"/>
+            <a:endParaRPr lang="en-US" dirty="0"/>
+          </a:p>
+          <a:p>
+            <a:pPr algn="l"/>
+            <a:endParaRPr lang="en-US" dirty="0"/>
+          </a:p>
+          <a:p>
+            <a:pPr algn="l"/>
+            <a:endParaRPr lang="en-US" dirty="0"/>
+          </a:p>
+        </p:txBody>
+      </p:sp>
+      <p:pic>
+        <p:nvPicPr>
+          <p:cNvPr id="5" name="Picture 4">
+            <a:extLst>
+              <a:ext uri="{FF2B5EF4-FFF2-40B4-BE49-F238E27FC236}">
+                <a16:creationId xmlns:a16="http://schemas.microsoft.com/office/drawing/2014/main" id="{59A38596-278B-EDE5-2164-439B11ED69CF}"/>
+              </a:ext>
+            </a:extLst>
+          </p:cNvPr>
+          <p:cNvPicPr>
+            <a:picLocks noChangeAspect="1"/>
+          </p:cNvPicPr>
+          <p:nvPr/>
+        </p:nvPicPr>
+        <p:blipFill rotWithShape="1">
+          <a:blip r:embed="rId3"/>
+          <a:srcRect t="11845"/>
+          <a:stretch/>
+        </p:blipFill>
+        <p:spPr>
+          <a:xfrm>
+            <a:off x="3740818" y="2707829"/>
+            <a:ext cx="7572099" cy="3286063"/>
+          </a:xfrm>
+          <a:prstGeom prst="rect">
+            <a:avLst/>
+          </a:prstGeom>
+        </p:spPr>
+      </p:pic>
+      <p:sp>
+        <p:nvSpPr>
+          <p:cNvPr id="4" name="Rectangle 3">
+            <a:extLst>
+              <a:ext uri="{FF2B5EF4-FFF2-40B4-BE49-F238E27FC236}">
+                <a16:creationId xmlns:a16="http://schemas.microsoft.com/office/drawing/2014/main" id="{B7F43AD0-4396-B767-A57D-A5F10A77A8A0}"/>
+              </a:ext>
+            </a:extLst>
+          </p:cNvPr>
+          <p:cNvSpPr/>
+          <p:nvPr/>
+        </p:nvSpPr>
+        <p:spPr>
+          <a:xfrm>
+            <a:off x="3962400" y="5725020"/>
+            <a:ext cx="2057400" cy="190005"/>
+          </a:xfrm>
+          <a:prstGeom prst="rect">
+            <a:avLst/>
+          </a:prstGeom>
+          <a:noFill/>
+          <a:ln w="38100">
+            <a:solidFill>
+              <a:srgbClr val="FFC000"/>
+            </a:solidFill>
+          </a:ln>
+        </p:spPr>
+        <p:style>
+          <a:lnRef idx="2">
+            <a:schemeClr val="accent1">
+              <a:shade val="15000"/>
+            </a:schemeClr>
+          </a:lnRef>
+          <a:fillRef idx="1">
+            <a:schemeClr val="accent1"/>
+          </a:fillRef>
+          <a:effectRef idx="0">
+            <a:schemeClr val="accent1"/>
+          </a:effectRef>
+          <a:fontRef idx="minor">
+            <a:schemeClr val="lt1"/>
+          </a:fontRef>
+        </p:style>
+        <p:txBody>
+          <a:bodyPr rtlCol="0" anchor="ctr"/>
+          <a:lstStyle/>
+          <a:p>
+            <a:pPr algn="ctr"/>
+            <a:endParaRPr lang="en-US"/>
+          </a:p>
+        </p:txBody>
+      </p:sp>
+    </p:spTree>
+    <p:extLst>
+      <p:ext uri="{BB962C8B-B14F-4D97-AF65-F5344CB8AC3E}">
+        <p14:creationId xmlns:p14="http://schemas.microsoft.com/office/powerpoint/2010/main" val="2980110185"/>
+      </p:ext>
+    </p:extLst>
+  </p:cSld>
+  <p:clrMapOvr>
+    <a:masterClrMapping/>
+  </p:clrMapOvr>
+  <p:extLst>
+    <p:ext uri="{6950BFC3-D8DA-4A85-94F7-54DA5524770B}">
+      <p188:commentRel xmlns:p188="http://schemas.microsoft.com/office/powerpoint/2018/8/main" r:id="rId2"/>
+    </p:ext>
+  </p:extLst>
+</p:sld>
+</file>
+
+<file path=ppt/slides/slide4.xml><?xml version="1.0" encoding="utf-8"?>
 <p:sld xmlns:a="http://schemas.openxmlformats.org/drawingml/2006/main" xmlns:r="http://schemas.openxmlformats.org/officeDocument/2006/relationships" xmlns:p="http://schemas.openxmlformats.org/presentationml/2006/main">
   <p:cSld>
     <p:spTree>
@@ -4091,248 +5177,10 @@
           </a:p>
         </p:txBody>
       </p:sp>
-      <p:sp>
-        <p:nvSpPr>
-          <p:cNvPr id="11" name="Left Brace 10">
-            <a:extLst>
-              <a:ext uri="{FF2B5EF4-FFF2-40B4-BE49-F238E27FC236}">
-                <a16:creationId xmlns:a16="http://schemas.microsoft.com/office/drawing/2014/main" id="{877BE431-BCDC-8C09-7626-70DB176FE1CD}"/>
-              </a:ext>
-            </a:extLst>
-          </p:cNvPr>
-          <p:cNvSpPr/>
-          <p:nvPr/>
-        </p:nvSpPr>
-        <p:spPr>
-          <a:xfrm rot="10800000">
-            <a:off x="8131847" y="5501910"/>
-            <a:ext cx="128450" cy="223110"/>
-          </a:xfrm>
-          <a:prstGeom prst="leftBrace">
-            <a:avLst/>
-          </a:prstGeom>
-          <a:ln w="28575"/>
-        </p:spPr>
-        <p:style>
-          <a:lnRef idx="1">
-            <a:schemeClr val="accent1"/>
-          </a:lnRef>
-          <a:fillRef idx="0">
-            <a:schemeClr val="accent1"/>
-          </a:fillRef>
-          <a:effectRef idx="0">
-            <a:schemeClr val="accent1"/>
-          </a:effectRef>
-          <a:fontRef idx="minor">
-            <a:schemeClr val="tx1"/>
-          </a:fontRef>
-        </p:style>
-        <p:txBody>
-          <a:bodyPr rtlCol="0" anchor="ctr"/>
-          <a:lstStyle/>
-          <a:p>
-            <a:pPr algn="ctr"/>
-            <a:endParaRPr lang="en-US"/>
-          </a:p>
-        </p:txBody>
-      </p:sp>
-      <p:sp>
-        <p:nvSpPr>
-          <p:cNvPr id="12" name="TextBox 11">
-            <a:extLst>
-              <a:ext uri="{FF2B5EF4-FFF2-40B4-BE49-F238E27FC236}">
-                <a16:creationId xmlns:a16="http://schemas.microsoft.com/office/drawing/2014/main" id="{1EEAFC73-C591-20CB-B33A-0A6D498E12DE}"/>
-              </a:ext>
-            </a:extLst>
-          </p:cNvPr>
-          <p:cNvSpPr txBox="1"/>
-          <p:nvPr/>
-        </p:nvSpPr>
-        <p:spPr>
-          <a:xfrm>
-            <a:off x="8196071" y="5428799"/>
-            <a:ext cx="2039943" cy="369332"/>
-          </a:xfrm>
-          <a:prstGeom prst="rect">
-            <a:avLst/>
-          </a:prstGeom>
-          <a:noFill/>
-        </p:spPr>
-        <p:txBody>
-          <a:bodyPr wrap="square" rtlCol="0">
-            <a:spAutoFit/>
-          </a:bodyPr>
-          <a:lstStyle/>
-          <a:p>
-            <a:r>
-              <a:rPr lang="en-US" dirty="0"/>
-              <a:t>Highly correlated</a:t>
-            </a:r>
-          </a:p>
-        </p:txBody>
-      </p:sp>
-      <p:cxnSp>
-        <p:nvCxnSpPr>
-          <p:cNvPr id="14" name="Straight Arrow Connector 13">
-            <a:extLst>
-              <a:ext uri="{FF2B5EF4-FFF2-40B4-BE49-F238E27FC236}">
-                <a16:creationId xmlns:a16="http://schemas.microsoft.com/office/drawing/2014/main" id="{5D6DB6CF-AF1F-F243-8C95-5E020A438AA7}"/>
-              </a:ext>
-            </a:extLst>
-          </p:cNvPr>
-          <p:cNvCxnSpPr>
-            <a:cxnSpLocks/>
-          </p:cNvCxnSpPr>
-          <p:nvPr/>
-        </p:nvCxnSpPr>
-        <p:spPr>
-          <a:xfrm>
-            <a:off x="3597779" y="5806677"/>
-            <a:ext cx="262943" cy="0"/>
-          </a:xfrm>
-          <a:prstGeom prst="straightConnector1">
-            <a:avLst/>
-          </a:prstGeom>
-          <a:ln w="57150">
-            <a:tailEnd type="triangle"/>
-          </a:ln>
-        </p:spPr>
-        <p:style>
-          <a:lnRef idx="1">
-            <a:schemeClr val="accent1"/>
-          </a:lnRef>
-          <a:fillRef idx="0">
-            <a:schemeClr val="accent1"/>
-          </a:fillRef>
-          <a:effectRef idx="0">
-            <a:schemeClr val="accent1"/>
-          </a:effectRef>
-          <a:fontRef idx="minor">
-            <a:schemeClr val="tx1"/>
-          </a:fontRef>
-        </p:style>
-      </p:cxnSp>
     </p:spTree>
     <p:extLst>
       <p:ext uri="{BB962C8B-B14F-4D97-AF65-F5344CB8AC3E}">
-        <p14:creationId xmlns:p14="http://schemas.microsoft.com/office/powerpoint/2010/main" val="2980110185"/>
-      </p:ext>
-    </p:extLst>
-  </p:cSld>
-  <p:clrMapOvr>
-    <a:masterClrMapping/>
-  </p:clrMapOvr>
-</p:sld>
-</file>
-
-<file path=ppt/slides/slide4.xml><?xml version="1.0" encoding="utf-8"?>
-<p:sld xmlns:a="http://schemas.openxmlformats.org/drawingml/2006/main" xmlns:r="http://schemas.openxmlformats.org/officeDocument/2006/relationships" xmlns:p="http://schemas.openxmlformats.org/presentationml/2006/main">
-  <p:cSld>
-    <p:spTree>
-      <p:nvGrpSpPr>
-        <p:cNvPr id="1" name=""/>
-        <p:cNvGrpSpPr/>
-        <p:nvPr/>
-      </p:nvGrpSpPr>
-      <p:grpSpPr>
-        <a:xfrm>
-          <a:off x="0" y="0"/>
-          <a:ext cx="0" cy="0"/>
-          <a:chOff x="0" y="0"/>
-          <a:chExt cx="0" cy="0"/>
-        </a:xfrm>
-      </p:grpSpPr>
-      <p:sp>
-        <p:nvSpPr>
-          <p:cNvPr id="2" name="Title 1">
-            <a:extLst>
-              <a:ext uri="{FF2B5EF4-FFF2-40B4-BE49-F238E27FC236}">
-                <a16:creationId xmlns:a16="http://schemas.microsoft.com/office/drawing/2014/main" id="{BC8107AF-A697-F007-FBC6-663EEACE8539}"/>
-              </a:ext>
-            </a:extLst>
-          </p:cNvPr>
-          <p:cNvSpPr>
-            <a:spLocks noGrp="1"/>
-          </p:cNvSpPr>
-          <p:nvPr>
-            <p:ph type="title"/>
-          </p:nvPr>
-        </p:nvSpPr>
-        <p:spPr/>
-        <p:txBody>
-          <a:bodyPr/>
-          <a:lstStyle/>
-          <a:p>
-            <a:r>
-              <a:rPr lang="en-US" dirty="0"/>
-              <a:t>Progress and Challenges</a:t>
-            </a:r>
-          </a:p>
-        </p:txBody>
-      </p:sp>
-      <p:sp>
-        <p:nvSpPr>
-          <p:cNvPr id="3" name="Content Placeholder 2">
-            <a:extLst>
-              <a:ext uri="{FF2B5EF4-FFF2-40B4-BE49-F238E27FC236}">
-                <a16:creationId xmlns:a16="http://schemas.microsoft.com/office/drawing/2014/main" id="{AC68744F-2AB0-9C00-83B2-5DA833BC80DC}"/>
-              </a:ext>
-            </a:extLst>
-          </p:cNvPr>
-          <p:cNvSpPr>
-            <a:spLocks noGrp="1"/>
-          </p:cNvSpPr>
-          <p:nvPr>
-            <p:ph idx="1"/>
-          </p:nvPr>
-        </p:nvSpPr>
-        <p:spPr/>
-        <p:txBody>
-          <a:bodyPr>
-            <a:normAutofit/>
-          </a:bodyPr>
-          <a:lstStyle/>
-          <a:p>
-            <a:pPr algn="l"/>
-            <a:r>
-              <a:rPr lang="en-US" dirty="0"/>
-              <a:t>Data cleaning status</a:t>
-            </a:r>
-          </a:p>
-          <a:p>
-            <a:pPr algn="l"/>
-            <a:r>
-              <a:rPr lang="en-US" dirty="0"/>
-              <a:t>Initial findings</a:t>
-            </a:r>
-          </a:p>
-          <a:p>
-            <a:pPr algn="l"/>
-            <a:r>
-              <a:rPr lang="en-US" dirty="0"/>
-              <a:t>Will not be able to merge flight path data to try to infer airport locations due to insufficient information:</a:t>
-            </a:r>
-          </a:p>
-          <a:p>
-            <a:pPr lvl="1"/>
-            <a:r>
-              <a:rPr lang="en-US" dirty="0"/>
-              <a:t>Main dataset does not specify number of legs in a trip</a:t>
-            </a:r>
-          </a:p>
-          <a:p>
-            <a:pPr lvl="1"/>
-            <a:r>
-              <a:rPr lang="en-US" dirty="0"/>
-              <a:t>Flight distances in main dataset are too similar in many instances which would make it impossible to narrow down with any certainty which airports were involved in the trip</a:t>
-            </a:r>
-          </a:p>
-        </p:txBody>
-      </p:sp>
-    </p:spTree>
-    <p:extLst>
-      <p:ext uri="{BB962C8B-B14F-4D97-AF65-F5344CB8AC3E}">
-        <p14:creationId xmlns:p14="http://schemas.microsoft.com/office/powerpoint/2010/main" val="2577161931"/>
+        <p14:creationId xmlns:p14="http://schemas.microsoft.com/office/powerpoint/2010/main" val="579416996"/>
       </p:ext>
     </p:extLst>
   </p:cSld>
@@ -4382,7 +5230,7 @@
           <a:p>
             <a:r>
               <a:rPr lang="en-US" dirty="0"/>
-              <a:t>Modelling</a:t>
+              <a:t>Dataset Overview</a:t>
             </a:r>
           </a:p>
         </p:txBody>
@@ -4406,91 +5254,230 @@
         <p:spPr/>
         <p:txBody>
           <a:bodyPr>
-            <a:normAutofit fontScale="92500" lnSpcReduction="10000"/>
+            <a:normAutofit/>
           </a:bodyPr>
           <a:lstStyle/>
           <a:p>
             <a:pPr algn="l"/>
             <a:r>
               <a:rPr lang="en-US" dirty="0"/>
-              <a:t>Regression: Linear, Log-linear, Log-log</a:t>
+              <a:t>The dataset is taken from surveys from a US airline. It includes user ratings for multiple aspects of air travel such as food and drink and seat comfort, as well as customer information such as age and gender.</a:t>
+            </a:r>
+            <a:r>
+              <a:rPr lang="en-US" baseline="30000" dirty="0"/>
+              <a:t>2</a:t>
+            </a:r>
+            <a:r>
+              <a:rPr lang="en-US" dirty="0"/>
+              <a:t> </a:t>
             </a:r>
           </a:p>
           <a:p>
             <a:pPr algn="l"/>
+            <a:endParaRPr lang="en-US" dirty="0"/>
+          </a:p>
+          <a:p>
+            <a:pPr algn="l"/>
+            <a:endParaRPr lang="en-US" dirty="0"/>
+          </a:p>
+          <a:p>
+            <a:pPr algn="l"/>
+            <a:endParaRPr lang="en-US" dirty="0"/>
+          </a:p>
+          <a:p>
+            <a:pPr algn="l"/>
+            <a:endParaRPr lang="en-US" dirty="0"/>
+          </a:p>
+          <a:p>
+            <a:pPr algn="l"/>
+            <a:endParaRPr lang="en-US" dirty="0"/>
+          </a:p>
+          <a:p>
+            <a:pPr algn="l"/>
+            <a:endParaRPr lang="en-US" dirty="0"/>
+          </a:p>
+          <a:p>
+            <a:pPr algn="l"/>
+            <a:endParaRPr lang="en-US" dirty="0"/>
+          </a:p>
+        </p:txBody>
+      </p:sp>
+      <p:pic>
+        <p:nvPicPr>
+          <p:cNvPr id="5" name="Picture 4">
+            <a:extLst>
+              <a:ext uri="{FF2B5EF4-FFF2-40B4-BE49-F238E27FC236}">
+                <a16:creationId xmlns:a16="http://schemas.microsoft.com/office/drawing/2014/main" id="{59A38596-278B-EDE5-2164-439B11ED69CF}"/>
+              </a:ext>
+            </a:extLst>
+          </p:cNvPr>
+          <p:cNvPicPr>
+            <a:picLocks noChangeAspect="1"/>
+          </p:cNvPicPr>
+          <p:nvPr/>
+        </p:nvPicPr>
+        <p:blipFill rotWithShape="1">
+          <a:blip r:embed="rId3"/>
+          <a:srcRect t="11845"/>
+          <a:stretch/>
+        </p:blipFill>
+        <p:spPr>
+          <a:xfrm>
+            <a:off x="3740818" y="2707829"/>
+            <a:ext cx="7572099" cy="3286063"/>
+          </a:xfrm>
+          <a:prstGeom prst="rect">
+            <a:avLst/>
+          </a:prstGeom>
+        </p:spPr>
+      </p:pic>
+      <p:sp>
+        <p:nvSpPr>
+          <p:cNvPr id="11" name="Left Brace 10">
+            <a:extLst>
+              <a:ext uri="{FF2B5EF4-FFF2-40B4-BE49-F238E27FC236}">
+                <a16:creationId xmlns:a16="http://schemas.microsoft.com/office/drawing/2014/main" id="{877BE431-BCDC-8C09-7626-70DB176FE1CD}"/>
+              </a:ext>
+            </a:extLst>
+          </p:cNvPr>
+          <p:cNvSpPr/>
+          <p:nvPr/>
+        </p:nvSpPr>
+        <p:spPr>
+          <a:xfrm rot="10800000">
+            <a:off x="8131847" y="5501910"/>
+            <a:ext cx="128450" cy="223110"/>
+          </a:xfrm>
+          <a:prstGeom prst="leftBrace">
+            <a:avLst/>
+          </a:prstGeom>
+          <a:ln w="28575"/>
+        </p:spPr>
+        <p:style>
+          <a:lnRef idx="1">
+            <a:schemeClr val="accent1"/>
+          </a:lnRef>
+          <a:fillRef idx="0">
+            <a:schemeClr val="accent1"/>
+          </a:fillRef>
+          <a:effectRef idx="0">
+            <a:schemeClr val="accent1"/>
+          </a:effectRef>
+          <a:fontRef idx="minor">
+            <a:schemeClr val="tx1"/>
+          </a:fontRef>
+        </p:style>
+        <p:txBody>
+          <a:bodyPr rtlCol="0" anchor="ctr"/>
+          <a:lstStyle/>
+          <a:p>
+            <a:pPr algn="ctr"/>
+            <a:endParaRPr lang="en-US"/>
+          </a:p>
+        </p:txBody>
+      </p:sp>
+      <p:sp>
+        <p:nvSpPr>
+          <p:cNvPr id="12" name="TextBox 11">
+            <a:extLst>
+              <a:ext uri="{FF2B5EF4-FFF2-40B4-BE49-F238E27FC236}">
+                <a16:creationId xmlns:a16="http://schemas.microsoft.com/office/drawing/2014/main" id="{1EEAFC73-C591-20CB-B33A-0A6D498E12DE}"/>
+              </a:ext>
+            </a:extLst>
+          </p:cNvPr>
+          <p:cNvSpPr txBox="1"/>
+          <p:nvPr/>
+        </p:nvSpPr>
+        <p:spPr>
+          <a:xfrm>
+            <a:off x="8196071" y="5428799"/>
+            <a:ext cx="2039943" cy="369332"/>
+          </a:xfrm>
+          <a:prstGeom prst="rect">
+            <a:avLst/>
+          </a:prstGeom>
+          <a:noFill/>
+        </p:spPr>
+        <p:txBody>
+          <a:bodyPr wrap="square" rtlCol="0">
+            <a:spAutoFit/>
+          </a:bodyPr>
+          <a:lstStyle/>
+          <a:p>
             <a:r>
               <a:rPr lang="en-US" dirty="0"/>
-              <a:t>Random forest</a:t>
-            </a:r>
-          </a:p>
-          <a:p>
-            <a:pPr algn="l"/>
-            <a:r>
-              <a:rPr lang="en-US" dirty="0"/>
-              <a:t>Feature selection including Lasso</a:t>
-            </a:r>
-          </a:p>
-          <a:p>
-            <a:pPr algn="l"/>
-            <a:r>
-              <a:rPr lang="en-US" dirty="0"/>
-              <a:t>PCA</a:t>
-            </a:r>
-          </a:p>
-          <a:p>
-            <a:pPr algn="l"/>
-            <a:r>
-              <a:rPr lang="en-US" dirty="0"/>
-              <a:t>Logistic Regression - Analysis of Distributions for possible transformations, Consider Regularization</a:t>
-            </a:r>
-          </a:p>
-          <a:p>
-            <a:pPr algn="l"/>
-            <a:r>
-              <a:rPr lang="en-US" dirty="0"/>
-              <a:t>Support Vector Machines - Analysis of Distributions for possible transformations, Center and Scale Data, Optimal Choice of Kernal, Optimal Value of C/lambda.</a:t>
-            </a:r>
-          </a:p>
-          <a:p>
-            <a:pPr algn="l"/>
-            <a:r>
-              <a:rPr lang="en-US" dirty="0"/>
-              <a:t>K-Nearest Neighbors - Center and Scale Data, Optimal choice of K</a:t>
-            </a:r>
-          </a:p>
-          <a:p>
-            <a:pPr algn="l"/>
-            <a:r>
-              <a:rPr lang="en-US" dirty="0"/>
-              <a:t>Classification Trees - Identify key splits. Prune tree. Possibly use for variable creation.</a:t>
-            </a:r>
-          </a:p>
-          <a:p>
-            <a:pPr algn="l"/>
-            <a:r>
-              <a:rPr lang="en-US" dirty="0"/>
-              <a:t>Random Forest – Discover relative feature importance.</a:t>
-            </a:r>
-          </a:p>
-          <a:p>
-            <a:pPr algn="l"/>
-            <a:r>
-              <a:rPr lang="en-US" dirty="0"/>
-              <a:t>The models will be compared using ROC-AUC on a reserved validation set.</a:t>
-            </a:r>
+              <a:t>Highly correlated</a:t>
+            </a:r>
+          </a:p>
+        </p:txBody>
+      </p:sp>
+      <p:sp>
+        <p:nvSpPr>
+          <p:cNvPr id="4" name="Multiplication Sign 3">
+            <a:extLst>
+              <a:ext uri="{FF2B5EF4-FFF2-40B4-BE49-F238E27FC236}">
+                <a16:creationId xmlns:a16="http://schemas.microsoft.com/office/drawing/2014/main" id="{A051BF0F-1216-F319-33AF-0661D13B4AA1}"/>
+              </a:ext>
+            </a:extLst>
+          </p:cNvPr>
+          <p:cNvSpPr/>
+          <p:nvPr/>
+        </p:nvSpPr>
+        <p:spPr>
+          <a:xfrm>
+            <a:off x="3609975" y="5591174"/>
+            <a:ext cx="182880" cy="182880"/>
+          </a:xfrm>
+          <a:prstGeom prst="mathMultiply">
+            <a:avLst/>
+          </a:prstGeom>
+          <a:solidFill>
+            <a:srgbClr val="FF0000"/>
+          </a:solidFill>
+          <a:ln>
+            <a:noFill/>
+          </a:ln>
+        </p:spPr>
+        <p:style>
+          <a:lnRef idx="2">
+            <a:schemeClr val="accent1">
+              <a:shade val="15000"/>
+            </a:schemeClr>
+          </a:lnRef>
+          <a:fillRef idx="1">
+            <a:schemeClr val="accent1"/>
+          </a:fillRef>
+          <a:effectRef idx="0">
+            <a:schemeClr val="accent1"/>
+          </a:effectRef>
+          <a:fontRef idx="minor">
+            <a:schemeClr val="lt1"/>
+          </a:fontRef>
+        </p:style>
+        <p:txBody>
+          <a:bodyPr rtlCol="0" anchor="ctr"/>
+          <a:lstStyle/>
+          <a:p>
+            <a:pPr algn="ctr"/>
+            <a:endParaRPr lang="en-US"/>
           </a:p>
         </p:txBody>
       </p:sp>
     </p:spTree>
     <p:extLst>
       <p:ext uri="{BB962C8B-B14F-4D97-AF65-F5344CB8AC3E}">
-        <p14:creationId xmlns:p14="http://schemas.microsoft.com/office/powerpoint/2010/main" val="2760735355"/>
+        <p14:creationId xmlns:p14="http://schemas.microsoft.com/office/powerpoint/2010/main" val="1272309782"/>
       </p:ext>
     </p:extLst>
   </p:cSld>
   <p:clrMapOvr>
     <a:masterClrMapping/>
   </p:clrMapOvr>
+  <p:extLst>
+    <p:ext uri="{6950BFC3-D8DA-4A85-94F7-54DA5524770B}">
+      <p188:commentRel xmlns:p188="http://schemas.microsoft.com/office/powerpoint/2018/8/main" r:id="rId2"/>
+    </p:ext>
+  </p:extLst>
 </p:sld>
 </file>
 
@@ -4534,7 +5521,7 @@
           <a:p>
             <a:r>
               <a:rPr lang="en-US" dirty="0"/>
-              <a:t>Other Datasets and Research Findings</a:t>
+              <a:t>Progress and Challenges</a:t>
             </a:r>
           </a:p>
         </p:txBody>
@@ -4558,35 +5545,214 @@
         <p:spPr/>
         <p:txBody>
           <a:bodyPr>
-            <a:normAutofit/>
+            <a:normAutofit lnSpcReduction="10000"/>
           </a:bodyPr>
           <a:lstStyle/>
           <a:p>
             <a:pPr algn="l"/>
             <a:r>
               <a:rPr lang="en-US" dirty="0"/>
-              <a:t>Talk about findings in other datasets and how they affect our findings in the main dataset</a:t>
+              <a:t>Data cleaning status</a:t>
+            </a:r>
+          </a:p>
+          <a:p>
+            <a:pPr lvl="1"/>
+            <a:r>
+              <a:rPr lang="en-US" dirty="0"/>
+              <a:t>Missing values removed</a:t>
+            </a:r>
+          </a:p>
+          <a:p>
+            <a:pPr lvl="1"/>
+            <a:r>
+              <a:rPr lang="en-US" dirty="0"/>
+              <a:t>Investigating values with a Z-score &gt; 3</a:t>
+            </a:r>
+          </a:p>
+          <a:p>
+            <a:pPr lvl="1"/>
+            <a:r>
+              <a:rPr lang="en-US" dirty="0"/>
+              <a:t>Manually one-hot encoding data to establish baselines</a:t>
             </a:r>
           </a:p>
           <a:p>
             <a:pPr algn="l"/>
             <a:r>
               <a:rPr lang="en-US" dirty="0"/>
-              <a:t>Overview of research papers</a:t>
-            </a:r>
-          </a:p>
-        </p:txBody>
-      </p:sp>
+              <a:t>Initial findings</a:t>
+            </a:r>
+          </a:p>
+          <a:p>
+            <a:pPr lvl="1"/>
+            <a:r>
+              <a:rPr lang="en-US" dirty="0"/>
+              <a:t>Flight distance is not statistically significant</a:t>
+            </a:r>
+          </a:p>
+          <a:p>
+            <a:pPr lvl="1"/>
+            <a:r>
+              <a:rPr lang="en-US" dirty="0"/>
+              <a:t>Business class is more likely to be satisfied</a:t>
+            </a:r>
+          </a:p>
+          <a:p>
+            <a:pPr lvl="1"/>
+            <a:r>
+              <a:rPr lang="en-US" dirty="0"/>
+              <a:t>Some ratings seem irrelevant to customer satisfaction</a:t>
+            </a:r>
+          </a:p>
+          <a:p>
+            <a:pPr algn="l"/>
+            <a:r>
+              <a:rPr lang="en-US" dirty="0"/>
+              <a:t>Will not be able to merge flight path data to try to infer airport locations due to insufficient information:</a:t>
+            </a:r>
+          </a:p>
+          <a:p>
+            <a:pPr lvl="1"/>
+            <a:r>
+              <a:rPr lang="en-US" dirty="0"/>
+              <a:t>Main dataset does not specify number of legs in a trip</a:t>
+            </a:r>
+          </a:p>
+          <a:p>
+            <a:pPr lvl="1"/>
+            <a:r>
+              <a:rPr lang="en-US" dirty="0"/>
+              <a:t>Flight distances in main dataset are too similar in many instances which would make it impossible to narrow down with any certainty which airports were involved in the trip</a:t>
+            </a:r>
+          </a:p>
+          <a:p>
+            <a:r>
+              <a:rPr lang="en-US" dirty="0"/>
+              <a:t>Understanding how to map a binary satisfaction variable to a Likert scale variable</a:t>
+            </a:r>
+          </a:p>
+        </p:txBody>
+      </p:sp>
+      <p:grpSp>
+        <p:nvGrpSpPr>
+          <p:cNvPr id="7" name="Group 6">
+            <a:extLst>
+              <a:ext uri="{FF2B5EF4-FFF2-40B4-BE49-F238E27FC236}">
+                <a16:creationId xmlns:a16="http://schemas.microsoft.com/office/drawing/2014/main" id="{1732D824-9D7D-03B7-2D07-CB5133E953E6}"/>
+              </a:ext>
+            </a:extLst>
+          </p:cNvPr>
+          <p:cNvGrpSpPr/>
+          <p:nvPr/>
+        </p:nvGrpSpPr>
+        <p:grpSpPr>
+          <a:xfrm>
+            <a:off x="8862862" y="2194412"/>
+            <a:ext cx="2871937" cy="880368"/>
+            <a:chOff x="4300387" y="2367815"/>
+            <a:chExt cx="6305550" cy="1932913"/>
+          </a:xfrm>
+        </p:grpSpPr>
+        <p:pic>
+          <p:nvPicPr>
+            <p:cNvPr id="5" name="Picture 4">
+              <a:extLst>
+                <a:ext uri="{FF2B5EF4-FFF2-40B4-BE49-F238E27FC236}">
+                  <a16:creationId xmlns:a16="http://schemas.microsoft.com/office/drawing/2014/main" id="{B7C156E8-005F-C0E3-50CB-4B9270367469}"/>
+                </a:ext>
+              </a:extLst>
+            </p:cNvPr>
+            <p:cNvPicPr>
+              <a:picLocks noChangeAspect="1"/>
+            </p:cNvPicPr>
+            <p:nvPr/>
+          </p:nvPicPr>
+          <p:blipFill>
+            <a:blip r:embed="rId3"/>
+            <a:stretch>
+              <a:fillRect/>
+            </a:stretch>
+          </p:blipFill>
+          <p:spPr>
+            <a:xfrm>
+              <a:off x="4300387" y="2548128"/>
+              <a:ext cx="6305550" cy="1752600"/>
+            </a:xfrm>
+            <a:prstGeom prst="rect">
+              <a:avLst/>
+            </a:prstGeom>
+          </p:spPr>
+        </p:pic>
+        <p:sp>
+          <p:nvSpPr>
+            <p:cNvPr id="6" name="Rectangle 5">
+              <a:extLst>
+                <a:ext uri="{FF2B5EF4-FFF2-40B4-BE49-F238E27FC236}">
+                  <a16:creationId xmlns:a16="http://schemas.microsoft.com/office/drawing/2014/main" id="{7D6A9B49-BE42-75A3-7956-B6210B3905F5}"/>
+                </a:ext>
+              </a:extLst>
+            </p:cNvPr>
+            <p:cNvSpPr/>
+            <p:nvPr/>
+          </p:nvSpPr>
+          <p:spPr>
+            <a:xfrm>
+              <a:off x="6096000" y="2367815"/>
+              <a:ext cx="2056598" cy="423511"/>
+            </a:xfrm>
+            <a:prstGeom prst="rect">
+              <a:avLst/>
+            </a:prstGeom>
+            <a:solidFill>
+              <a:schemeClr val="bg1"/>
+            </a:solidFill>
+            <a:ln>
+              <a:solidFill>
+                <a:schemeClr val="bg1"/>
+              </a:solidFill>
+            </a:ln>
+          </p:spPr>
+          <p:style>
+            <a:lnRef idx="2">
+              <a:schemeClr val="accent1">
+                <a:shade val="15000"/>
+              </a:schemeClr>
+            </a:lnRef>
+            <a:fillRef idx="1">
+              <a:schemeClr val="accent1"/>
+            </a:fillRef>
+            <a:effectRef idx="0">
+              <a:schemeClr val="accent1"/>
+            </a:effectRef>
+            <a:fontRef idx="minor">
+              <a:schemeClr val="lt1"/>
+            </a:fontRef>
+          </p:style>
+          <p:txBody>
+            <a:bodyPr rtlCol="0" anchor="ctr"/>
+            <a:lstStyle/>
+            <a:p>
+              <a:pPr algn="ctr"/>
+              <a:endParaRPr lang="en-US"/>
+            </a:p>
+          </p:txBody>
+        </p:sp>
+      </p:grpSp>
     </p:spTree>
     <p:extLst>
       <p:ext uri="{BB962C8B-B14F-4D97-AF65-F5344CB8AC3E}">
-        <p14:creationId xmlns:p14="http://schemas.microsoft.com/office/powerpoint/2010/main" val="343252239"/>
+        <p14:creationId xmlns:p14="http://schemas.microsoft.com/office/powerpoint/2010/main" val="2577161931"/>
       </p:ext>
     </p:extLst>
   </p:cSld>
   <p:clrMapOvr>
     <a:masterClrMapping/>
   </p:clrMapOvr>
+  <p:extLst>
+    <p:ext uri="{6950BFC3-D8DA-4A85-94F7-54DA5524770B}">
+      <p188:commentRel xmlns:p188="http://schemas.microsoft.com/office/powerpoint/2018/8/main" r:id="rId2"/>
+    </p:ext>
+  </p:extLst>
 </p:sld>
 </file>
 
@@ -4612,7 +5778,7 @@
           <p:cNvPr id="2" name="Title 1">
             <a:extLst>
               <a:ext uri="{FF2B5EF4-FFF2-40B4-BE49-F238E27FC236}">
-                <a16:creationId xmlns:a16="http://schemas.microsoft.com/office/drawing/2014/main" id="{49241911-89D4-97F0-FABA-ADD4726EFB7A}"/>
+                <a16:creationId xmlns:a16="http://schemas.microsoft.com/office/drawing/2014/main" id="{BC8107AF-A697-F007-FBC6-663EEACE8539}"/>
               </a:ext>
             </a:extLst>
           </p:cNvPr>
@@ -4630,79 +5796,75 @@
           <a:p>
             <a:r>
               <a:rPr lang="en-US" dirty="0"/>
-              <a:t>Sources</a:t>
-            </a:r>
-          </a:p>
-        </p:txBody>
-      </p:sp>
-      <p:sp>
-        <p:nvSpPr>
-          <p:cNvPr id="3" name="Content Placeholder 2">
+              <a:t>Modelling: First Pass Logistic Regression</a:t>
+            </a:r>
+          </a:p>
+        </p:txBody>
+      </p:sp>
+      <p:pic>
+        <p:nvPicPr>
+          <p:cNvPr id="1026" name="Picture 2">
             <a:extLst>
               <a:ext uri="{FF2B5EF4-FFF2-40B4-BE49-F238E27FC236}">
-                <a16:creationId xmlns:a16="http://schemas.microsoft.com/office/drawing/2014/main" id="{39FCF39E-D111-3122-EA43-D55DA132BB63}"/>
+                <a16:creationId xmlns:a16="http://schemas.microsoft.com/office/drawing/2014/main" id="{D54DEFD5-490C-6246-3B56-7575E9DC62F0}"/>
               </a:ext>
             </a:extLst>
           </p:cNvPr>
-          <p:cNvSpPr>
-            <a:spLocks noGrp="1"/>
-          </p:cNvSpPr>
+          <p:cNvPicPr>
+            <a:picLocks noGrp="1" noChangeAspect="1" noChangeArrowheads="1"/>
+          </p:cNvPicPr>
           <p:nvPr>
             <p:ph idx="1"/>
           </p:nvPr>
-        </p:nvSpPr>
-        <p:spPr/>
-        <p:txBody>
-          <a:bodyPr/>
-          <a:lstStyle/>
-          <a:p>
-            <a:pPr marL="457200" indent="-457200">
-              <a:buAutoNum type="arabicPeriod"/>
-            </a:pPr>
-            <a:r>
-              <a:rPr lang="en-US" dirty="0">
-                <a:hlinkClick r:id="rId2"/>
-              </a:rPr>
-              <a:t>https://www.forbes.com/sites/forbesbusinesscouncil/2022/12/12/customer-retention-versus-customer-acquisition/?sh=3cef46fc1c7d</a:t>
-            </a:r>
-            <a:endParaRPr lang="en-US" dirty="0"/>
-          </a:p>
-          <a:p>
-            <a:pPr marL="457200" indent="-457200">
-              <a:buAutoNum type="arabicPeriod"/>
-            </a:pPr>
-            <a:r>
-              <a:rPr lang="en-US" dirty="0">
-                <a:hlinkClick r:id="rId3"/>
-              </a:rPr>
-              <a:t>https://www.kaggle.com/datasets/teejmahal20/airline-passenger-satisfaction</a:t>
-            </a:r>
-            <a:endParaRPr lang="en-US" dirty="0"/>
-          </a:p>
-          <a:p>
-            <a:pPr marL="457200" indent="-457200">
-              <a:buAutoNum type="arabicPeriod"/>
-            </a:pPr>
-            <a:endParaRPr lang="en-US" dirty="0"/>
-          </a:p>
-          <a:p>
-            <a:pPr marL="457200" indent="-457200">
-              <a:buAutoNum type="arabicPeriod"/>
-            </a:pPr>
-            <a:endParaRPr lang="en-US" dirty="0"/>
-          </a:p>
-        </p:txBody>
-      </p:sp>
+        </p:nvPicPr>
+        <p:blipFill>
+          <a:blip r:embed="rId3">
+            <a:extLst>
+              <a:ext uri="{28A0092B-C50C-407E-A947-70E740481C1C}">
+                <a14:useLocalDpi xmlns:a14="http://schemas.microsoft.com/office/drawing/2010/main" val="0"/>
+              </a:ext>
+            </a:extLst>
+          </a:blip>
+          <a:srcRect/>
+          <a:stretch>
+            <a:fillRect/>
+          </a:stretch>
+        </p:blipFill>
+        <p:spPr bwMode="auto">
+          <a:xfrm>
+            <a:off x="5248438" y="863600"/>
+            <a:ext cx="4555800" cy="5121275"/>
+          </a:xfrm>
+          <a:prstGeom prst="rect">
+            <a:avLst/>
+          </a:prstGeom>
+          <a:noFill/>
+          <a:extLst>
+            <a:ext uri="{909E8E84-426E-40DD-AFC4-6F175D3DCCD1}">
+              <a14:hiddenFill xmlns:a14="http://schemas.microsoft.com/office/drawing/2010/main">
+                <a:solidFill>
+                  <a:srgbClr val="FFFFFF"/>
+                </a:solidFill>
+              </a14:hiddenFill>
+            </a:ext>
+          </a:extLst>
+        </p:spPr>
+      </p:pic>
     </p:spTree>
     <p:extLst>
       <p:ext uri="{BB962C8B-B14F-4D97-AF65-F5344CB8AC3E}">
-        <p14:creationId xmlns:p14="http://schemas.microsoft.com/office/powerpoint/2010/main" val="1917321065"/>
+        <p14:creationId xmlns:p14="http://schemas.microsoft.com/office/powerpoint/2010/main" val="114200215"/>
       </p:ext>
     </p:extLst>
   </p:cSld>
   <p:clrMapOvr>
     <a:masterClrMapping/>
   </p:clrMapOvr>
+  <p:extLst>
+    <p:ext uri="{6950BFC3-D8DA-4A85-94F7-54DA5524770B}">
+      <p188:commentRel xmlns:p188="http://schemas.microsoft.com/office/powerpoint/2018/8/main" r:id="rId2"/>
+    </p:ext>
+  </p:extLst>
 </p:sld>
 </file>
 
@@ -4725,10 +5887,10 @@
       </p:grpSpPr>
       <p:sp>
         <p:nvSpPr>
-          <p:cNvPr id="4" name="Title 3">
+          <p:cNvPr id="2" name="Title 1">
             <a:extLst>
               <a:ext uri="{FF2B5EF4-FFF2-40B4-BE49-F238E27FC236}">
-                <a16:creationId xmlns:a16="http://schemas.microsoft.com/office/drawing/2014/main" id="{2A57183B-6D6C-F8E5-9A36-5D7DD1BFF97B}"/>
+                <a16:creationId xmlns:a16="http://schemas.microsoft.com/office/drawing/2014/main" id="{BC8107AF-A697-F007-FBC6-663EEACE8539}"/>
               </a:ext>
             </a:extLst>
           </p:cNvPr>
@@ -4741,436 +5903,238 @@
         </p:nvSpPr>
         <p:spPr/>
         <p:txBody>
-          <a:bodyPr/>
-          <a:lstStyle/>
-          <a:p>
-            <a:r>
-              <a:rPr lang="en-US"/>
-              <a:t>Project Requirements</a:t>
-            </a:r>
-            <a:br>
-              <a:rPr lang="en-US"/>
-            </a:br>
-            <a:br>
-              <a:rPr lang="en-US"/>
-            </a:br>
-            <a:r>
-              <a:rPr lang="en-US"/>
-              <a:t>Delete once done</a:t>
-            </a:r>
-            <a:endParaRPr lang="en-US" dirty="0"/>
-          </a:p>
-        </p:txBody>
-      </p:sp>
-      <p:sp>
-        <p:nvSpPr>
-          <p:cNvPr id="5" name="Content Placeholder 4">
+          <a:bodyPr>
+            <a:normAutofit/>
+          </a:bodyPr>
+          <a:lstStyle/>
+          <a:p>
+            <a:r>
+              <a:rPr lang="en-US" sz="3200" dirty="0"/>
+              <a:t>Transformations</a:t>
+            </a:r>
+          </a:p>
+        </p:txBody>
+      </p:sp>
+      <p:pic>
+        <p:nvPicPr>
+          <p:cNvPr id="6" name="Content Placeholder 5">
             <a:extLst>
               <a:ext uri="{FF2B5EF4-FFF2-40B4-BE49-F238E27FC236}">
-                <a16:creationId xmlns:a16="http://schemas.microsoft.com/office/drawing/2014/main" id="{84EBB694-C084-1AEB-4E61-EB59207B5ECC}"/>
+                <a16:creationId xmlns:a16="http://schemas.microsoft.com/office/drawing/2014/main" id="{6A52719C-0DE9-85B8-1674-8C74745ACDBA}"/>
               </a:ext>
             </a:extLst>
           </p:cNvPr>
-          <p:cNvSpPr>
-            <a:spLocks noGrp="1"/>
-          </p:cNvSpPr>
-          <p:nvPr>
-            <p:ph idx="1"/>
-          </p:nvPr>
-        </p:nvSpPr>
-        <p:spPr/>
-        <p:txBody>
-          <a:bodyPr>
-            <a:normAutofit fontScale="85000" lnSpcReduction="20000"/>
-          </a:bodyPr>
-          <a:lstStyle/>
-          <a:p>
-            <a:pPr marL="0" marR="0">
-              <a:lnSpc>
-                <a:spcPct val="107000"/>
-              </a:lnSpc>
-              <a:spcBef>
-                <a:spcPts val="1600"/>
-              </a:spcBef>
-              <a:spcAft>
-                <a:spcPts val="400"/>
-              </a:spcAft>
-            </a:pPr>
-            <a:r>
-              <a:rPr lang="en-US" sz="1800" b="1">
-                <a:solidFill>
-                  <a:srgbClr val="434343"/>
-                </a:solidFill>
-                <a:effectLst/>
-                <a:ea typeface="Georgia" panose="02040502050405020303" pitchFamily="18" charset="0"/>
-                <a:cs typeface="Georgia" panose="02040502050405020303" pitchFamily="18" charset="0"/>
-              </a:rPr>
-              <a:t>What to Include &amp; What is Required? </a:t>
-            </a:r>
-          </a:p>
-          <a:p>
-            <a:pPr marL="342900" marR="0" lvl="0" indent="-342900">
-              <a:spcBef>
-                <a:spcPts val="0"/>
-              </a:spcBef>
-              <a:spcAft>
-                <a:spcPts val="0"/>
-              </a:spcAft>
-              <a:buFont typeface="+mj-lt"/>
-              <a:buAutoNum type="arabicPeriod"/>
-            </a:pPr>
-            <a:r>
-              <a:rPr lang="en-US" sz="1800" u="none" strike="noStrike">
-                <a:effectLst/>
-                <a:ea typeface="Nunito" pitchFamily="2" charset="0"/>
-                <a:cs typeface="Nunito" pitchFamily="2" charset="0"/>
-              </a:rPr>
-              <a:t>4-5 minutes of video/audio content that presents your group’s project proposal</a:t>
-            </a:r>
-          </a:p>
-          <a:p>
-            <a:pPr marL="342900" marR="0" lvl="0" indent="-342900">
-              <a:spcBef>
-                <a:spcPts val="0"/>
-              </a:spcBef>
-              <a:spcAft>
-                <a:spcPts val="0"/>
-              </a:spcAft>
-              <a:buFont typeface="+mj-lt"/>
-              <a:buAutoNum type="arabicPeriod"/>
-            </a:pPr>
-            <a:r>
-              <a:rPr lang="en-US" sz="1800" u="none" strike="noStrike">
-                <a:effectLst/>
-                <a:highlight>
-                  <a:srgbClr val="00FF00"/>
-                </a:highlight>
-                <a:ea typeface="Nunito" pitchFamily="2" charset="0"/>
-                <a:cs typeface="Nunito" pitchFamily="2" charset="0"/>
-              </a:rPr>
-              <a:t>Team members' names should be listed in the presentation.</a:t>
-            </a:r>
-          </a:p>
-          <a:p>
-            <a:pPr marL="342900" marR="0" lvl="0" indent="-342900">
-              <a:spcBef>
-                <a:spcPts val="0"/>
-              </a:spcBef>
-              <a:spcAft>
-                <a:spcPts val="0"/>
-              </a:spcAft>
-              <a:buFont typeface="+mj-lt"/>
-              <a:buAutoNum type="arabicPeriod"/>
-            </a:pPr>
-            <a:r>
-              <a:rPr lang="en-US" sz="1800" u="none" strike="noStrike">
-                <a:effectLst/>
-                <a:ea typeface="Nunito" pitchFamily="2" charset="0"/>
-                <a:cs typeface="Nunito" pitchFamily="2" charset="0"/>
-              </a:rPr>
-              <a:t>Speaker should mention who they are before speaking – during video</a:t>
-            </a:r>
-          </a:p>
-          <a:p>
-            <a:pPr marL="342900" marR="0" lvl="0" indent="-342900">
-              <a:spcBef>
-                <a:spcPts val="0"/>
-              </a:spcBef>
-              <a:spcAft>
-                <a:spcPts val="0"/>
-              </a:spcAft>
-              <a:buFont typeface="+mj-lt"/>
-              <a:buAutoNum type="arabicPeriod"/>
-            </a:pPr>
-            <a:r>
-              <a:rPr lang="en-US" sz="1800" u="none" strike="noStrike">
-                <a:effectLst/>
-                <a:highlight>
-                  <a:srgbClr val="FFFF00"/>
-                </a:highlight>
-                <a:ea typeface="Nunito" pitchFamily="2" charset="0"/>
-                <a:cs typeface="Nunito" pitchFamily="2" charset="0"/>
-              </a:rPr>
-              <a:t>Necessary background information/framing of the problem.</a:t>
-            </a:r>
-          </a:p>
-          <a:p>
-            <a:pPr marL="342900" marR="0" lvl="0" indent="-342900">
-              <a:spcBef>
-                <a:spcPts val="0"/>
-              </a:spcBef>
-              <a:spcAft>
-                <a:spcPts val="0"/>
-              </a:spcAft>
-              <a:buFont typeface="+mj-lt"/>
-              <a:buAutoNum type="arabicPeriod"/>
-            </a:pPr>
-            <a:r>
-              <a:rPr lang="en-US" sz="1800" u="none" strike="noStrike">
-                <a:effectLst/>
-                <a:highlight>
-                  <a:srgbClr val="FFFF00"/>
-                </a:highlight>
-                <a:ea typeface="Nunito" pitchFamily="2" charset="0"/>
-                <a:cs typeface="Nunito" pitchFamily="2" charset="0"/>
-              </a:rPr>
-              <a:t>Include an overview of the problem in general as well as your planned approach (it is ok if this approach changes later in the project as you learn more information)</a:t>
-            </a:r>
-          </a:p>
-          <a:p>
-            <a:pPr marL="342900" marR="0" lvl="0" indent="-342900">
-              <a:spcBef>
-                <a:spcPts val="0"/>
-              </a:spcBef>
-              <a:spcAft>
-                <a:spcPts val="0"/>
-              </a:spcAft>
-              <a:buFont typeface="+mj-lt"/>
-              <a:buAutoNum type="arabicPeriod"/>
-            </a:pPr>
-            <a:r>
-              <a:rPr lang="en-US" sz="1800" u="none" strike="noStrike">
-                <a:effectLst/>
-                <a:highlight>
-                  <a:srgbClr val="FFFF00"/>
-                </a:highlight>
-                <a:ea typeface="Nunito" pitchFamily="2" charset="0"/>
-                <a:cs typeface="Nunito" pitchFamily="2" charset="0"/>
-              </a:rPr>
-              <a:t>Any initial hypotheses?</a:t>
-            </a:r>
-          </a:p>
-          <a:p>
-            <a:pPr marL="342900" marR="0" lvl="0" indent="-342900">
-              <a:spcBef>
-                <a:spcPts val="0"/>
-              </a:spcBef>
-              <a:spcAft>
-                <a:spcPts val="0"/>
-              </a:spcAft>
-              <a:buFont typeface="+mj-lt"/>
-              <a:buAutoNum type="arabicPeriod"/>
-            </a:pPr>
-            <a:r>
-              <a:rPr lang="en-US" sz="1800" u="none" strike="noStrike">
-                <a:effectLst/>
-                <a:ea typeface="Nunito" pitchFamily="2" charset="0"/>
-                <a:cs typeface="Nunito" pitchFamily="2" charset="0"/>
-              </a:rPr>
-              <a:t>What type of models do you plan to use?</a:t>
-            </a:r>
-          </a:p>
-          <a:p>
-            <a:pPr marL="342900" marR="0" lvl="0" indent="-342900">
-              <a:spcBef>
-                <a:spcPts val="0"/>
-              </a:spcBef>
-              <a:spcAft>
-                <a:spcPts val="0"/>
-              </a:spcAft>
-              <a:buFont typeface="+mj-lt"/>
-              <a:buAutoNum type="arabicPeriod"/>
-            </a:pPr>
-            <a:r>
-              <a:rPr lang="en-US" sz="1800" u="none" strike="noStrike">
-                <a:effectLst/>
-                <a:ea typeface="Nunito" pitchFamily="2" charset="0"/>
-                <a:cs typeface="Nunito" pitchFamily="2" charset="0"/>
-              </a:rPr>
-              <a:t>How has your data cleaning progressed?</a:t>
-            </a:r>
-          </a:p>
-          <a:p>
-            <a:pPr marL="342900" marR="0" lvl="0" indent="-342900">
-              <a:spcBef>
-                <a:spcPts val="0"/>
-              </a:spcBef>
-              <a:spcAft>
-                <a:spcPts val="0"/>
-              </a:spcAft>
-              <a:buFont typeface="+mj-lt"/>
-              <a:buAutoNum type="arabicPeriod"/>
-            </a:pPr>
-            <a:r>
-              <a:rPr lang="en-US" sz="1800" u="none" strike="noStrike">
-                <a:effectLst/>
-                <a:ea typeface="Nunito" pitchFamily="2" charset="0"/>
-                <a:cs typeface="Nunito" pitchFamily="2" charset="0"/>
-              </a:rPr>
-              <a:t>If you encounter any unexpected problems, challenges, or interesting findings please mention these. Discussion of things that didn’t work is also encouraged. </a:t>
-            </a:r>
-          </a:p>
-          <a:p>
-            <a:pPr marL="342900" marR="0" lvl="0" indent="-342900">
-              <a:spcBef>
-                <a:spcPts val="0"/>
-              </a:spcBef>
-              <a:spcAft>
-                <a:spcPts val="0"/>
-              </a:spcAft>
-              <a:buFont typeface="+mj-lt"/>
-              <a:buAutoNum type="arabicPeriod"/>
-            </a:pPr>
-            <a:r>
-              <a:rPr lang="en-US" sz="1800" u="none" strike="noStrike">
-                <a:effectLst/>
-                <a:ea typeface="Nunito" pitchFamily="2" charset="0"/>
-                <a:cs typeface="Nunito" pitchFamily="2" charset="0"/>
-              </a:rPr>
-              <a:t>You could include things like any new datasets that you have found, any analysis that you have done on the datasets, or any other impactful and measurable progress that you have made thus far. </a:t>
-            </a:r>
-          </a:p>
-          <a:p>
-            <a:pPr marL="342900" marR="0" lvl="0" indent="-342900">
-              <a:spcBef>
-                <a:spcPts val="0"/>
-              </a:spcBef>
-              <a:spcAft>
-                <a:spcPts val="0"/>
-              </a:spcAft>
-              <a:buFont typeface="+mj-lt"/>
-              <a:buAutoNum type="arabicPeriod"/>
-            </a:pPr>
-            <a:r>
-              <a:rPr lang="en-US" sz="1800" u="none" strike="noStrike">
-                <a:effectLst/>
-                <a:ea typeface="Nunito" pitchFamily="2" charset="0"/>
-                <a:cs typeface="Nunito" pitchFamily="2" charset="0"/>
-              </a:rPr>
-              <a:t>The team should review 2-3 research articles/papers/Kaggle kernels/ etc. related to your problem statement and then discuss them.. Be sure to cite the reference at the end of the slide show or visual medium.</a:t>
-            </a:r>
-          </a:p>
-          <a:p>
-            <a:pPr marL="342900" marR="0" lvl="0" indent="-342900">
-              <a:spcBef>
-                <a:spcPts val="0"/>
-              </a:spcBef>
-              <a:spcAft>
-                <a:spcPts val="0"/>
-              </a:spcAft>
-              <a:buFont typeface="+mj-lt"/>
-              <a:buAutoNum type="arabicPeriod"/>
-            </a:pPr>
-            <a:r>
-              <a:rPr lang="en-US" sz="1800" u="none" strike="noStrike">
-                <a:effectLst/>
-                <a:ea typeface="Nunito" pitchFamily="2" charset="0"/>
-                <a:cs typeface="Nunito" pitchFamily="2" charset="0"/>
-              </a:rPr>
-              <a:t>If you have any graphs or key visuals to include, be sure to add titles, captions, labels, axes, legends, and most importantly context where necessary!</a:t>
-            </a:r>
-          </a:p>
-          <a:p>
-            <a:pPr marL="342900" marR="0" lvl="0" indent="-342900">
-              <a:spcBef>
-                <a:spcPts val="0"/>
-              </a:spcBef>
-              <a:spcAft>
-                <a:spcPts val="0"/>
-              </a:spcAft>
-              <a:buFont typeface="+mj-lt"/>
-              <a:buAutoNum type="arabicPeriod"/>
-            </a:pPr>
-            <a:r>
-              <a:rPr lang="en-US" sz="1800" u="none" strike="noStrike">
-                <a:effectLst/>
-                <a:ea typeface="Nunito" pitchFamily="2" charset="0"/>
-                <a:cs typeface="Nunito" pitchFamily="2" charset="0"/>
-              </a:rPr>
-              <a:t>Visuals and Slides are necessary; DO NOT just read your written project proposal</a:t>
-            </a:r>
-          </a:p>
-          <a:p>
-            <a:pPr marL="342900" marR="0" lvl="0" indent="-342900">
-              <a:spcBef>
-                <a:spcPts val="0"/>
-              </a:spcBef>
-              <a:spcAft>
-                <a:spcPts val="0"/>
-              </a:spcAft>
-              <a:buFont typeface="+mj-lt"/>
-              <a:buAutoNum type="arabicPeriod"/>
-            </a:pPr>
-            <a:r>
-              <a:rPr lang="en-US" sz="1800" u="none" strike="noStrike">
-                <a:effectLst/>
-                <a:ea typeface="Nunito" pitchFamily="2" charset="0"/>
-                <a:cs typeface="Nunito" pitchFamily="2" charset="0"/>
-              </a:rPr>
-              <a:t>Include audio narration</a:t>
-            </a:r>
-          </a:p>
-          <a:p>
-            <a:pPr marL="342900" marR="0" lvl="0" indent="-342900">
-              <a:spcBef>
-                <a:spcPts val="0"/>
-              </a:spcBef>
-              <a:spcAft>
-                <a:spcPts val="0"/>
-              </a:spcAft>
-              <a:buFont typeface="+mj-lt"/>
-              <a:buAutoNum type="arabicPeriod"/>
-            </a:pPr>
-            <a:r>
-              <a:rPr lang="en-US" sz="1800" u="none" strike="noStrike">
-                <a:effectLst/>
-                <a:ea typeface="Nunito" pitchFamily="2" charset="0"/>
-                <a:cs typeface="Nunito" pitchFamily="2" charset="0"/>
-              </a:rPr>
-              <a:t>We do not require all group members to be part of the video given the limited time allocated </a:t>
-            </a:r>
-          </a:p>
-          <a:p>
-            <a:pPr marL="342900" marR="0" lvl="0" indent="-342900">
-              <a:spcBef>
-                <a:spcPts val="0"/>
-              </a:spcBef>
-              <a:spcAft>
-                <a:spcPts val="0"/>
-              </a:spcAft>
-              <a:buFont typeface="+mj-lt"/>
-              <a:buAutoNum type="arabicPeriod"/>
-            </a:pPr>
-            <a:r>
-              <a:rPr lang="en-US" sz="1800" u="none" strike="noStrike">
-                <a:effectLst/>
-                <a:ea typeface="Nunito" pitchFamily="2" charset="0"/>
-                <a:cs typeface="Nunito" pitchFamily="2" charset="0"/>
-              </a:rPr>
-              <a:t>Sources cited on the last slide (no need to read them just include them).</a:t>
-            </a:r>
-          </a:p>
-          <a:p>
-            <a:pPr marL="342900" marR="0" lvl="0" indent="-342900">
-              <a:spcBef>
-                <a:spcPts val="0"/>
-              </a:spcBef>
-              <a:spcAft>
-                <a:spcPts val="0"/>
-              </a:spcAft>
-              <a:buFont typeface="+mj-lt"/>
-              <a:buAutoNum type="arabicPeriod"/>
-            </a:pPr>
-            <a:r>
-              <a:rPr lang="en-US" sz="1800" u="none" strike="noStrike">
-                <a:effectLst/>
-                <a:ea typeface="Nunito" pitchFamily="2" charset="0"/>
-                <a:cs typeface="Nunito" pitchFamily="2" charset="0"/>
-              </a:rPr>
-              <a:t>4-5 minutes is a limited time window to cover all these things but do your best to manage this time wisely and play to your strengths and present a clear idea of your project</a:t>
-            </a:r>
-            <a:endParaRPr lang="en-US" sz="1800" u="none" strike="noStrike" dirty="0">
-              <a:effectLst/>
-              <a:ea typeface="Nunito" pitchFamily="2" charset="0"/>
-              <a:cs typeface="Nunito" pitchFamily="2" charset="0"/>
-            </a:endParaRPr>
-          </a:p>
-        </p:txBody>
-      </p:sp>
+          <p:cNvPicPr>
+            <a:picLocks noGrp="1" noChangeAspect="1"/>
+          </p:cNvPicPr>
+          <p:nvPr>
+            <p:ph sz="half" idx="1"/>
+          </p:nvPr>
+        </p:nvPicPr>
+        <p:blipFill>
+          <a:blip r:embed="rId2"/>
+          <a:stretch>
+            <a:fillRect/>
+          </a:stretch>
+        </p:blipFill>
+        <p:spPr>
+          <a:xfrm>
+            <a:off x="3867150" y="991287"/>
+            <a:ext cx="3475038" cy="4875426"/>
+          </a:xfrm>
+          <a:prstGeom prst="rect">
+            <a:avLst/>
+          </a:prstGeom>
+        </p:spPr>
+      </p:pic>
+      <p:pic>
+        <p:nvPicPr>
+          <p:cNvPr id="10" name="Content Placeholder 9">
+            <a:extLst>
+              <a:ext uri="{FF2B5EF4-FFF2-40B4-BE49-F238E27FC236}">
+                <a16:creationId xmlns:a16="http://schemas.microsoft.com/office/drawing/2014/main" id="{89EDAAF1-3AA2-4A48-8A41-B4DFC826B9B7}"/>
+              </a:ext>
+            </a:extLst>
+          </p:cNvPr>
+          <p:cNvPicPr>
+            <a:picLocks noGrp="1" noChangeAspect="1"/>
+          </p:cNvPicPr>
+          <p:nvPr>
+            <p:ph sz="half" idx="2"/>
+          </p:nvPr>
+        </p:nvPicPr>
+        <p:blipFill>
+          <a:blip r:embed="rId3"/>
+          <a:stretch>
+            <a:fillRect/>
+          </a:stretch>
+        </p:blipFill>
+        <p:spPr>
+          <a:xfrm>
+            <a:off x="7818438" y="1036028"/>
+            <a:ext cx="3475037" cy="4785944"/>
+          </a:xfrm>
+          <a:prstGeom prst="rect">
+            <a:avLst/>
+          </a:prstGeom>
+        </p:spPr>
+      </p:pic>
     </p:spTree>
     <p:extLst>
       <p:ext uri="{BB962C8B-B14F-4D97-AF65-F5344CB8AC3E}">
-        <p14:creationId xmlns:p14="http://schemas.microsoft.com/office/powerpoint/2010/main" val="2259079471"/>
+        <p14:creationId xmlns:p14="http://schemas.microsoft.com/office/powerpoint/2010/main" val="521541812"/>
+      </p:ext>
+    </p:extLst>
+  </p:cSld>
+  <p:clrMapOvr>
+    <a:masterClrMapping/>
+  </p:clrMapOvr>
+</p:sld>
+</file>
+
+<file path=ppt/slides/slide9.xml><?xml version="1.0" encoding="utf-8"?>
+<p:sld xmlns:a="http://schemas.openxmlformats.org/drawingml/2006/main" xmlns:r="http://schemas.openxmlformats.org/officeDocument/2006/relationships" xmlns:p="http://schemas.openxmlformats.org/presentationml/2006/main">
+  <p:cSld>
+    <p:spTree>
+      <p:nvGrpSpPr>
+        <p:cNvPr id="1" name=""/>
+        <p:cNvGrpSpPr/>
+        <p:nvPr/>
+      </p:nvGrpSpPr>
+      <p:grpSpPr>
+        <a:xfrm>
+          <a:off x="0" y="0"/>
+          <a:ext cx="0" cy="0"/>
+          <a:chOff x="0" y="0"/>
+          <a:chExt cx="0" cy="0"/>
+        </a:xfrm>
+      </p:grpSpPr>
+      <p:sp>
+        <p:nvSpPr>
+          <p:cNvPr id="2" name="Title 1">
+            <a:extLst>
+              <a:ext uri="{FF2B5EF4-FFF2-40B4-BE49-F238E27FC236}">
+                <a16:creationId xmlns:a16="http://schemas.microsoft.com/office/drawing/2014/main" id="{BC8107AF-A697-F007-FBC6-663EEACE8539}"/>
+              </a:ext>
+            </a:extLst>
+          </p:cNvPr>
+          <p:cNvSpPr>
+            <a:spLocks noGrp="1"/>
+          </p:cNvSpPr>
+          <p:nvPr>
+            <p:ph type="title"/>
+          </p:nvPr>
+        </p:nvSpPr>
+        <p:spPr/>
+        <p:txBody>
+          <a:bodyPr/>
+          <a:lstStyle/>
+          <a:p>
+            <a:r>
+              <a:rPr lang="en-US" dirty="0"/>
+              <a:t>Modelling</a:t>
+            </a:r>
+          </a:p>
+        </p:txBody>
+      </p:sp>
+      <p:sp>
+        <p:nvSpPr>
+          <p:cNvPr id="3" name="Content Placeholder 2">
+            <a:extLst>
+              <a:ext uri="{FF2B5EF4-FFF2-40B4-BE49-F238E27FC236}">
+                <a16:creationId xmlns:a16="http://schemas.microsoft.com/office/drawing/2014/main" id="{AC68744F-2AB0-9C00-83B2-5DA833BC80DC}"/>
+              </a:ext>
+            </a:extLst>
+          </p:cNvPr>
+          <p:cNvSpPr>
+            <a:spLocks noGrp="1"/>
+          </p:cNvSpPr>
+          <p:nvPr>
+            <p:ph idx="1"/>
+          </p:nvPr>
+        </p:nvSpPr>
+        <p:spPr/>
+        <p:txBody>
+          <a:bodyPr>
+            <a:normAutofit/>
+          </a:bodyPr>
+          <a:lstStyle/>
+          <a:p>
+            <a:pPr algn="l"/>
+            <a:r>
+              <a:rPr lang="en-US" dirty="0"/>
+              <a:t>Logistic Regression - Analysis of Distributions for possible transformations, Consider Regularization</a:t>
+            </a:r>
+          </a:p>
+          <a:p>
+            <a:pPr lvl="1"/>
+            <a:r>
+              <a:rPr lang="en-US" dirty="0"/>
+              <a:t>Look at magnitude of coefficients</a:t>
+            </a:r>
+          </a:p>
+          <a:p>
+            <a:pPr lvl="1"/>
+            <a:r>
+              <a:rPr lang="en-US" dirty="0"/>
+              <a:t>Compare results of transformed vs non-transformed data</a:t>
+            </a:r>
+          </a:p>
+          <a:p>
+            <a:pPr lvl="1"/>
+            <a:r>
+              <a:rPr lang="en-US" dirty="0"/>
+              <a:t>Run diagnostics</a:t>
+            </a:r>
+          </a:p>
+          <a:p>
+            <a:pPr lvl="1"/>
+            <a:r>
+              <a:rPr lang="en-US" dirty="0"/>
+              <a:t>Apply transformations as needed</a:t>
+            </a:r>
+          </a:p>
+          <a:p>
+            <a:pPr algn="l"/>
+            <a:r>
+              <a:rPr lang="en-US" dirty="0"/>
+              <a:t>Random Forest </a:t>
+            </a:r>
+          </a:p>
+          <a:p>
+            <a:pPr lvl="1"/>
+            <a:r>
+              <a:rPr lang="en-US" dirty="0"/>
+              <a:t>Discover relative feature importance.</a:t>
+            </a:r>
+          </a:p>
+          <a:p>
+            <a:pPr algn="l"/>
+            <a:r>
+              <a:rPr lang="en-US" dirty="0"/>
+              <a:t>Support Vector Machines</a:t>
+            </a:r>
+          </a:p>
+          <a:p>
+            <a:pPr lvl="1"/>
+            <a:r>
+              <a:rPr lang="en-US" dirty="0"/>
+              <a:t>Analysis of Distributions for possible transformations, Center and Scale Data, Optimal Choice of Kernal, Optimal Value of C/lambda.</a:t>
+            </a:r>
+          </a:p>
+          <a:p>
+            <a:pPr algn="l"/>
+            <a:r>
+              <a:rPr lang="en-US" dirty="0"/>
+              <a:t>The models will be compared using ROC-AUC on a reserved validation set.</a:t>
+            </a:r>
+          </a:p>
+        </p:txBody>
+      </p:sp>
+    </p:spTree>
+    <p:extLst>
+      <p:ext uri="{BB962C8B-B14F-4D97-AF65-F5344CB8AC3E}">
+        <p14:creationId xmlns:p14="http://schemas.microsoft.com/office/powerpoint/2010/main" val="2760735355"/>
       </p:ext>
     </p:extLst>
   </p:cSld>

</xml_diff>

<commit_message>
made updates per chat feedback
</commit_message>
<xml_diff>
--- a/Project Proposal/Team_6_Prop_Vid_Slides.pptx
+++ b/Project Proposal/Team_6_Prop_Vid_Slides.pptx
@@ -4,6 +4,9 @@
   <p:sldMasterIdLst>
     <p:sldMasterId id="2147483797" r:id="rId1"/>
   </p:sldMasterIdLst>
+  <p:notesMasterIdLst>
+    <p:notesMasterId r:id="rId15"/>
+  </p:notesMasterIdLst>
   <p:sldIdLst>
     <p:sldId id="256" r:id="rId2"/>
     <p:sldId id="258" r:id="rId3"/>
@@ -13,10 +16,11 @@
     <p:sldId id="261" r:id="rId7"/>
     <p:sldId id="266" r:id="rId8"/>
     <p:sldId id="267" r:id="rId9"/>
-    <p:sldId id="263" r:id="rId10"/>
-    <p:sldId id="262" r:id="rId11"/>
-    <p:sldId id="260" r:id="rId12"/>
-    <p:sldId id="257" r:id="rId13"/>
+    <p:sldId id="268" r:id="rId10"/>
+    <p:sldId id="263" r:id="rId11"/>
+    <p:sldId id="262" r:id="rId12"/>
+    <p:sldId id="260" r:id="rId13"/>
+    <p:sldId id="257" r:id="rId14"/>
   </p:sldIdLst>
   <p:sldSz cx="12192000" cy="6858000"/>
   <p:notesSz cx="6858000" cy="9144000"/>
@@ -246,6 +250,1044 @@
 </p188:cmLst>
 </file>
 
+<file path=ppt/notesMasters/notesMaster1.xml><?xml version="1.0" encoding="utf-8"?>
+<p:notesMaster xmlns:a="http://schemas.openxmlformats.org/drawingml/2006/main" xmlns:r="http://schemas.openxmlformats.org/officeDocument/2006/relationships" xmlns:p="http://schemas.openxmlformats.org/presentationml/2006/main">
+  <p:cSld>
+    <p:bg>
+      <p:bgRef idx="1001">
+        <a:schemeClr val="bg1"/>
+      </p:bgRef>
+    </p:bg>
+    <p:spTree>
+      <p:nvGrpSpPr>
+        <p:cNvPr id="1" name=""/>
+        <p:cNvGrpSpPr/>
+        <p:nvPr/>
+      </p:nvGrpSpPr>
+      <p:grpSpPr>
+        <a:xfrm>
+          <a:off x="0" y="0"/>
+          <a:ext cx="0" cy="0"/>
+          <a:chOff x="0" y="0"/>
+          <a:chExt cx="0" cy="0"/>
+        </a:xfrm>
+      </p:grpSpPr>
+      <p:sp>
+        <p:nvSpPr>
+          <p:cNvPr id="2" name="Header Placeholder 1"/>
+          <p:cNvSpPr>
+            <a:spLocks noGrp="1"/>
+          </p:cNvSpPr>
+          <p:nvPr>
+            <p:ph type="hdr" sz="quarter"/>
+          </p:nvPr>
+        </p:nvSpPr>
+        <p:spPr>
+          <a:xfrm>
+            <a:off x="0" y="0"/>
+            <a:ext cx="2971800" cy="458788"/>
+          </a:xfrm>
+          <a:prstGeom prst="rect">
+            <a:avLst/>
+          </a:prstGeom>
+        </p:spPr>
+        <p:txBody>
+          <a:bodyPr vert="horz" lIns="91440" tIns="45720" rIns="91440" bIns="45720" rtlCol="0"/>
+          <a:lstStyle>
+            <a:lvl1pPr algn="l">
+              <a:defRPr sz="1200"/>
+            </a:lvl1pPr>
+          </a:lstStyle>
+          <a:p>
+            <a:endParaRPr lang="en-US"/>
+          </a:p>
+        </p:txBody>
+      </p:sp>
+      <p:sp>
+        <p:nvSpPr>
+          <p:cNvPr id="3" name="Date Placeholder 2"/>
+          <p:cNvSpPr>
+            <a:spLocks noGrp="1"/>
+          </p:cNvSpPr>
+          <p:nvPr>
+            <p:ph type="dt" idx="1"/>
+          </p:nvPr>
+        </p:nvSpPr>
+        <p:spPr>
+          <a:xfrm>
+            <a:off x="3884613" y="0"/>
+            <a:ext cx="2971800" cy="458788"/>
+          </a:xfrm>
+          <a:prstGeom prst="rect">
+            <a:avLst/>
+          </a:prstGeom>
+        </p:spPr>
+        <p:txBody>
+          <a:bodyPr vert="horz" lIns="91440" tIns="45720" rIns="91440" bIns="45720" rtlCol="0"/>
+          <a:lstStyle>
+            <a:lvl1pPr algn="r">
+              <a:defRPr sz="1200"/>
+            </a:lvl1pPr>
+          </a:lstStyle>
+          <a:p>
+            <a:fld id="{9824F8DB-2990-4811-82DD-7422336D885B}" type="datetimeFigureOut">
+              <a:rPr lang="en-US" smtClean="0"/>
+              <a:t>6/28/2023</a:t>
+            </a:fld>
+            <a:endParaRPr lang="en-US"/>
+          </a:p>
+        </p:txBody>
+      </p:sp>
+      <p:sp>
+        <p:nvSpPr>
+          <p:cNvPr id="4" name="Slide Image Placeholder 3"/>
+          <p:cNvSpPr>
+            <a:spLocks noGrp="1" noRot="1" noChangeAspect="1"/>
+          </p:cNvSpPr>
+          <p:nvPr>
+            <p:ph type="sldImg" idx="2"/>
+          </p:nvPr>
+        </p:nvSpPr>
+        <p:spPr>
+          <a:xfrm>
+            <a:off x="685800" y="1143000"/>
+            <a:ext cx="5486400" cy="3086100"/>
+          </a:xfrm>
+          <a:prstGeom prst="rect">
+            <a:avLst/>
+          </a:prstGeom>
+          <a:noFill/>
+          <a:ln w="12700">
+            <a:solidFill>
+              <a:prstClr val="black"/>
+            </a:solidFill>
+          </a:ln>
+        </p:spPr>
+        <p:txBody>
+          <a:bodyPr vert="horz" lIns="91440" tIns="45720" rIns="91440" bIns="45720" rtlCol="0" anchor="ctr"/>
+          <a:lstStyle/>
+          <a:p>
+            <a:endParaRPr lang="en-US"/>
+          </a:p>
+        </p:txBody>
+      </p:sp>
+      <p:sp>
+        <p:nvSpPr>
+          <p:cNvPr id="5" name="Notes Placeholder 4"/>
+          <p:cNvSpPr>
+            <a:spLocks noGrp="1"/>
+          </p:cNvSpPr>
+          <p:nvPr>
+            <p:ph type="body" sz="quarter" idx="3"/>
+          </p:nvPr>
+        </p:nvSpPr>
+        <p:spPr>
+          <a:xfrm>
+            <a:off x="685800" y="4400550"/>
+            <a:ext cx="5486400" cy="3600450"/>
+          </a:xfrm>
+          <a:prstGeom prst="rect">
+            <a:avLst/>
+          </a:prstGeom>
+        </p:spPr>
+        <p:txBody>
+          <a:bodyPr vert="horz" lIns="91440" tIns="45720" rIns="91440" bIns="45720" rtlCol="0"/>
+          <a:lstStyle/>
+          <a:p>
+            <a:pPr lvl="0"/>
+            <a:r>
+              <a:rPr lang="en-US"/>
+              <a:t>Click to edit Master text styles</a:t>
+            </a:r>
+          </a:p>
+          <a:p>
+            <a:pPr lvl="1"/>
+            <a:r>
+              <a:rPr lang="en-US"/>
+              <a:t>Second level</a:t>
+            </a:r>
+          </a:p>
+          <a:p>
+            <a:pPr lvl="2"/>
+            <a:r>
+              <a:rPr lang="en-US"/>
+              <a:t>Third level</a:t>
+            </a:r>
+          </a:p>
+          <a:p>
+            <a:pPr lvl="3"/>
+            <a:r>
+              <a:rPr lang="en-US"/>
+              <a:t>Fourth level</a:t>
+            </a:r>
+          </a:p>
+          <a:p>
+            <a:pPr lvl="4"/>
+            <a:r>
+              <a:rPr lang="en-US"/>
+              <a:t>Fifth level</a:t>
+            </a:r>
+          </a:p>
+        </p:txBody>
+      </p:sp>
+      <p:sp>
+        <p:nvSpPr>
+          <p:cNvPr id="6" name="Footer Placeholder 5"/>
+          <p:cNvSpPr>
+            <a:spLocks noGrp="1"/>
+          </p:cNvSpPr>
+          <p:nvPr>
+            <p:ph type="ftr" sz="quarter" idx="4"/>
+          </p:nvPr>
+        </p:nvSpPr>
+        <p:spPr>
+          <a:xfrm>
+            <a:off x="0" y="8685213"/>
+            <a:ext cx="2971800" cy="458787"/>
+          </a:xfrm>
+          <a:prstGeom prst="rect">
+            <a:avLst/>
+          </a:prstGeom>
+        </p:spPr>
+        <p:txBody>
+          <a:bodyPr vert="horz" lIns="91440" tIns="45720" rIns="91440" bIns="45720" rtlCol="0" anchor="b"/>
+          <a:lstStyle>
+            <a:lvl1pPr algn="l">
+              <a:defRPr sz="1200"/>
+            </a:lvl1pPr>
+          </a:lstStyle>
+          <a:p>
+            <a:endParaRPr lang="en-US"/>
+          </a:p>
+        </p:txBody>
+      </p:sp>
+      <p:sp>
+        <p:nvSpPr>
+          <p:cNvPr id="7" name="Slide Number Placeholder 6"/>
+          <p:cNvSpPr>
+            <a:spLocks noGrp="1"/>
+          </p:cNvSpPr>
+          <p:nvPr>
+            <p:ph type="sldNum" sz="quarter" idx="5"/>
+          </p:nvPr>
+        </p:nvSpPr>
+        <p:spPr>
+          <a:xfrm>
+            <a:off x="3884613" y="8685213"/>
+            <a:ext cx="2971800" cy="458787"/>
+          </a:xfrm>
+          <a:prstGeom prst="rect">
+            <a:avLst/>
+          </a:prstGeom>
+        </p:spPr>
+        <p:txBody>
+          <a:bodyPr vert="horz" lIns="91440" tIns="45720" rIns="91440" bIns="45720" rtlCol="0" anchor="b"/>
+          <a:lstStyle>
+            <a:lvl1pPr algn="r">
+              <a:defRPr sz="1200"/>
+            </a:lvl1pPr>
+          </a:lstStyle>
+          <a:p>
+            <a:fld id="{9BCCD4D3-9FFD-4D42-BD91-737D0D78D7F6}" type="slidenum">
+              <a:rPr lang="en-US" smtClean="0"/>
+              <a:t>‹#›</a:t>
+            </a:fld>
+            <a:endParaRPr lang="en-US"/>
+          </a:p>
+        </p:txBody>
+      </p:sp>
+    </p:spTree>
+    <p:extLst>
+      <p:ext uri="{BB962C8B-B14F-4D97-AF65-F5344CB8AC3E}">
+        <p14:creationId xmlns:p14="http://schemas.microsoft.com/office/powerpoint/2010/main" val="1341347727"/>
+      </p:ext>
+    </p:extLst>
+  </p:cSld>
+  <p:clrMap bg1="lt1" tx1="dk1" bg2="lt2" tx2="dk2" accent1="accent1" accent2="accent2" accent3="accent3" accent4="accent4" accent5="accent5" accent6="accent6" hlink="hlink" folHlink="folHlink"/>
+  <p:notesStyle>
+    <a:lvl1pPr marL="0" algn="l" defTabSz="914400" rtl="0" eaLnBrk="1" latinLnBrk="0" hangingPunct="1">
+      <a:defRPr sz="1200" kern="1200">
+        <a:solidFill>
+          <a:schemeClr val="tx1"/>
+        </a:solidFill>
+        <a:latin typeface="+mn-lt"/>
+        <a:ea typeface="+mn-ea"/>
+        <a:cs typeface="+mn-cs"/>
+      </a:defRPr>
+    </a:lvl1pPr>
+    <a:lvl2pPr marL="457200" algn="l" defTabSz="914400" rtl="0" eaLnBrk="1" latinLnBrk="0" hangingPunct="1">
+      <a:defRPr sz="1200" kern="1200">
+        <a:solidFill>
+          <a:schemeClr val="tx1"/>
+        </a:solidFill>
+        <a:latin typeface="+mn-lt"/>
+        <a:ea typeface="+mn-ea"/>
+        <a:cs typeface="+mn-cs"/>
+      </a:defRPr>
+    </a:lvl2pPr>
+    <a:lvl3pPr marL="914400" algn="l" defTabSz="914400" rtl="0" eaLnBrk="1" latinLnBrk="0" hangingPunct="1">
+      <a:defRPr sz="1200" kern="1200">
+        <a:solidFill>
+          <a:schemeClr val="tx1"/>
+        </a:solidFill>
+        <a:latin typeface="+mn-lt"/>
+        <a:ea typeface="+mn-ea"/>
+        <a:cs typeface="+mn-cs"/>
+      </a:defRPr>
+    </a:lvl3pPr>
+    <a:lvl4pPr marL="1371600" algn="l" defTabSz="914400" rtl="0" eaLnBrk="1" latinLnBrk="0" hangingPunct="1">
+      <a:defRPr sz="1200" kern="1200">
+        <a:solidFill>
+          <a:schemeClr val="tx1"/>
+        </a:solidFill>
+        <a:latin typeface="+mn-lt"/>
+        <a:ea typeface="+mn-ea"/>
+        <a:cs typeface="+mn-cs"/>
+      </a:defRPr>
+    </a:lvl4pPr>
+    <a:lvl5pPr marL="1828800" algn="l" defTabSz="914400" rtl="0" eaLnBrk="1" latinLnBrk="0" hangingPunct="1">
+      <a:defRPr sz="1200" kern="1200">
+        <a:solidFill>
+          <a:schemeClr val="tx1"/>
+        </a:solidFill>
+        <a:latin typeface="+mn-lt"/>
+        <a:ea typeface="+mn-ea"/>
+        <a:cs typeface="+mn-cs"/>
+      </a:defRPr>
+    </a:lvl5pPr>
+    <a:lvl6pPr marL="2286000" algn="l" defTabSz="914400" rtl="0" eaLnBrk="1" latinLnBrk="0" hangingPunct="1">
+      <a:defRPr sz="1200" kern="1200">
+        <a:solidFill>
+          <a:schemeClr val="tx1"/>
+        </a:solidFill>
+        <a:latin typeface="+mn-lt"/>
+        <a:ea typeface="+mn-ea"/>
+        <a:cs typeface="+mn-cs"/>
+      </a:defRPr>
+    </a:lvl6pPr>
+    <a:lvl7pPr marL="2743200" algn="l" defTabSz="914400" rtl="0" eaLnBrk="1" latinLnBrk="0" hangingPunct="1">
+      <a:defRPr sz="1200" kern="1200">
+        <a:solidFill>
+          <a:schemeClr val="tx1"/>
+        </a:solidFill>
+        <a:latin typeface="+mn-lt"/>
+        <a:ea typeface="+mn-ea"/>
+        <a:cs typeface="+mn-cs"/>
+      </a:defRPr>
+    </a:lvl7pPr>
+    <a:lvl8pPr marL="3200400" algn="l" defTabSz="914400" rtl="0" eaLnBrk="1" latinLnBrk="0" hangingPunct="1">
+      <a:defRPr sz="1200" kern="1200">
+        <a:solidFill>
+          <a:schemeClr val="tx1"/>
+        </a:solidFill>
+        <a:latin typeface="+mn-lt"/>
+        <a:ea typeface="+mn-ea"/>
+        <a:cs typeface="+mn-cs"/>
+      </a:defRPr>
+    </a:lvl8pPr>
+    <a:lvl9pPr marL="3657600" algn="l" defTabSz="914400" rtl="0" eaLnBrk="1" latinLnBrk="0" hangingPunct="1">
+      <a:defRPr sz="1200" kern="1200">
+        <a:solidFill>
+          <a:schemeClr val="tx1"/>
+        </a:solidFill>
+        <a:latin typeface="+mn-lt"/>
+        <a:ea typeface="+mn-ea"/>
+        <a:cs typeface="+mn-cs"/>
+      </a:defRPr>
+    </a:lvl9pPr>
+  </p:notesStyle>
+</p:notesMaster>
+</file>
+
+<file path=ppt/notesSlides/notesSlide1.xml><?xml version="1.0" encoding="utf-8"?>
+<p:notes xmlns:a="http://schemas.openxmlformats.org/drawingml/2006/main" xmlns:r="http://schemas.openxmlformats.org/officeDocument/2006/relationships" xmlns:p="http://schemas.openxmlformats.org/presentationml/2006/main">
+  <p:cSld>
+    <p:spTree>
+      <p:nvGrpSpPr>
+        <p:cNvPr id="1" name=""/>
+        <p:cNvGrpSpPr/>
+        <p:nvPr/>
+      </p:nvGrpSpPr>
+      <p:grpSpPr>
+        <a:xfrm>
+          <a:off x="0" y="0"/>
+          <a:ext cx="0" cy="0"/>
+          <a:chOff x="0" y="0"/>
+          <a:chExt cx="0" cy="0"/>
+        </a:xfrm>
+      </p:grpSpPr>
+      <p:sp>
+        <p:nvSpPr>
+          <p:cNvPr id="2" name="Slide Image Placeholder 1"/>
+          <p:cNvSpPr>
+            <a:spLocks noGrp="1" noRot="1" noChangeAspect="1"/>
+          </p:cNvSpPr>
+          <p:nvPr>
+            <p:ph type="sldImg"/>
+          </p:nvPr>
+        </p:nvSpPr>
+        <p:spPr/>
+      </p:sp>
+      <p:sp>
+        <p:nvSpPr>
+          <p:cNvPr id="3" name="Notes Placeholder 2"/>
+          <p:cNvSpPr>
+            <a:spLocks noGrp="1"/>
+          </p:cNvSpPr>
+          <p:nvPr>
+            <p:ph type="body" idx="1"/>
+          </p:nvPr>
+        </p:nvSpPr>
+        <p:spPr/>
+        <p:txBody>
+          <a:bodyPr/>
+          <a:lstStyle/>
+          <a:p>
+            <a:r>
+              <a:rPr lang="en-US" dirty="0"/>
+              <a:t>Mention my name</a:t>
+            </a:r>
+          </a:p>
+        </p:txBody>
+      </p:sp>
+      <p:sp>
+        <p:nvSpPr>
+          <p:cNvPr id="4" name="Slide Number Placeholder 3"/>
+          <p:cNvSpPr>
+            <a:spLocks noGrp="1"/>
+          </p:cNvSpPr>
+          <p:nvPr>
+            <p:ph type="sldNum" sz="quarter" idx="5"/>
+          </p:nvPr>
+        </p:nvSpPr>
+        <p:spPr/>
+        <p:txBody>
+          <a:bodyPr/>
+          <a:lstStyle/>
+          <a:p>
+            <a:fld id="{9BCCD4D3-9FFD-4D42-BD91-737D0D78D7F6}" type="slidenum">
+              <a:rPr lang="en-US" smtClean="0"/>
+              <a:t>1</a:t>
+            </a:fld>
+            <a:endParaRPr lang="en-US"/>
+          </a:p>
+        </p:txBody>
+      </p:sp>
+    </p:spTree>
+    <p:extLst>
+      <p:ext uri="{BB962C8B-B14F-4D97-AF65-F5344CB8AC3E}">
+        <p14:creationId xmlns:p14="http://schemas.microsoft.com/office/powerpoint/2010/main" val="3374152061"/>
+      </p:ext>
+    </p:extLst>
+  </p:cSld>
+  <p:clrMapOvr>
+    <a:masterClrMapping/>
+  </p:clrMapOvr>
+</p:notes>
+</file>
+
+<file path=ppt/notesSlides/notesSlide2.xml><?xml version="1.0" encoding="utf-8"?>
+<p:notes xmlns:a="http://schemas.openxmlformats.org/drawingml/2006/main" xmlns:r="http://schemas.openxmlformats.org/officeDocument/2006/relationships" xmlns:p="http://schemas.openxmlformats.org/presentationml/2006/main">
+  <p:cSld>
+    <p:spTree>
+      <p:nvGrpSpPr>
+        <p:cNvPr id="1" name=""/>
+        <p:cNvGrpSpPr/>
+        <p:nvPr/>
+      </p:nvGrpSpPr>
+      <p:grpSpPr>
+        <a:xfrm>
+          <a:off x="0" y="0"/>
+          <a:ext cx="0" cy="0"/>
+          <a:chOff x="0" y="0"/>
+          <a:chExt cx="0" cy="0"/>
+        </a:xfrm>
+      </p:grpSpPr>
+      <p:sp>
+        <p:nvSpPr>
+          <p:cNvPr id="2" name="Slide Image Placeholder 1"/>
+          <p:cNvSpPr>
+            <a:spLocks noGrp="1" noRot="1" noChangeAspect="1"/>
+          </p:cNvSpPr>
+          <p:nvPr>
+            <p:ph type="sldImg"/>
+          </p:nvPr>
+        </p:nvSpPr>
+        <p:spPr/>
+      </p:sp>
+      <p:sp>
+        <p:nvSpPr>
+          <p:cNvPr id="3" name="Notes Placeholder 2"/>
+          <p:cNvSpPr>
+            <a:spLocks noGrp="1"/>
+          </p:cNvSpPr>
+          <p:nvPr>
+            <p:ph type="body" idx="1"/>
+          </p:nvPr>
+        </p:nvSpPr>
+        <p:spPr/>
+        <p:txBody>
+          <a:bodyPr/>
+          <a:lstStyle/>
+          <a:p>
+            <a:r>
+              <a:rPr lang="en-US" sz="1800" dirty="0">
+                <a:effectLst/>
+                <a:latin typeface="Segoe UI" panose="020B0502040204020203" pitchFamily="34" charset="0"/>
+              </a:rPr>
+              <a:t>Mention that satisfaction is the target value.</a:t>
+            </a:r>
+            <a:endParaRPr lang="en-US" dirty="0"/>
+          </a:p>
+        </p:txBody>
+      </p:sp>
+      <p:sp>
+        <p:nvSpPr>
+          <p:cNvPr id="4" name="Slide Number Placeholder 3"/>
+          <p:cNvSpPr>
+            <a:spLocks noGrp="1"/>
+          </p:cNvSpPr>
+          <p:nvPr>
+            <p:ph type="sldNum" sz="quarter" idx="5"/>
+          </p:nvPr>
+        </p:nvSpPr>
+        <p:spPr/>
+        <p:txBody>
+          <a:bodyPr/>
+          <a:lstStyle/>
+          <a:p>
+            <a:fld id="{9BCCD4D3-9FFD-4D42-BD91-737D0D78D7F6}" type="slidenum">
+              <a:rPr lang="en-US" smtClean="0"/>
+              <a:t>3</a:t>
+            </a:fld>
+            <a:endParaRPr lang="en-US"/>
+          </a:p>
+        </p:txBody>
+      </p:sp>
+    </p:spTree>
+    <p:extLst>
+      <p:ext uri="{BB962C8B-B14F-4D97-AF65-F5344CB8AC3E}">
+        <p14:creationId xmlns:p14="http://schemas.microsoft.com/office/powerpoint/2010/main" val="654713510"/>
+      </p:ext>
+    </p:extLst>
+  </p:cSld>
+  <p:clrMapOvr>
+    <a:masterClrMapping/>
+  </p:clrMapOvr>
+</p:notes>
+</file>
+
+<file path=ppt/notesSlides/notesSlide3.xml><?xml version="1.0" encoding="utf-8"?>
+<p:notes xmlns:a="http://schemas.openxmlformats.org/drawingml/2006/main" xmlns:r="http://schemas.openxmlformats.org/officeDocument/2006/relationships" xmlns:p="http://schemas.openxmlformats.org/presentationml/2006/main">
+  <p:cSld>
+    <p:spTree>
+      <p:nvGrpSpPr>
+        <p:cNvPr id="1" name=""/>
+        <p:cNvGrpSpPr/>
+        <p:nvPr/>
+      </p:nvGrpSpPr>
+      <p:grpSpPr>
+        <a:xfrm>
+          <a:off x="0" y="0"/>
+          <a:ext cx="0" cy="0"/>
+          <a:chOff x="0" y="0"/>
+          <a:chExt cx="0" cy="0"/>
+        </a:xfrm>
+      </p:grpSpPr>
+      <p:sp>
+        <p:nvSpPr>
+          <p:cNvPr id="2" name="Slide Image Placeholder 1"/>
+          <p:cNvSpPr>
+            <a:spLocks noGrp="1" noRot="1" noChangeAspect="1"/>
+          </p:cNvSpPr>
+          <p:nvPr>
+            <p:ph type="sldImg"/>
+          </p:nvPr>
+        </p:nvSpPr>
+        <p:spPr/>
+      </p:sp>
+      <p:sp>
+        <p:nvSpPr>
+          <p:cNvPr id="3" name="Notes Placeholder 2"/>
+          <p:cNvSpPr>
+            <a:spLocks noGrp="1"/>
+          </p:cNvSpPr>
+          <p:nvPr>
+            <p:ph type="body" idx="1"/>
+          </p:nvPr>
+        </p:nvSpPr>
+        <p:spPr/>
+        <p:txBody>
+          <a:bodyPr/>
+          <a:lstStyle/>
+          <a:p>
+            <a:r>
+              <a:rPr lang="en-US" sz="1800" dirty="0">
+                <a:effectLst/>
+                <a:latin typeface="Segoe UI" panose="020B0502040204020203" pitchFamily="34" charset="0"/>
+              </a:rPr>
+              <a:t>Getting rid of arrival time because it is highly correlated and has a lot of NA values.</a:t>
+            </a:r>
+            <a:endParaRPr lang="en-US" dirty="0"/>
+          </a:p>
+        </p:txBody>
+      </p:sp>
+      <p:sp>
+        <p:nvSpPr>
+          <p:cNvPr id="4" name="Slide Number Placeholder 3"/>
+          <p:cNvSpPr>
+            <a:spLocks noGrp="1"/>
+          </p:cNvSpPr>
+          <p:nvPr>
+            <p:ph type="sldNum" sz="quarter" idx="5"/>
+          </p:nvPr>
+        </p:nvSpPr>
+        <p:spPr/>
+        <p:txBody>
+          <a:bodyPr/>
+          <a:lstStyle/>
+          <a:p>
+            <a:fld id="{9BCCD4D3-9FFD-4D42-BD91-737D0D78D7F6}" type="slidenum">
+              <a:rPr lang="en-US" smtClean="0"/>
+              <a:t>5</a:t>
+            </a:fld>
+            <a:endParaRPr lang="en-US"/>
+          </a:p>
+        </p:txBody>
+      </p:sp>
+    </p:spTree>
+    <p:extLst>
+      <p:ext uri="{BB962C8B-B14F-4D97-AF65-F5344CB8AC3E}">
+        <p14:creationId xmlns:p14="http://schemas.microsoft.com/office/powerpoint/2010/main" val="3406354395"/>
+      </p:ext>
+    </p:extLst>
+  </p:cSld>
+  <p:clrMapOvr>
+    <a:masterClrMapping/>
+  </p:clrMapOvr>
+</p:notes>
+</file>
+
+<file path=ppt/notesSlides/notesSlide4.xml><?xml version="1.0" encoding="utf-8"?>
+<p:notes xmlns:a="http://schemas.openxmlformats.org/drawingml/2006/main" xmlns:r="http://schemas.openxmlformats.org/officeDocument/2006/relationships" xmlns:p="http://schemas.openxmlformats.org/presentationml/2006/main">
+  <p:cSld>
+    <p:spTree>
+      <p:nvGrpSpPr>
+        <p:cNvPr id="1" name=""/>
+        <p:cNvGrpSpPr/>
+        <p:nvPr/>
+      </p:nvGrpSpPr>
+      <p:grpSpPr>
+        <a:xfrm>
+          <a:off x="0" y="0"/>
+          <a:ext cx="0" cy="0"/>
+          <a:chOff x="0" y="0"/>
+          <a:chExt cx="0" cy="0"/>
+        </a:xfrm>
+      </p:grpSpPr>
+      <p:sp>
+        <p:nvSpPr>
+          <p:cNvPr id="2" name="Slide Image Placeholder 1"/>
+          <p:cNvSpPr>
+            <a:spLocks noGrp="1" noRot="1" noChangeAspect="1"/>
+          </p:cNvSpPr>
+          <p:nvPr>
+            <p:ph type="sldImg"/>
+          </p:nvPr>
+        </p:nvSpPr>
+        <p:spPr/>
+      </p:sp>
+      <p:sp>
+        <p:nvSpPr>
+          <p:cNvPr id="3" name="Notes Placeholder 2"/>
+          <p:cNvSpPr>
+            <a:spLocks noGrp="1"/>
+          </p:cNvSpPr>
+          <p:nvPr>
+            <p:ph type="body" idx="1"/>
+          </p:nvPr>
+        </p:nvSpPr>
+        <p:spPr/>
+        <p:txBody>
+          <a:bodyPr/>
+          <a:lstStyle/>
+          <a:p>
+            <a:r>
+              <a:rPr lang="en-US" sz="1800" dirty="0">
+                <a:effectLst/>
+                <a:latin typeface="Segoe UI" panose="020B0502040204020203" pitchFamily="34" charset="0"/>
+              </a:rPr>
+              <a:t>Data is pretty clean.</a:t>
+            </a:r>
+            <a:br>
+              <a:rPr lang="en-US" sz="1800" dirty="0">
+                <a:effectLst/>
+                <a:latin typeface="Segoe UI" panose="020B0502040204020203" pitchFamily="34" charset="0"/>
+              </a:rPr>
+            </a:br>
+            <a:br>
+              <a:rPr lang="en-US" sz="1800" dirty="0">
+                <a:effectLst/>
+                <a:latin typeface="Segoe UI" panose="020B0502040204020203" pitchFamily="34" charset="0"/>
+              </a:rPr>
+            </a:br>
+            <a:r>
+              <a:rPr lang="en-US" sz="1800" dirty="0">
+                <a:effectLst/>
+                <a:latin typeface="Segoe UI" panose="020B0502040204020203" pitchFamily="34" charset="0"/>
+              </a:rPr>
+              <a:t>Flight distance according to linear regression</a:t>
+            </a:r>
+            <a:endParaRPr lang="en-US" dirty="0"/>
+          </a:p>
+        </p:txBody>
+      </p:sp>
+      <p:sp>
+        <p:nvSpPr>
+          <p:cNvPr id="4" name="Slide Number Placeholder 3"/>
+          <p:cNvSpPr>
+            <a:spLocks noGrp="1"/>
+          </p:cNvSpPr>
+          <p:nvPr>
+            <p:ph type="sldNum" sz="quarter" idx="5"/>
+          </p:nvPr>
+        </p:nvSpPr>
+        <p:spPr/>
+        <p:txBody>
+          <a:bodyPr/>
+          <a:lstStyle/>
+          <a:p>
+            <a:fld id="{9BCCD4D3-9FFD-4D42-BD91-737D0D78D7F6}" type="slidenum">
+              <a:rPr lang="en-US" smtClean="0"/>
+              <a:t>6</a:t>
+            </a:fld>
+            <a:endParaRPr lang="en-US"/>
+          </a:p>
+        </p:txBody>
+      </p:sp>
+    </p:spTree>
+    <p:extLst>
+      <p:ext uri="{BB962C8B-B14F-4D97-AF65-F5344CB8AC3E}">
+        <p14:creationId xmlns:p14="http://schemas.microsoft.com/office/powerpoint/2010/main" val="1477088385"/>
+      </p:ext>
+    </p:extLst>
+  </p:cSld>
+  <p:clrMapOvr>
+    <a:masterClrMapping/>
+  </p:clrMapOvr>
+</p:notes>
+</file>
+
+<file path=ppt/notesSlides/notesSlide5.xml><?xml version="1.0" encoding="utf-8"?>
+<p:notes xmlns:a="http://schemas.openxmlformats.org/drawingml/2006/main" xmlns:r="http://schemas.openxmlformats.org/officeDocument/2006/relationships" xmlns:p="http://schemas.openxmlformats.org/presentationml/2006/main">
+  <p:cSld>
+    <p:spTree>
+      <p:nvGrpSpPr>
+        <p:cNvPr id="1" name=""/>
+        <p:cNvGrpSpPr/>
+        <p:nvPr/>
+      </p:nvGrpSpPr>
+      <p:grpSpPr>
+        <a:xfrm>
+          <a:off x="0" y="0"/>
+          <a:ext cx="0" cy="0"/>
+          <a:chOff x="0" y="0"/>
+          <a:chExt cx="0" cy="0"/>
+        </a:xfrm>
+      </p:grpSpPr>
+      <p:sp>
+        <p:nvSpPr>
+          <p:cNvPr id="2" name="Slide Image Placeholder 1"/>
+          <p:cNvSpPr>
+            <a:spLocks noGrp="1" noRot="1" noChangeAspect="1"/>
+          </p:cNvSpPr>
+          <p:nvPr>
+            <p:ph type="sldImg"/>
+          </p:nvPr>
+        </p:nvSpPr>
+        <p:spPr/>
+      </p:sp>
+      <p:sp>
+        <p:nvSpPr>
+          <p:cNvPr id="3" name="Notes Placeholder 2"/>
+          <p:cNvSpPr>
+            <a:spLocks noGrp="1"/>
+          </p:cNvSpPr>
+          <p:nvPr>
+            <p:ph type="body" idx="1"/>
+          </p:nvPr>
+        </p:nvSpPr>
+        <p:spPr/>
+        <p:txBody>
+          <a:bodyPr/>
+          <a:lstStyle/>
+          <a:p>
+            <a:r>
+              <a:rPr lang="en-US" sz="1800" dirty="0">
+                <a:effectLst/>
+                <a:latin typeface="Segoe UI" panose="020B0502040204020203" pitchFamily="34" charset="0"/>
+              </a:rPr>
+              <a:t>No transformations done, initial pass</a:t>
+            </a:r>
+            <a:endParaRPr lang="en-US" dirty="0"/>
+          </a:p>
+        </p:txBody>
+      </p:sp>
+      <p:sp>
+        <p:nvSpPr>
+          <p:cNvPr id="4" name="Slide Number Placeholder 3"/>
+          <p:cNvSpPr>
+            <a:spLocks noGrp="1"/>
+          </p:cNvSpPr>
+          <p:nvPr>
+            <p:ph type="sldNum" sz="quarter" idx="5"/>
+          </p:nvPr>
+        </p:nvSpPr>
+        <p:spPr/>
+        <p:txBody>
+          <a:bodyPr/>
+          <a:lstStyle/>
+          <a:p>
+            <a:fld id="{9BCCD4D3-9FFD-4D42-BD91-737D0D78D7F6}" type="slidenum">
+              <a:rPr lang="en-US" smtClean="0"/>
+              <a:t>7</a:t>
+            </a:fld>
+            <a:endParaRPr lang="en-US"/>
+          </a:p>
+        </p:txBody>
+      </p:sp>
+    </p:spTree>
+    <p:extLst>
+      <p:ext uri="{BB962C8B-B14F-4D97-AF65-F5344CB8AC3E}">
+        <p14:creationId xmlns:p14="http://schemas.microsoft.com/office/powerpoint/2010/main" val="1664157245"/>
+      </p:ext>
+    </p:extLst>
+  </p:cSld>
+  <p:clrMapOvr>
+    <a:masterClrMapping/>
+  </p:clrMapOvr>
+</p:notes>
+</file>
+
+<file path=ppt/notesSlides/notesSlide6.xml><?xml version="1.0" encoding="utf-8"?>
+<p:notes xmlns:a="http://schemas.openxmlformats.org/drawingml/2006/main" xmlns:r="http://schemas.openxmlformats.org/officeDocument/2006/relationships" xmlns:p="http://schemas.openxmlformats.org/presentationml/2006/main">
+  <p:cSld>
+    <p:spTree>
+      <p:nvGrpSpPr>
+        <p:cNvPr id="1" name=""/>
+        <p:cNvGrpSpPr/>
+        <p:nvPr/>
+      </p:nvGrpSpPr>
+      <p:grpSpPr>
+        <a:xfrm>
+          <a:off x="0" y="0"/>
+          <a:ext cx="0" cy="0"/>
+          <a:chOff x="0" y="0"/>
+          <a:chExt cx="0" cy="0"/>
+        </a:xfrm>
+      </p:grpSpPr>
+      <p:sp>
+        <p:nvSpPr>
+          <p:cNvPr id="2" name="Slide Image Placeholder 1"/>
+          <p:cNvSpPr>
+            <a:spLocks noGrp="1" noRot="1" noChangeAspect="1"/>
+          </p:cNvSpPr>
+          <p:nvPr>
+            <p:ph type="sldImg"/>
+          </p:nvPr>
+        </p:nvSpPr>
+        <p:spPr/>
+      </p:sp>
+      <p:sp>
+        <p:nvSpPr>
+          <p:cNvPr id="3" name="Notes Placeholder 2"/>
+          <p:cNvSpPr>
+            <a:spLocks noGrp="1"/>
+          </p:cNvSpPr>
+          <p:nvPr>
+            <p:ph type="body" idx="1"/>
+          </p:nvPr>
+        </p:nvSpPr>
+        <p:spPr/>
+        <p:txBody>
+          <a:bodyPr/>
+          <a:lstStyle/>
+          <a:p>
+            <a:r>
+              <a:rPr lang="en-US" b="0" i="0" dirty="0">
+                <a:solidFill>
+                  <a:srgbClr val="292929"/>
+                </a:solidFill>
+                <a:effectLst/>
+                <a:latin typeface="-system-ui"/>
+              </a:rPr>
+              <a:t>There are few correlations that don't make sense, like Inflight </a:t>
+            </a:r>
+            <a:r>
+              <a:rPr lang="en-US" b="0" i="0" dirty="0" err="1">
+                <a:solidFill>
+                  <a:srgbClr val="292929"/>
+                </a:solidFill>
+                <a:effectLst/>
+                <a:latin typeface="-system-ui"/>
+              </a:rPr>
+              <a:t>wifi</a:t>
+            </a:r>
+            <a:r>
+              <a:rPr lang="en-US" b="0" i="0" dirty="0">
+                <a:solidFill>
+                  <a:srgbClr val="292929"/>
+                </a:solidFill>
+                <a:effectLst/>
+                <a:latin typeface="-system-ui"/>
+              </a:rPr>
+              <a:t> service and ease of online booking, inflight entertainment and cleanliness. The other correlations make sense to some extent</a:t>
+            </a:r>
+            <a:endParaRPr lang="en-US" dirty="0"/>
+          </a:p>
+        </p:txBody>
+      </p:sp>
+      <p:sp>
+        <p:nvSpPr>
+          <p:cNvPr id="4" name="Slide Number Placeholder 3"/>
+          <p:cNvSpPr>
+            <a:spLocks noGrp="1"/>
+          </p:cNvSpPr>
+          <p:nvPr>
+            <p:ph type="sldNum" sz="quarter" idx="5"/>
+          </p:nvPr>
+        </p:nvSpPr>
+        <p:spPr/>
+        <p:txBody>
+          <a:bodyPr/>
+          <a:lstStyle/>
+          <a:p>
+            <a:fld id="{9BCCD4D3-9FFD-4D42-BD91-737D0D78D7F6}" type="slidenum">
+              <a:rPr lang="en-US" smtClean="0"/>
+              <a:t>9</a:t>
+            </a:fld>
+            <a:endParaRPr lang="en-US"/>
+          </a:p>
+        </p:txBody>
+      </p:sp>
+    </p:spTree>
+    <p:extLst>
+      <p:ext uri="{BB962C8B-B14F-4D97-AF65-F5344CB8AC3E}">
+        <p14:creationId xmlns:p14="http://schemas.microsoft.com/office/powerpoint/2010/main" val="3569220514"/>
+      </p:ext>
+    </p:extLst>
+  </p:cSld>
+  <p:clrMapOvr>
+    <a:masterClrMapping/>
+  </p:clrMapOvr>
+</p:notes>
+</file>
+
+<file path=ppt/notesSlides/notesSlide7.xml><?xml version="1.0" encoding="utf-8"?>
+<p:notes xmlns:a="http://schemas.openxmlformats.org/drawingml/2006/main" xmlns:r="http://schemas.openxmlformats.org/officeDocument/2006/relationships" xmlns:p="http://schemas.openxmlformats.org/presentationml/2006/main">
+  <p:cSld>
+    <p:spTree>
+      <p:nvGrpSpPr>
+        <p:cNvPr id="1" name=""/>
+        <p:cNvGrpSpPr/>
+        <p:nvPr/>
+      </p:nvGrpSpPr>
+      <p:grpSpPr>
+        <a:xfrm>
+          <a:off x="0" y="0"/>
+          <a:ext cx="0" cy="0"/>
+          <a:chOff x="0" y="0"/>
+          <a:chExt cx="0" cy="0"/>
+        </a:xfrm>
+      </p:grpSpPr>
+      <p:sp>
+        <p:nvSpPr>
+          <p:cNvPr id="2" name="Slide Image Placeholder 1"/>
+          <p:cNvSpPr>
+            <a:spLocks noGrp="1" noRot="1" noChangeAspect="1"/>
+          </p:cNvSpPr>
+          <p:nvPr>
+            <p:ph type="sldImg"/>
+          </p:nvPr>
+        </p:nvSpPr>
+        <p:spPr/>
+      </p:sp>
+      <p:sp>
+        <p:nvSpPr>
+          <p:cNvPr id="3" name="Notes Placeholder 2"/>
+          <p:cNvSpPr>
+            <a:spLocks noGrp="1"/>
+          </p:cNvSpPr>
+          <p:nvPr>
+            <p:ph type="body" idx="1"/>
+          </p:nvPr>
+        </p:nvSpPr>
+        <p:spPr/>
+        <p:txBody>
+          <a:bodyPr/>
+          <a:lstStyle/>
+          <a:p>
+            <a:r>
+              <a:rPr lang="en-US" sz="1800" dirty="0">
+                <a:effectLst/>
+                <a:latin typeface="Segoe UI" panose="020B0502040204020203" pitchFamily="34" charset="0"/>
+              </a:rPr>
+              <a:t>Age and Gender P values were 0.618 and 0.231 </a:t>
+            </a:r>
+            <a:r>
+              <a:rPr lang="en-US" sz="1800" dirty="0" err="1">
+                <a:effectLst/>
+                <a:latin typeface="Segoe UI" panose="020B0502040204020203" pitchFamily="34" charset="0"/>
+              </a:rPr>
+              <a:t>respecitvely</a:t>
+            </a:r>
+            <a:r>
+              <a:rPr lang="en-US" sz="1800" dirty="0">
+                <a:effectLst/>
+                <a:latin typeface="Segoe UI" panose="020B0502040204020203" pitchFamily="34" charset="0"/>
+              </a:rPr>
+              <a:t> in the ACSI, contradicting the Logistic Regression model on Kaggle data</a:t>
+            </a:r>
+            <a:endParaRPr lang="en-US" dirty="0"/>
+          </a:p>
+        </p:txBody>
+      </p:sp>
+      <p:sp>
+        <p:nvSpPr>
+          <p:cNvPr id="4" name="Slide Number Placeholder 3"/>
+          <p:cNvSpPr>
+            <a:spLocks noGrp="1"/>
+          </p:cNvSpPr>
+          <p:nvPr>
+            <p:ph type="sldNum" sz="quarter" idx="5"/>
+          </p:nvPr>
+        </p:nvSpPr>
+        <p:spPr/>
+        <p:txBody>
+          <a:bodyPr/>
+          <a:lstStyle/>
+          <a:p>
+            <a:fld id="{9BCCD4D3-9FFD-4D42-BD91-737D0D78D7F6}" type="slidenum">
+              <a:rPr lang="en-US" smtClean="0"/>
+              <a:t>11</a:t>
+            </a:fld>
+            <a:endParaRPr lang="en-US"/>
+          </a:p>
+        </p:txBody>
+      </p:sp>
+    </p:spTree>
+    <p:extLst>
+      <p:ext uri="{BB962C8B-B14F-4D97-AF65-F5344CB8AC3E}">
+        <p14:creationId xmlns:p14="http://schemas.microsoft.com/office/powerpoint/2010/main" val="2572422361"/>
+      </p:ext>
+    </p:extLst>
+  </p:cSld>
+  <p:clrMapOvr>
+    <a:masterClrMapping/>
+  </p:clrMapOvr>
+</p:notes>
+</file>
+
 <file path=ppt/slideLayouts/slideLayout1.xml><?xml version="1.0" encoding="utf-8"?>
 <p:sldLayout xmlns:a="http://schemas.openxmlformats.org/drawingml/2006/main" xmlns:r="http://schemas.openxmlformats.org/officeDocument/2006/relationships" xmlns:p="http://schemas.openxmlformats.org/presentationml/2006/main" showMasterSp="0" type="title" preserve="1">
   <p:cSld name="Title Slide">
@@ -470,7 +1512,7 @@
           <a:p>
             <a:fld id="{1955A8DF-052F-408C-B32C-6128C7E474DA}" type="datetimeFigureOut">
               <a:rPr lang="en-US" smtClean="0"/>
-              <a:t>6/26/2023</a:t>
+              <a:t>6/28/2023</a:t>
             </a:fld>
             <a:endParaRPr lang="en-US"/>
           </a:p>
@@ -640,7 +1682,7 @@
           <a:p>
             <a:fld id="{1955A8DF-052F-408C-B32C-6128C7E474DA}" type="datetimeFigureOut">
               <a:rPr lang="en-US" smtClean="0"/>
-              <a:t>6/26/2023</a:t>
+              <a:t>6/28/2023</a:t>
             </a:fld>
             <a:endParaRPr lang="en-US"/>
           </a:p>
@@ -820,7 +1862,7 @@
           <a:p>
             <a:fld id="{1955A8DF-052F-408C-B32C-6128C7E474DA}" type="datetimeFigureOut">
               <a:rPr lang="en-US" smtClean="0"/>
-              <a:t>6/26/2023</a:t>
+              <a:t>6/28/2023</a:t>
             </a:fld>
             <a:endParaRPr lang="en-US"/>
           </a:p>
@@ -990,7 +2032,7 @@
           <a:p>
             <a:fld id="{1955A8DF-052F-408C-B32C-6128C7E474DA}" type="datetimeFigureOut">
               <a:rPr lang="en-US" smtClean="0"/>
-              <a:t>6/26/2023</a:t>
+              <a:t>6/28/2023</a:t>
             </a:fld>
             <a:endParaRPr lang="en-US"/>
           </a:p>
@@ -1244,7 +2286,7 @@
           <a:p>
             <a:fld id="{1955A8DF-052F-408C-B32C-6128C7E474DA}" type="datetimeFigureOut">
               <a:rPr lang="en-US" smtClean="0"/>
-              <a:t>6/26/2023</a:t>
+              <a:t>6/28/2023</a:t>
             </a:fld>
             <a:endParaRPr lang="en-US"/>
           </a:p>
@@ -1532,7 +2574,7 @@
           <a:p>
             <a:fld id="{1955A8DF-052F-408C-B32C-6128C7E474DA}" type="datetimeFigureOut">
               <a:rPr lang="en-US" smtClean="0"/>
-              <a:t>6/26/2023</a:t>
+              <a:t>6/28/2023</a:t>
             </a:fld>
             <a:endParaRPr lang="en-US"/>
           </a:p>
@@ -1974,7 +3016,7 @@
           <a:p>
             <a:fld id="{1955A8DF-052F-408C-B32C-6128C7E474DA}" type="datetimeFigureOut">
               <a:rPr lang="en-US" smtClean="0"/>
-              <a:t>6/26/2023</a:t>
+              <a:t>6/28/2023</a:t>
             </a:fld>
             <a:endParaRPr lang="en-US"/>
           </a:p>
@@ -2092,7 +3134,7 @@
           <a:p>
             <a:fld id="{1955A8DF-052F-408C-B32C-6128C7E474DA}" type="datetimeFigureOut">
               <a:rPr lang="en-US" smtClean="0"/>
-              <a:t>6/26/2023</a:t>
+              <a:t>6/28/2023</a:t>
             </a:fld>
             <a:endParaRPr lang="en-US"/>
           </a:p>
@@ -2187,7 +3229,7 @@
           <a:p>
             <a:fld id="{1955A8DF-052F-408C-B32C-6128C7E474DA}" type="datetimeFigureOut">
               <a:rPr lang="en-US" smtClean="0"/>
-              <a:t>6/26/2023</a:t>
+              <a:t>6/28/2023</a:t>
             </a:fld>
             <a:endParaRPr lang="en-US"/>
           </a:p>
@@ -2475,7 +3517,7 @@
           <a:p>
             <a:fld id="{1955A8DF-052F-408C-B32C-6128C7E474DA}" type="datetimeFigureOut">
               <a:rPr lang="en-US" smtClean="0"/>
-              <a:t>6/26/2023</a:t>
+              <a:t>6/28/2023</a:t>
             </a:fld>
             <a:endParaRPr lang="en-US"/>
           </a:p>
@@ -2748,7 +3790,7 @@
           <a:p>
             <a:fld id="{1955A8DF-052F-408C-B32C-6128C7E474DA}" type="datetimeFigureOut">
               <a:rPr lang="en-US" smtClean="0"/>
-              <a:t>6/26/2023</a:t>
+              <a:t>6/28/2023</a:t>
             </a:fld>
             <a:endParaRPr lang="en-US"/>
           </a:p>
@@ -3045,7 +4087,7 @@
           <a:p>
             <a:fld id="{1955A8DF-052F-408C-B32C-6128C7E474DA}" type="datetimeFigureOut">
               <a:rPr lang="en-US" smtClean="0"/>
-              <a:t>6/26/2023</a:t>
+              <a:t>6/28/2023</a:t>
             </a:fld>
             <a:endParaRPr lang="en-US"/>
           </a:p>
@@ -3686,7 +4728,7 @@
           <a:p>
             <a:r>
               <a:rPr lang="en-US" dirty="0"/>
-              <a:t>Other Datasets and Research Findings</a:t>
+              <a:t>Modelling</a:t>
             </a:r>
           </a:p>
         </p:txBody>
@@ -3717,46 +4759,84 @@
             <a:pPr algn="l"/>
             <a:r>
               <a:rPr lang="en-US" dirty="0"/>
-              <a:t>ACSI Dataset seems to contradict some of the findings from the primary dataset</a:t>
-            </a:r>
-            <a:r>
-              <a:rPr lang="en-US" baseline="30000" dirty="0"/>
-              <a:t>3</a:t>
-            </a:r>
-            <a:endParaRPr lang="en-US" dirty="0"/>
+              <a:t>Logistic Regression - Analysis of Distributions for possible transformations, Consider Regularization</a:t>
+            </a:r>
+          </a:p>
+          <a:p>
+            <a:pPr lvl="1"/>
+            <a:r>
+              <a:rPr lang="en-US" dirty="0"/>
+              <a:t>Look at magnitude of coefficients</a:t>
+            </a:r>
+          </a:p>
+          <a:p>
+            <a:pPr lvl="1"/>
+            <a:r>
+              <a:rPr lang="en-US" dirty="0"/>
+              <a:t>Compare results of transformed vs non-transformed data</a:t>
+            </a:r>
+          </a:p>
+          <a:p>
+            <a:pPr lvl="1"/>
+            <a:r>
+              <a:rPr lang="en-US" dirty="0"/>
+              <a:t>Run diagnostics</a:t>
+            </a:r>
+          </a:p>
+          <a:p>
+            <a:pPr lvl="1"/>
+            <a:r>
+              <a:rPr lang="en-US" dirty="0"/>
+              <a:t>Apply transformations as needed</a:t>
+            </a:r>
           </a:p>
           <a:p>
             <a:pPr algn="l"/>
             <a:r>
               <a:rPr lang="en-US" dirty="0"/>
-              <a:t>Impact of COVID-19 pandemic on airlines’ passenger satisfaction contains references to a lot of previous research done on the topic</a:t>
-            </a:r>
-            <a:r>
-              <a:rPr lang="en-US" baseline="30000" dirty="0"/>
-              <a:t>4</a:t>
+              <a:t>Random Forest </a:t>
+            </a:r>
+          </a:p>
+          <a:p>
+            <a:pPr lvl="1"/>
+            <a:r>
+              <a:rPr lang="en-US" dirty="0"/>
+              <a:t>Discover relative feature importance.</a:t>
             </a:r>
           </a:p>
           <a:p>
             <a:pPr algn="l"/>
-            <a:endParaRPr lang="en-US" dirty="0"/>
+            <a:r>
+              <a:rPr lang="en-US" dirty="0"/>
+              <a:t>Support Vector Machines</a:t>
+            </a:r>
+          </a:p>
+          <a:p>
+            <a:pPr lvl="1"/>
+            <a:r>
+              <a:rPr lang="en-US" dirty="0"/>
+              <a:t>Analysis of Distributions for possible transformations, Center and Scale Data, Optimal Choice of Kernal, Optimal Value of C/lambda.</a:t>
+            </a:r>
+          </a:p>
+          <a:p>
+            <a:pPr algn="l"/>
+            <a:r>
+              <a:rPr lang="en-US" dirty="0"/>
+              <a:t>The models will be compared using ROC-AUC on a reserved validation set.</a:t>
+            </a:r>
           </a:p>
         </p:txBody>
       </p:sp>
     </p:spTree>
     <p:extLst>
       <p:ext uri="{BB962C8B-B14F-4D97-AF65-F5344CB8AC3E}">
-        <p14:creationId xmlns:p14="http://schemas.microsoft.com/office/powerpoint/2010/main" val="343252239"/>
+        <p14:creationId xmlns:p14="http://schemas.microsoft.com/office/powerpoint/2010/main" val="2760735355"/>
       </p:ext>
     </p:extLst>
   </p:cSld>
   <p:clrMapOvr>
     <a:masterClrMapping/>
   </p:clrMapOvr>
-  <p:extLst>
-    <p:ext uri="{6950BFC3-D8DA-4A85-94F7-54DA5524770B}">
-      <p188:commentRel xmlns:p188="http://schemas.microsoft.com/office/powerpoint/2018/8/main" r:id="rId2"/>
-    </p:ext>
-  </p:extLst>
 </p:sld>
 </file>
 
@@ -3782,6 +4862,146 @@
           <p:cNvPr id="2" name="Title 1">
             <a:extLst>
               <a:ext uri="{FF2B5EF4-FFF2-40B4-BE49-F238E27FC236}">
+                <a16:creationId xmlns:a16="http://schemas.microsoft.com/office/drawing/2014/main" id="{BC8107AF-A697-F007-FBC6-663EEACE8539}"/>
+              </a:ext>
+            </a:extLst>
+          </p:cNvPr>
+          <p:cNvSpPr>
+            <a:spLocks noGrp="1"/>
+          </p:cNvSpPr>
+          <p:nvPr>
+            <p:ph type="title"/>
+          </p:nvPr>
+        </p:nvSpPr>
+        <p:spPr/>
+        <p:txBody>
+          <a:bodyPr/>
+          <a:lstStyle/>
+          <a:p>
+            <a:r>
+              <a:rPr lang="en-US" dirty="0"/>
+              <a:t>Other Datasets and Research Findings</a:t>
+            </a:r>
+          </a:p>
+        </p:txBody>
+      </p:sp>
+      <p:sp>
+        <p:nvSpPr>
+          <p:cNvPr id="3" name="Content Placeholder 2">
+            <a:extLst>
+              <a:ext uri="{FF2B5EF4-FFF2-40B4-BE49-F238E27FC236}">
+                <a16:creationId xmlns:a16="http://schemas.microsoft.com/office/drawing/2014/main" id="{AC68744F-2AB0-9C00-83B2-5DA833BC80DC}"/>
+              </a:ext>
+            </a:extLst>
+          </p:cNvPr>
+          <p:cNvSpPr>
+            <a:spLocks noGrp="1"/>
+          </p:cNvSpPr>
+          <p:nvPr>
+            <p:ph idx="1"/>
+          </p:nvPr>
+        </p:nvSpPr>
+        <p:spPr/>
+        <p:txBody>
+          <a:bodyPr>
+            <a:normAutofit/>
+          </a:bodyPr>
+          <a:lstStyle/>
+          <a:p>
+            <a:pPr algn="l"/>
+            <a:r>
+              <a:rPr lang="en-US" dirty="0"/>
+              <a:t>Pereira et al. (2023) provided an exhaustive and updated literature review about airlines’ passenger satisfaction while analyzing the most influential factors on satisfaction before and during the COVID-19 pandemic.</a:t>
+            </a:r>
+            <a:r>
+              <a:rPr lang="en-US" baseline="30000" dirty="0"/>
+              <a:t>3</a:t>
+            </a:r>
+          </a:p>
+          <a:p>
+            <a:pPr algn="l"/>
+            <a:r>
+              <a:rPr lang="en-US" dirty="0" err="1"/>
+              <a:t>Lucini</a:t>
+            </a:r>
+            <a:r>
+              <a:rPr lang="en-US" dirty="0"/>
+              <a:t> et al. (2020) found practical implications to maximize customer satisfaction: focus on customer service for first class passengers, comfort for premium economy passengers, and checking luggage and waiting time for economy class travelers.</a:t>
+            </a:r>
+            <a:r>
+              <a:rPr lang="en-US" baseline="30000" dirty="0"/>
+              <a:t>4</a:t>
+            </a:r>
+          </a:p>
+          <a:p>
+            <a:pPr algn="l"/>
+            <a:r>
+              <a:rPr lang="en-US" dirty="0" err="1"/>
+              <a:t>Morgeson</a:t>
+            </a:r>
+            <a:r>
+              <a:rPr lang="en-US" dirty="0"/>
+              <a:t> et al. (2023) focused on the American Customer Satisfaction Index  (ACSI) and helped us better explore and analyze it.</a:t>
+            </a:r>
+            <a:r>
+              <a:rPr lang="en-US" baseline="30000" dirty="0"/>
+              <a:t>5</a:t>
+            </a:r>
+          </a:p>
+          <a:p>
+            <a:pPr lvl="1"/>
+            <a:r>
+              <a:rPr lang="en-US" dirty="0"/>
+              <a:t>ACSI Dataset seems to contradict some of the findings from the primary dataset</a:t>
+            </a:r>
+            <a:r>
+              <a:rPr lang="en-US" baseline="30000" dirty="0"/>
+              <a:t>3</a:t>
+            </a:r>
+            <a:endParaRPr lang="en-US" dirty="0"/>
+          </a:p>
+        </p:txBody>
+      </p:sp>
+    </p:spTree>
+    <p:extLst>
+      <p:ext uri="{BB962C8B-B14F-4D97-AF65-F5344CB8AC3E}">
+        <p14:creationId xmlns:p14="http://schemas.microsoft.com/office/powerpoint/2010/main" val="343252239"/>
+      </p:ext>
+    </p:extLst>
+  </p:cSld>
+  <p:clrMapOvr>
+    <a:masterClrMapping/>
+  </p:clrMapOvr>
+  <p:extLst>
+    <p:ext uri="{6950BFC3-D8DA-4A85-94F7-54DA5524770B}">
+      <p188:commentRel xmlns:p188="http://schemas.microsoft.com/office/powerpoint/2018/8/main" r:id="rId3"/>
+    </p:ext>
+  </p:extLst>
+</p:sld>
+</file>
+
+<file path=ppt/slides/slide12.xml><?xml version="1.0" encoding="utf-8"?>
+<p:sld xmlns:a="http://schemas.openxmlformats.org/drawingml/2006/main" xmlns:r="http://schemas.openxmlformats.org/officeDocument/2006/relationships" xmlns:p="http://schemas.openxmlformats.org/presentationml/2006/main">
+  <p:cSld>
+    <p:spTree>
+      <p:nvGrpSpPr>
+        <p:cNvPr id="1" name=""/>
+        <p:cNvGrpSpPr/>
+        <p:nvPr/>
+      </p:nvGrpSpPr>
+      <p:grpSpPr>
+        <a:xfrm>
+          <a:off x="0" y="0"/>
+          <a:ext cx="0" cy="0"/>
+          <a:chOff x="0" y="0"/>
+          <a:chExt cx="0" cy="0"/>
+        </a:xfrm>
+      </p:grpSpPr>
+      <p:sp>
+        <p:nvSpPr>
+          <p:cNvPr id="2" name="Title 1">
+            <a:extLst>
+              <a:ext uri="{FF2B5EF4-FFF2-40B4-BE49-F238E27FC236}">
                 <a16:creationId xmlns:a16="http://schemas.microsoft.com/office/drawing/2014/main" id="{49241911-89D4-97F0-FABA-ADD4726EFB7A}"/>
               </a:ext>
             </a:extLst>
@@ -3857,7 +5077,7 @@
               <a:rPr lang="en-US" dirty="0">
                 <a:hlinkClick r:id="rId4"/>
               </a:rPr>
-              <a:t>https://www.sciencedirect.com/science/article/pii/S2352340923002421</a:t>
+              <a:t>https://www.sciencedirect.com/science/article/pii/S0969699723000844#bib20</a:t>
             </a:r>
             <a:endParaRPr lang="en-US" dirty="0"/>
           </a:p>
@@ -3869,19 +5089,20 @@
               <a:rPr lang="en-US" dirty="0">
                 <a:hlinkClick r:id="rId5"/>
               </a:rPr>
-              <a:t>https://www.sciencedirect.com/science/article/pii/S0969699723000844#bib20</a:t>
+              <a:t>https://www.sciencedirect.com/science/article/abs/pii/S0969699719302959</a:t>
             </a:r>
             <a:endParaRPr lang="en-US" dirty="0"/>
           </a:p>
           <a:p>
             <a:pPr marL="457200" indent="-457200">
+              <a:buFont typeface="Wingdings 2" pitchFamily="18" charset="2"/>
               <a:buAutoNum type="arabicPeriod"/>
             </a:pPr>
             <a:r>
               <a:rPr lang="en-US" dirty="0">
                 <a:hlinkClick r:id="rId6"/>
               </a:rPr>
-              <a:t>https://www.sciencedirect.com/science/article/abs/pii/S0969699719302959</a:t>
+              <a:t>https://www.sciencedirect.com/science/article/pii/S2352340923002421</a:t>
             </a:r>
             <a:endParaRPr lang="en-US" dirty="0"/>
           </a:p>
@@ -3924,7 +5145,7 @@
 </p:sld>
 </file>
 
-<file path=ppt/slides/slide12.xml><?xml version="1.0" encoding="utf-8"?>
+<file path=ppt/slides/slide13.xml><?xml version="1.0" encoding="utf-8"?>
 <p:sld xmlns:a="http://schemas.openxmlformats.org/drawingml/2006/main" xmlns:r="http://schemas.openxmlformats.org/officeDocument/2006/relationships" xmlns:p="http://schemas.openxmlformats.org/presentationml/2006/main">
   <p:cSld>
     <p:spTree>
@@ -4682,7 +5903,7 @@
           <p:nvPr/>
         </p:nvPicPr>
         <p:blipFill rotWithShape="1">
-          <a:blip r:embed="rId3"/>
+          <a:blip r:embed="rId4"/>
           <a:srcRect t="11845"/>
           <a:stretch/>
         </p:blipFill>
@@ -4760,7 +5981,7 @@
   </p:clrMapOvr>
   <p:extLst>
     <p:ext uri="{6950BFC3-D8DA-4A85-94F7-54DA5524770B}">
-      <p188:commentRel xmlns:p188="http://schemas.microsoft.com/office/powerpoint/2018/8/main" r:id="rId2"/>
+      <p188:commentRel xmlns:p188="http://schemas.microsoft.com/office/powerpoint/2018/8/main" r:id="rId3"/>
     </p:ext>
   </p:extLst>
 </p:sld>
@@ -5317,7 +6538,7 @@
           <p:nvPr/>
         </p:nvPicPr>
         <p:blipFill rotWithShape="1">
-          <a:blip r:embed="rId3"/>
+          <a:blip r:embed="rId4"/>
           <a:srcRect t="11845"/>
           <a:stretch/>
         </p:blipFill>
@@ -5475,7 +6696,7 @@
   </p:clrMapOvr>
   <p:extLst>
     <p:ext uri="{6950BFC3-D8DA-4A85-94F7-54DA5524770B}">
-      <p188:commentRel xmlns:p188="http://schemas.microsoft.com/office/powerpoint/2018/8/main" r:id="rId2"/>
+      <p188:commentRel xmlns:p188="http://schemas.microsoft.com/office/powerpoint/2018/8/main" r:id="rId3"/>
     </p:ext>
   </p:extLst>
 </p:sld>
@@ -5668,7 +6889,7 @@
             <p:nvPr/>
           </p:nvPicPr>
           <p:blipFill>
-            <a:blip r:embed="rId3"/>
+            <a:blip r:embed="rId4"/>
             <a:stretch>
               <a:fillRect/>
             </a:stretch>
@@ -5750,7 +6971,7 @@
   </p:clrMapOvr>
   <p:extLst>
     <p:ext uri="{6950BFC3-D8DA-4A85-94F7-54DA5524770B}">
-      <p188:commentRel xmlns:p188="http://schemas.microsoft.com/office/powerpoint/2018/8/main" r:id="rId2"/>
+      <p188:commentRel xmlns:p188="http://schemas.microsoft.com/office/powerpoint/2018/8/main" r:id="rId3"/>
     </p:ext>
   </p:extLst>
 </p:sld>
@@ -5818,7 +7039,7 @@
           </p:nvPr>
         </p:nvPicPr>
         <p:blipFill>
-          <a:blip r:embed="rId3">
+          <a:blip r:embed="rId4">
             <a:extLst>
               <a:ext uri="{28A0092B-C50C-407E-A947-70E740481C1C}">
                 <a14:useLocalDpi xmlns:a14="http://schemas.microsoft.com/office/drawing/2010/main" val="0"/>
@@ -5850,6 +7071,114 @@
           </a:extLst>
         </p:spPr>
       </p:pic>
+      <p:sp>
+        <p:nvSpPr>
+          <p:cNvPr id="3" name="Rectangle 2">
+            <a:extLst>
+              <a:ext uri="{FF2B5EF4-FFF2-40B4-BE49-F238E27FC236}">
+                <a16:creationId xmlns:a16="http://schemas.microsoft.com/office/drawing/2014/main" id="{84493036-09C0-CB16-F53B-64270418A8D6}"/>
+              </a:ext>
+            </a:extLst>
+          </p:cNvPr>
+          <p:cNvSpPr/>
+          <p:nvPr/>
+        </p:nvSpPr>
+        <p:spPr>
+          <a:xfrm>
+            <a:off x="5248438" y="2704210"/>
+            <a:ext cx="1828800" cy="145278"/>
+          </a:xfrm>
+          <a:prstGeom prst="rect">
+            <a:avLst/>
+          </a:prstGeom>
+          <a:solidFill>
+            <a:srgbClr val="FF0000">
+              <a:alpha val="20000"/>
+            </a:srgbClr>
+          </a:solidFill>
+          <a:ln>
+            <a:noFill/>
+          </a:ln>
+        </p:spPr>
+        <p:style>
+          <a:lnRef idx="2">
+            <a:schemeClr val="accent1">
+              <a:shade val="15000"/>
+            </a:schemeClr>
+          </a:lnRef>
+          <a:fillRef idx="1">
+            <a:schemeClr val="accent1"/>
+          </a:fillRef>
+          <a:effectRef idx="0">
+            <a:schemeClr val="accent1"/>
+          </a:effectRef>
+          <a:fontRef idx="minor">
+            <a:schemeClr val="lt1"/>
+          </a:fontRef>
+        </p:style>
+        <p:txBody>
+          <a:bodyPr rtlCol="0" anchor="ctr"/>
+          <a:lstStyle/>
+          <a:p>
+            <a:pPr algn="ctr"/>
+            <a:endParaRPr lang="en-US"/>
+          </a:p>
+        </p:txBody>
+      </p:sp>
+      <p:sp>
+        <p:nvSpPr>
+          <p:cNvPr id="4" name="Rectangle 3">
+            <a:extLst>
+              <a:ext uri="{FF2B5EF4-FFF2-40B4-BE49-F238E27FC236}">
+                <a16:creationId xmlns:a16="http://schemas.microsoft.com/office/drawing/2014/main" id="{8E551E48-47C1-2D3A-9FFF-E7C958FA0B01}"/>
+              </a:ext>
+            </a:extLst>
+          </p:cNvPr>
+          <p:cNvSpPr/>
+          <p:nvPr/>
+        </p:nvSpPr>
+        <p:spPr>
+          <a:xfrm>
+            <a:off x="5248438" y="3278959"/>
+            <a:ext cx="1828800" cy="145278"/>
+          </a:xfrm>
+          <a:prstGeom prst="rect">
+            <a:avLst/>
+          </a:prstGeom>
+          <a:solidFill>
+            <a:srgbClr val="FF0000">
+              <a:alpha val="20000"/>
+            </a:srgbClr>
+          </a:solidFill>
+          <a:ln>
+            <a:noFill/>
+          </a:ln>
+        </p:spPr>
+        <p:style>
+          <a:lnRef idx="2">
+            <a:schemeClr val="accent1">
+              <a:shade val="15000"/>
+            </a:schemeClr>
+          </a:lnRef>
+          <a:fillRef idx="1">
+            <a:schemeClr val="accent1"/>
+          </a:fillRef>
+          <a:effectRef idx="0">
+            <a:schemeClr val="accent1"/>
+          </a:effectRef>
+          <a:fontRef idx="minor">
+            <a:schemeClr val="lt1"/>
+          </a:fontRef>
+        </p:style>
+        <p:txBody>
+          <a:bodyPr rtlCol="0" anchor="ctr"/>
+          <a:lstStyle/>
+          <a:p>
+            <a:pPr algn="ctr"/>
+            <a:endParaRPr lang="en-US"/>
+          </a:p>
+        </p:txBody>
+      </p:sp>
     </p:spTree>
     <p:extLst>
       <p:ext uri="{BB962C8B-B14F-4D97-AF65-F5344CB8AC3E}">
@@ -5862,7 +7191,7 @@
   </p:clrMapOvr>
   <p:extLst>
     <p:ext uri="{6950BFC3-D8DA-4A85-94F7-54DA5524770B}">
-      <p188:commentRel xmlns:p188="http://schemas.microsoft.com/office/powerpoint/2018/8/main" r:id="rId2"/>
+      <p188:commentRel xmlns:p188="http://schemas.microsoft.com/office/powerpoint/2018/8/main" r:id="rId3"/>
     </p:ext>
   </p:extLst>
 </p:sld>
@@ -6027,114 +7356,90 @@
         </p:nvSpPr>
         <p:spPr/>
         <p:txBody>
-          <a:bodyPr/>
-          <a:lstStyle/>
-          <a:p>
-            <a:r>
-              <a:rPr lang="en-US" dirty="0"/>
-              <a:t>Modelling</a:t>
-            </a:r>
-          </a:p>
-        </p:txBody>
-      </p:sp>
-      <p:sp>
-        <p:nvSpPr>
-          <p:cNvPr id="3" name="Content Placeholder 2">
+          <a:bodyPr>
+            <a:normAutofit/>
+          </a:bodyPr>
+          <a:lstStyle/>
+          <a:p>
+            <a:r>
+              <a:rPr lang="en-US" sz="3200" dirty="0"/>
+              <a:t>Correlations</a:t>
+            </a:r>
+          </a:p>
+        </p:txBody>
+      </p:sp>
+      <p:pic>
+        <p:nvPicPr>
+          <p:cNvPr id="1028" name="Picture 4">
             <a:extLst>
               <a:ext uri="{FF2B5EF4-FFF2-40B4-BE49-F238E27FC236}">
-                <a16:creationId xmlns:a16="http://schemas.microsoft.com/office/drawing/2014/main" id="{AC68744F-2AB0-9C00-83B2-5DA833BC80DC}"/>
+                <a16:creationId xmlns:a16="http://schemas.microsoft.com/office/drawing/2014/main" id="{30103BDC-F197-1BF9-1057-8B9504983A74}"/>
               </a:ext>
             </a:extLst>
           </p:cNvPr>
-          <p:cNvSpPr>
-            <a:spLocks noGrp="1"/>
-          </p:cNvSpPr>
-          <p:nvPr>
-            <p:ph idx="1"/>
-          </p:nvPr>
-        </p:nvSpPr>
-        <p:spPr/>
-        <p:txBody>
-          <a:bodyPr>
-            <a:normAutofit/>
-          </a:bodyPr>
-          <a:lstStyle/>
-          <a:p>
-            <a:pPr algn="l"/>
-            <a:r>
-              <a:rPr lang="en-US" dirty="0"/>
-              <a:t>Logistic Regression - Analysis of Distributions for possible transformations, Consider Regularization</a:t>
-            </a:r>
-          </a:p>
-          <a:p>
-            <a:pPr lvl="1"/>
-            <a:r>
-              <a:rPr lang="en-US" dirty="0"/>
-              <a:t>Look at magnitude of coefficients</a:t>
-            </a:r>
-          </a:p>
-          <a:p>
-            <a:pPr lvl="1"/>
-            <a:r>
-              <a:rPr lang="en-US" dirty="0"/>
-              <a:t>Compare results of transformed vs non-transformed data</a:t>
-            </a:r>
-          </a:p>
-          <a:p>
-            <a:pPr lvl="1"/>
-            <a:r>
-              <a:rPr lang="en-US" dirty="0"/>
-              <a:t>Run diagnostics</a:t>
-            </a:r>
-          </a:p>
-          <a:p>
-            <a:pPr lvl="1"/>
-            <a:r>
-              <a:rPr lang="en-US" dirty="0"/>
-              <a:t>Apply transformations as needed</a:t>
-            </a:r>
-          </a:p>
-          <a:p>
-            <a:pPr algn="l"/>
-            <a:r>
-              <a:rPr lang="en-US" dirty="0"/>
-              <a:t>Random Forest </a:t>
-            </a:r>
-          </a:p>
-          <a:p>
-            <a:pPr lvl="1"/>
-            <a:r>
-              <a:rPr lang="en-US" dirty="0"/>
-              <a:t>Discover relative feature importance.</a:t>
-            </a:r>
-          </a:p>
-          <a:p>
-            <a:pPr algn="l"/>
-            <a:r>
-              <a:rPr lang="en-US" dirty="0"/>
-              <a:t>Support Vector Machines</a:t>
-            </a:r>
-          </a:p>
-          <a:p>
-            <a:pPr lvl="1"/>
-            <a:r>
-              <a:rPr lang="en-US" dirty="0"/>
-              <a:t>Analysis of Distributions for possible transformations, Center and Scale Data, Optimal Choice of Kernal, Optimal Value of C/lambda.</a:t>
-            </a:r>
-          </a:p>
-          <a:p>
-            <a:pPr algn="l"/>
-            <a:r>
-              <a:rPr lang="en-US" dirty="0"/>
-              <a:t>The models will be compared using ROC-AUC on a reserved validation set.</a:t>
-            </a:r>
+          <p:cNvPicPr>
+            <a:picLocks noGrp="1" noChangeAspect="1" noChangeArrowheads="1"/>
+          </p:cNvPicPr>
+          <p:nvPr>
+            <p:ph type="pic" idx="1"/>
+          </p:nvPr>
+        </p:nvPicPr>
+        <p:blipFill>
+          <a:blip r:embed="rId3">
+            <a:extLst>
+              <a:ext uri="{28A0092B-C50C-407E-A947-70E740481C1C}">
+                <a14:useLocalDpi xmlns:a14="http://schemas.microsoft.com/office/drawing/2010/main" val="0"/>
+              </a:ext>
+            </a:extLst>
+          </a:blip>
+          <a:srcRect l="5916" r="5916"/>
+          <a:stretch/>
+        </p:blipFill>
+        <p:spPr bwMode="auto">
+          <a:prstGeom prst="rect">
+            <a:avLst/>
+          </a:prstGeom>
+          <a:noFill/>
+          <a:extLst>
+            <a:ext uri="{909E8E84-426E-40DD-AFC4-6F175D3DCCD1}">
+              <a14:hiddenFill xmlns:a14="http://schemas.microsoft.com/office/drawing/2010/main">
+                <a:solidFill>
+                  <a:srgbClr val="FFFFFF"/>
+                </a:solidFill>
+              </a14:hiddenFill>
+            </a:ext>
+          </a:extLst>
+        </p:spPr>
+      </p:pic>
+      <p:sp>
+        <p:nvSpPr>
+          <p:cNvPr id="12" name="Text Placeholder 11">
+            <a:extLst>
+              <a:ext uri="{FF2B5EF4-FFF2-40B4-BE49-F238E27FC236}">
+                <a16:creationId xmlns:a16="http://schemas.microsoft.com/office/drawing/2014/main" id="{17778BA2-3DC9-6508-17DA-2D113072365F}"/>
+              </a:ext>
+            </a:extLst>
+          </p:cNvPr>
+          <p:cNvSpPr>
+            <a:spLocks noGrp="1"/>
+          </p:cNvSpPr>
+          <p:nvPr>
+            <p:ph type="body" sz="half" idx="2"/>
+          </p:nvPr>
+        </p:nvSpPr>
+        <p:spPr/>
+        <p:txBody>
+          <a:bodyPr/>
+          <a:lstStyle/>
+          <a:p>
+            <a:endParaRPr lang="en-US"/>
           </a:p>
         </p:txBody>
       </p:sp>
     </p:spTree>
     <p:extLst>
       <p:ext uri="{BB962C8B-B14F-4D97-AF65-F5344CB8AC3E}">
-        <p14:creationId xmlns:p14="http://schemas.microsoft.com/office/powerpoint/2010/main" val="2760735355"/>
+        <p14:creationId xmlns:p14="http://schemas.microsoft.com/office/powerpoint/2010/main" val="2352494914"/>
       </p:ext>
     </p:extLst>
   </p:cSld>
@@ -6373,4 +7678,299 @@
     </a:ext>
   </a:extLst>
 </a:theme>
+</file>
+
+<file path=ppt/theme/theme2.xml><?xml version="1.0" encoding="utf-8"?>
+<a:theme xmlns:a="http://schemas.openxmlformats.org/drawingml/2006/main" name="Office Theme">
+  <a:themeElements>
+    <a:clrScheme name="Office">
+      <a:dk1>
+        <a:sysClr val="windowText" lastClr="000000"/>
+      </a:dk1>
+      <a:lt1>
+        <a:sysClr val="window" lastClr="FFFFFF"/>
+      </a:lt1>
+      <a:dk2>
+        <a:srgbClr val="44546A"/>
+      </a:dk2>
+      <a:lt2>
+        <a:srgbClr val="E7E6E6"/>
+      </a:lt2>
+      <a:accent1>
+        <a:srgbClr val="4472C4"/>
+      </a:accent1>
+      <a:accent2>
+        <a:srgbClr val="ED7D31"/>
+      </a:accent2>
+      <a:accent3>
+        <a:srgbClr val="A5A5A5"/>
+      </a:accent3>
+      <a:accent4>
+        <a:srgbClr val="FFC000"/>
+      </a:accent4>
+      <a:accent5>
+        <a:srgbClr val="5B9BD5"/>
+      </a:accent5>
+      <a:accent6>
+        <a:srgbClr val="70AD47"/>
+      </a:accent6>
+      <a:hlink>
+        <a:srgbClr val="0563C1"/>
+      </a:hlink>
+      <a:folHlink>
+        <a:srgbClr val="954F72"/>
+      </a:folHlink>
+    </a:clrScheme>
+    <a:fontScheme name="Office">
+      <a:majorFont>
+        <a:latin typeface="Calibri Light" panose="020F0302020204030204"/>
+        <a:ea typeface=""/>
+        <a:cs typeface=""/>
+        <a:font script="Jpan" typeface="游ゴシック Light"/>
+        <a:font script="Hang" typeface="맑은 고딕"/>
+        <a:font script="Hans" typeface="等线 Light"/>
+        <a:font script="Hant" typeface="新細明體"/>
+        <a:font script="Arab" typeface="Times New Roman"/>
+        <a:font script="Hebr" typeface="Times New Roman"/>
+        <a:font script="Thai" typeface="Angsana New"/>
+        <a:font script="Ethi" typeface="Nyala"/>
+        <a:font script="Beng" typeface="Vrinda"/>
+        <a:font script="Gujr" typeface="Shruti"/>
+        <a:font script="Khmr" typeface="MoolBoran"/>
+        <a:font script="Knda" typeface="Tunga"/>
+        <a:font script="Guru" typeface="Raavi"/>
+        <a:font script="Cans" typeface="Euphemia"/>
+        <a:font script="Cher" typeface="Plantagenet Cherokee"/>
+        <a:font script="Yiii" typeface="Microsoft Yi Baiti"/>
+        <a:font script="Tibt" typeface="Microsoft Himalaya"/>
+        <a:font script="Thaa" typeface="MV Boli"/>
+        <a:font script="Deva" typeface="Mangal"/>
+        <a:font script="Telu" typeface="Gautami"/>
+        <a:font script="Taml" typeface="Latha"/>
+        <a:font script="Syrc" typeface="Estrangelo Edessa"/>
+        <a:font script="Orya" typeface="Kalinga"/>
+        <a:font script="Mlym" typeface="Kartika"/>
+        <a:font script="Laoo" typeface="DokChampa"/>
+        <a:font script="Sinh" typeface="Iskoola Pota"/>
+        <a:font script="Mong" typeface="Mongolian Baiti"/>
+        <a:font script="Viet" typeface="Times New Roman"/>
+        <a:font script="Uigh" typeface="Microsoft Uighur"/>
+        <a:font script="Geor" typeface="Sylfaen"/>
+        <a:font script="Armn" typeface="Arial"/>
+        <a:font script="Bugi" typeface="Leelawadee UI"/>
+        <a:font script="Bopo" typeface="Microsoft JhengHei"/>
+        <a:font script="Java" typeface="Javanese Text"/>
+        <a:font script="Lisu" typeface="Segoe UI"/>
+        <a:font script="Mymr" typeface="Myanmar Text"/>
+        <a:font script="Nkoo" typeface="Ebrima"/>
+        <a:font script="Olck" typeface="Nirmala UI"/>
+        <a:font script="Osma" typeface="Ebrima"/>
+        <a:font script="Phag" typeface="Phagspa"/>
+        <a:font script="Syrn" typeface="Estrangelo Edessa"/>
+        <a:font script="Syrj" typeface="Estrangelo Edessa"/>
+        <a:font script="Syre" typeface="Estrangelo Edessa"/>
+        <a:font script="Sora" typeface="Nirmala UI"/>
+        <a:font script="Tale" typeface="Microsoft Tai Le"/>
+        <a:font script="Talu" typeface="Microsoft New Tai Lue"/>
+        <a:font script="Tfng" typeface="Ebrima"/>
+      </a:majorFont>
+      <a:minorFont>
+        <a:latin typeface="Calibri" panose="020F0502020204030204"/>
+        <a:ea typeface=""/>
+        <a:cs typeface=""/>
+        <a:font script="Jpan" typeface="游ゴシック"/>
+        <a:font script="Hang" typeface="맑은 고딕"/>
+        <a:font script="Hans" typeface="等线"/>
+        <a:font script="Hant" typeface="新細明體"/>
+        <a:font script="Arab" typeface="Arial"/>
+        <a:font script="Hebr" typeface="Arial"/>
+        <a:font script="Thai" typeface="Cordia New"/>
+        <a:font script="Ethi" typeface="Nyala"/>
+        <a:font script="Beng" typeface="Vrinda"/>
+        <a:font script="Gujr" typeface="Shruti"/>
+        <a:font script="Khmr" typeface="DaunPenh"/>
+        <a:font script="Knda" typeface="Tunga"/>
+        <a:font script="Guru" typeface="Raavi"/>
+        <a:font script="Cans" typeface="Euphemia"/>
+        <a:font script="Cher" typeface="Plantagenet Cherokee"/>
+        <a:font script="Yiii" typeface="Microsoft Yi Baiti"/>
+        <a:font script="Tibt" typeface="Microsoft Himalaya"/>
+        <a:font script="Thaa" typeface="MV Boli"/>
+        <a:font script="Deva" typeface="Mangal"/>
+        <a:font script="Telu" typeface="Gautami"/>
+        <a:font script="Taml" typeface="Latha"/>
+        <a:font script="Syrc" typeface="Estrangelo Edessa"/>
+        <a:font script="Orya" typeface="Kalinga"/>
+        <a:font script="Mlym" typeface="Kartika"/>
+        <a:font script="Laoo" typeface="DokChampa"/>
+        <a:font script="Sinh" typeface="Iskoola Pota"/>
+        <a:font script="Mong" typeface="Mongolian Baiti"/>
+        <a:font script="Viet" typeface="Arial"/>
+        <a:font script="Uigh" typeface="Microsoft Uighur"/>
+        <a:font script="Geor" typeface="Sylfaen"/>
+        <a:font script="Armn" typeface="Arial"/>
+        <a:font script="Bugi" typeface="Leelawadee UI"/>
+        <a:font script="Bopo" typeface="Microsoft JhengHei"/>
+        <a:font script="Java" typeface="Javanese Text"/>
+        <a:font script="Lisu" typeface="Segoe UI"/>
+        <a:font script="Mymr" typeface="Myanmar Text"/>
+        <a:font script="Nkoo" typeface="Ebrima"/>
+        <a:font script="Olck" typeface="Nirmala UI"/>
+        <a:font script="Osma" typeface="Ebrima"/>
+        <a:font script="Phag" typeface="Phagspa"/>
+        <a:font script="Syrn" typeface="Estrangelo Edessa"/>
+        <a:font script="Syrj" typeface="Estrangelo Edessa"/>
+        <a:font script="Syre" typeface="Estrangelo Edessa"/>
+        <a:font script="Sora" typeface="Nirmala UI"/>
+        <a:font script="Tale" typeface="Microsoft Tai Le"/>
+        <a:font script="Talu" typeface="Microsoft New Tai Lue"/>
+        <a:font script="Tfng" typeface="Ebrima"/>
+      </a:minorFont>
+    </a:fontScheme>
+    <a:fmtScheme name="Office">
+      <a:fillStyleLst>
+        <a:solidFill>
+          <a:schemeClr val="phClr"/>
+        </a:solidFill>
+        <a:gradFill rotWithShape="1">
+          <a:gsLst>
+            <a:gs pos="0">
+              <a:schemeClr val="phClr">
+                <a:lumMod val="110000"/>
+                <a:satMod val="105000"/>
+                <a:tint val="67000"/>
+              </a:schemeClr>
+            </a:gs>
+            <a:gs pos="50000">
+              <a:schemeClr val="phClr">
+                <a:lumMod val="105000"/>
+                <a:satMod val="103000"/>
+                <a:tint val="73000"/>
+              </a:schemeClr>
+            </a:gs>
+            <a:gs pos="100000">
+              <a:schemeClr val="phClr">
+                <a:lumMod val="105000"/>
+                <a:satMod val="109000"/>
+                <a:tint val="81000"/>
+              </a:schemeClr>
+            </a:gs>
+          </a:gsLst>
+          <a:lin ang="5400000" scaled="0"/>
+        </a:gradFill>
+        <a:gradFill rotWithShape="1">
+          <a:gsLst>
+            <a:gs pos="0">
+              <a:schemeClr val="phClr">
+                <a:satMod val="103000"/>
+                <a:lumMod val="102000"/>
+                <a:tint val="94000"/>
+              </a:schemeClr>
+            </a:gs>
+            <a:gs pos="50000">
+              <a:schemeClr val="phClr">
+                <a:satMod val="110000"/>
+                <a:lumMod val="100000"/>
+                <a:shade val="100000"/>
+              </a:schemeClr>
+            </a:gs>
+            <a:gs pos="100000">
+              <a:schemeClr val="phClr">
+                <a:lumMod val="99000"/>
+                <a:satMod val="120000"/>
+                <a:shade val="78000"/>
+              </a:schemeClr>
+            </a:gs>
+          </a:gsLst>
+          <a:lin ang="5400000" scaled="0"/>
+        </a:gradFill>
+      </a:fillStyleLst>
+      <a:lnStyleLst>
+        <a:ln w="6350" cap="flat" cmpd="sng" algn="ctr">
+          <a:solidFill>
+            <a:schemeClr val="phClr"/>
+          </a:solidFill>
+          <a:prstDash val="solid"/>
+          <a:miter lim="800000"/>
+        </a:ln>
+        <a:ln w="12700" cap="flat" cmpd="sng" algn="ctr">
+          <a:solidFill>
+            <a:schemeClr val="phClr"/>
+          </a:solidFill>
+          <a:prstDash val="solid"/>
+          <a:miter lim="800000"/>
+        </a:ln>
+        <a:ln w="19050" cap="flat" cmpd="sng" algn="ctr">
+          <a:solidFill>
+            <a:schemeClr val="phClr"/>
+          </a:solidFill>
+          <a:prstDash val="solid"/>
+          <a:miter lim="800000"/>
+        </a:ln>
+      </a:lnStyleLst>
+      <a:effectStyleLst>
+        <a:effectStyle>
+          <a:effectLst/>
+        </a:effectStyle>
+        <a:effectStyle>
+          <a:effectLst/>
+        </a:effectStyle>
+        <a:effectStyle>
+          <a:effectLst>
+            <a:outerShdw blurRad="57150" dist="19050" dir="5400000" algn="ctr" rotWithShape="0">
+              <a:srgbClr val="000000">
+                <a:alpha val="63000"/>
+              </a:srgbClr>
+            </a:outerShdw>
+          </a:effectLst>
+        </a:effectStyle>
+      </a:effectStyleLst>
+      <a:bgFillStyleLst>
+        <a:solidFill>
+          <a:schemeClr val="phClr"/>
+        </a:solidFill>
+        <a:solidFill>
+          <a:schemeClr val="phClr">
+            <a:tint val="95000"/>
+            <a:satMod val="170000"/>
+          </a:schemeClr>
+        </a:solidFill>
+        <a:gradFill rotWithShape="1">
+          <a:gsLst>
+            <a:gs pos="0">
+              <a:schemeClr val="phClr">
+                <a:tint val="93000"/>
+                <a:satMod val="150000"/>
+                <a:shade val="98000"/>
+                <a:lumMod val="102000"/>
+              </a:schemeClr>
+            </a:gs>
+            <a:gs pos="50000">
+              <a:schemeClr val="phClr">
+                <a:tint val="98000"/>
+                <a:satMod val="130000"/>
+                <a:shade val="90000"/>
+                <a:lumMod val="103000"/>
+              </a:schemeClr>
+            </a:gs>
+            <a:gs pos="100000">
+              <a:schemeClr val="phClr">
+                <a:shade val="63000"/>
+                <a:satMod val="120000"/>
+              </a:schemeClr>
+            </a:gs>
+          </a:gsLst>
+          <a:lin ang="5400000" scaled="0"/>
+        </a:gradFill>
+      </a:bgFillStyleLst>
+    </a:fmtScheme>
+  </a:themeElements>
+  <a:objectDefaults/>
+  <a:extraClrSchemeLst/>
+  <a:extLst>
+    <a:ext uri="{05A4C25C-085E-4340-85A3-A5531E510DB2}">
+      <thm15:themeFamily xmlns:thm15="http://schemas.microsoft.com/office/thememl/2012/main" name="Office Theme" id="{62F939B6-93AF-4DB8-9C6B-D6C7DFDC589F}" vid="{4A3C46E8-61CC-4603-A589-7422A47A8E4A}"/>
+    </a:ext>
+  </a:extLst>
+</a:theme>
 </file>
</xml_diff>

<commit_message>
small updates for first video
</commit_message>
<xml_diff>
--- a/Project Proposal/Team_6_Prop_Vid_Slides.pptx
+++ b/Project Proposal/Team_6_Prop_Vid_Slides.pptx
@@ -1027,7 +1027,22 @@
                 <a:effectLst/>
                 <a:latin typeface="Segoe UI" panose="020B0502040204020203" pitchFamily="34" charset="0"/>
               </a:rPr>
-              <a:t>No transformations done, initial pass</a:t>
+              <a:t>No transformations done, initial pass. </a:t>
+            </a:r>
+          </a:p>
+          <a:p>
+            <a:endParaRPr lang="en-US" sz="1800" dirty="0">
+              <a:effectLst/>
+              <a:latin typeface="Segoe UI" panose="020B0502040204020203" pitchFamily="34" charset="0"/>
+            </a:endParaRPr>
+          </a:p>
+          <a:p>
+            <a:r>
+              <a:rPr lang="en-US" sz="1800" dirty="0">
+                <a:effectLst/>
+                <a:latin typeface="Segoe UI" panose="020B0502040204020203" pitchFamily="34" charset="0"/>
+              </a:rPr>
+              <a:t>We thought that Flight Distance and Food and Drink would both be important.</a:t>
             </a:r>
             <a:endParaRPr lang="en-US" dirty="0"/>
           </a:p>
@@ -1141,7 +1156,7 @@
                 <a:effectLst/>
                 <a:latin typeface="-system-ui"/>
               </a:rPr>
-              <a:t> service and ease of online booking, inflight entertainment and cleanliness. The other correlations make sense to some extent</a:t>
+              <a:t> service and ease of online booking, inflight entertainment and cleanliness. The other correlations make sense to some extent.</a:t>
             </a:r>
             <a:endParaRPr lang="en-US" dirty="0"/>
           </a:p>
@@ -1247,6 +1262,21 @@
                 <a:latin typeface="Segoe UI" panose="020B0502040204020203" pitchFamily="34" charset="0"/>
               </a:rPr>
               <a:t> in the ACSI, contradicting the Logistic Regression model on Kaggle data</a:t>
+            </a:r>
+          </a:p>
+          <a:p>
+            <a:endParaRPr lang="en-US" sz="1800" dirty="0">
+              <a:effectLst/>
+              <a:latin typeface="Segoe UI" panose="020B0502040204020203" pitchFamily="34" charset="0"/>
+            </a:endParaRPr>
+          </a:p>
+          <a:p>
+            <a:r>
+              <a:rPr lang="en-US" sz="1800" dirty="0">
+                <a:effectLst/>
+                <a:latin typeface="Segoe UI" panose="020B0502040204020203" pitchFamily="34" charset="0"/>
+              </a:rPr>
+              <a:t>Cleanliness requirements changed after COVID.</a:t>
             </a:r>
             <a:endParaRPr lang="en-US" dirty="0"/>
           </a:p>
@@ -4815,7 +4845,7 @@
             <a:pPr lvl="1"/>
             <a:r>
               <a:rPr lang="en-US" dirty="0"/>
-              <a:t>Analysis of Distributions for possible transformations, Center and Scale Data, Optimal Choice of Kernal, Optimal Value of C/lambda.</a:t>
+              <a:t>Analysis of Distributions for possible transformations, Center and Scale Data, Optimal Choice of Kernel, Optimal Value of C/lambda.</a:t>
             </a:r>
           </a:p>
           <a:p>
@@ -7322,7 +7352,7 @@
 </file>
 
 <file path=ppt/slides/slide9.xml><?xml version="1.0" encoding="utf-8"?>
-<p:sld xmlns:a="http://schemas.openxmlformats.org/drawingml/2006/main" xmlns:r="http://schemas.openxmlformats.org/officeDocument/2006/relationships" xmlns:p="http://schemas.openxmlformats.org/presentationml/2006/main">
+<p:sld xmlns:a="http://schemas.openxmlformats.org/drawingml/2006/main" xmlns:r="http://schemas.openxmlformats.org/officeDocument/2006/relationships" xmlns:p="http://schemas.openxmlformats.org/presentationml/2006/main" show="0">
   <p:cSld>
     <p:spTree>
       <p:nvGrpSpPr>

</xml_diff>

<commit_message>
Updated slides per final team review, uploaded pdf copy
</commit_message>
<xml_diff>
--- a/Project Proposal/Team_6_Prop_Vid_Slides.pptx
+++ b/Project Proposal/Team_6_Prop_Vid_Slides.pptx
@@ -5,7 +5,7 @@
     <p:sldMasterId id="2147483797" r:id="rId1"/>
   </p:sldMasterIdLst>
   <p:notesMasterIdLst>
-    <p:notesMasterId r:id="rId15"/>
+    <p:notesMasterId r:id="rId14"/>
   </p:notesMasterIdLst>
   <p:sldIdLst>
     <p:sldId id="256" r:id="rId2"/>
@@ -15,12 +15,11 @@
     <p:sldId id="264" r:id="rId6"/>
     <p:sldId id="261" r:id="rId7"/>
     <p:sldId id="266" r:id="rId8"/>
-    <p:sldId id="267" r:id="rId9"/>
-    <p:sldId id="268" r:id="rId10"/>
+    <p:sldId id="269" r:id="rId9"/>
+    <p:sldId id="267" r:id="rId10"/>
     <p:sldId id="263" r:id="rId11"/>
     <p:sldId id="262" r:id="rId12"/>
     <p:sldId id="260" r:id="rId13"/>
-    <p:sldId id="257" r:id="rId14"/>
   </p:sldIdLst>
   <p:sldSz cx="12192000" cy="6858000"/>
   <p:notesSz cx="6858000" cy="9144000"/>
@@ -332,7 +331,7 @@
           <a:p>
             <a:fld id="{9824F8DB-2990-4811-82DD-7422336D885B}" type="datetimeFigureOut">
               <a:rPr lang="en-US" smtClean="0"/>
-              <a:t>6/28/2023</a:t>
+              <a:t>6/29/2023</a:t>
             </a:fld>
             <a:endParaRPr lang="en-US"/>
           </a:p>
@@ -645,7 +644,7 @@
           <a:p>
             <a:r>
               <a:rPr lang="en-US" dirty="0"/>
-              <a:t>Mention my name</a:t>
+              <a:t>My name is Alejandro Martinez from Team 6 and I will be discussing our project on predicting customer satisfaction in the airline industry.</a:t>
             </a:r>
           </a:p>
         </p:txBody>
@@ -677,6 +676,469 @@
     <p:extLst>
       <p:ext uri="{BB962C8B-B14F-4D97-AF65-F5344CB8AC3E}">
         <p14:creationId xmlns:p14="http://schemas.microsoft.com/office/powerpoint/2010/main" val="3374152061"/>
+      </p:ext>
+    </p:extLst>
+  </p:cSld>
+  <p:clrMapOvr>
+    <a:masterClrMapping/>
+  </p:clrMapOvr>
+</p:notes>
+</file>
+
+<file path=ppt/notesSlides/notesSlide10.xml><?xml version="1.0" encoding="utf-8"?>
+<p:notes xmlns:a="http://schemas.openxmlformats.org/drawingml/2006/main" xmlns:r="http://schemas.openxmlformats.org/officeDocument/2006/relationships" xmlns:p="http://schemas.openxmlformats.org/presentationml/2006/main">
+  <p:cSld>
+    <p:spTree>
+      <p:nvGrpSpPr>
+        <p:cNvPr id="1" name=""/>
+        <p:cNvGrpSpPr/>
+        <p:nvPr/>
+      </p:nvGrpSpPr>
+      <p:grpSpPr>
+        <a:xfrm>
+          <a:off x="0" y="0"/>
+          <a:ext cx="0" cy="0"/>
+          <a:chOff x="0" y="0"/>
+          <a:chExt cx="0" cy="0"/>
+        </a:xfrm>
+      </p:grpSpPr>
+      <p:sp>
+        <p:nvSpPr>
+          <p:cNvPr id="2" name="Slide Image Placeholder 1"/>
+          <p:cNvSpPr>
+            <a:spLocks noGrp="1" noRot="1" noChangeAspect="1"/>
+          </p:cNvSpPr>
+          <p:nvPr>
+            <p:ph type="sldImg"/>
+          </p:nvPr>
+        </p:nvSpPr>
+        <p:spPr/>
+      </p:sp>
+      <p:sp>
+        <p:nvSpPr>
+          <p:cNvPr id="3" name="Notes Placeholder 2"/>
+          <p:cNvSpPr>
+            <a:spLocks noGrp="1"/>
+          </p:cNvSpPr>
+          <p:nvPr>
+            <p:ph type="body" idx="1"/>
+          </p:nvPr>
+        </p:nvSpPr>
+        <p:spPr/>
+        <p:txBody>
+          <a:bodyPr/>
+          <a:lstStyle/>
+          <a:p>
+            <a:r>
+              <a:rPr lang="en-US" dirty="0"/>
+              <a:t>We have narrowed down the focus of our modeling to Logistic Regression, Random Forest, and Support Vector Machines.</a:t>
+            </a:r>
+          </a:p>
+          <a:p>
+            <a:endParaRPr lang="en-US" dirty="0"/>
+          </a:p>
+          <a:p>
+            <a:pPr algn="l"/>
+            <a:r>
+              <a:rPr lang="en-US" b="0" i="0" dirty="0">
+                <a:solidFill>
+                  <a:srgbClr val="292929"/>
+                </a:solidFill>
+                <a:effectLst/>
+                <a:latin typeface="-system-ui"/>
+              </a:rPr>
+              <a:t>We're going to test each variable using a logistic regression model one by one. We're going examine the distribution of the variable and the regression diagnostics to see if transformations or binning are required.</a:t>
+            </a:r>
+            <a:br>
+              <a:rPr lang="en-US" b="0" i="0" dirty="0">
+                <a:solidFill>
+                  <a:srgbClr val="292929"/>
+                </a:solidFill>
+                <a:effectLst/>
+                <a:latin typeface="-system-ui"/>
+              </a:rPr>
+            </a:br>
+            <a:r>
+              <a:rPr lang="en-US" b="0" i="0" dirty="0">
+                <a:solidFill>
+                  <a:srgbClr val="292929"/>
+                </a:solidFill>
+                <a:effectLst/>
+                <a:latin typeface="-system-ui"/>
+              </a:rPr>
+              <a:t>If a log transform seems appropriate, we'll apply one and reiterate the prior steps. Otherwise, we'll examine the variable for binning.</a:t>
+            </a:r>
+            <a:br>
+              <a:rPr lang="en-US" b="0" i="0" dirty="0">
+                <a:solidFill>
+                  <a:srgbClr val="292929"/>
+                </a:solidFill>
+                <a:effectLst/>
+                <a:latin typeface="-system-ui"/>
+              </a:rPr>
+            </a:br>
+            <a:r>
+              <a:rPr lang="en-US" b="0" i="0" dirty="0">
+                <a:solidFill>
+                  <a:srgbClr val="292929"/>
+                </a:solidFill>
+                <a:effectLst/>
+                <a:latin typeface="-system-ui"/>
+              </a:rPr>
+              <a:t>We'll compare the f-statistics of the transformations to the original logistic regression and make a decision as to whether it's an improvement.</a:t>
+            </a:r>
+            <a:br>
+              <a:rPr lang="en-US" b="0" i="0" dirty="0">
+                <a:solidFill>
+                  <a:srgbClr val="292929"/>
+                </a:solidFill>
+                <a:effectLst/>
+                <a:latin typeface="-system-ui"/>
+              </a:rPr>
+            </a:br>
+            <a:r>
+              <a:rPr lang="en-US" b="0" i="0" dirty="0">
+                <a:solidFill>
+                  <a:srgbClr val="292929"/>
+                </a:solidFill>
+                <a:effectLst/>
+                <a:latin typeface="-system-ui"/>
+              </a:rPr>
+              <a:t>Then we'll move onto each variable and repeat.</a:t>
+            </a:r>
+            <a:br>
+              <a:rPr lang="en-US" b="0" i="0" dirty="0">
+                <a:solidFill>
+                  <a:srgbClr val="292929"/>
+                </a:solidFill>
+                <a:effectLst/>
+                <a:latin typeface="-system-ui"/>
+              </a:rPr>
+            </a:br>
+            <a:r>
+              <a:rPr lang="en-US" b="0" i="0" dirty="0">
+                <a:solidFill>
+                  <a:srgbClr val="292929"/>
+                </a:solidFill>
+                <a:effectLst/>
+                <a:latin typeface="-system-ui"/>
+              </a:rPr>
+              <a:t>Once we have a suitable set of variables we'll run the full regression and check the f-statistic against the untransformed regression to assess whether there has been an overall improvement.</a:t>
+            </a:r>
+          </a:p>
+          <a:p>
+            <a:pPr algn="l"/>
+            <a:r>
+              <a:rPr lang="en-US" b="0" i="0" dirty="0">
+                <a:solidFill>
+                  <a:srgbClr val="292929"/>
+                </a:solidFill>
+                <a:effectLst/>
+                <a:latin typeface="-system-ui"/>
+              </a:rPr>
+              <a:t>After we have what we believe to be our best logistic regression model, we'll cross validate it to get a measure of accuracy, as well as ROC </a:t>
+            </a:r>
+            <a:r>
+              <a:rPr lang="en-US" b="0" i="0" dirty="0" err="1">
+                <a:solidFill>
+                  <a:srgbClr val="292929"/>
+                </a:solidFill>
+                <a:effectLst/>
+                <a:latin typeface="-system-ui"/>
+              </a:rPr>
+              <a:t>auc</a:t>
+            </a:r>
+            <a:r>
+              <a:rPr lang="en-US" b="0" i="0" dirty="0">
+                <a:solidFill>
+                  <a:srgbClr val="292929"/>
+                </a:solidFill>
+                <a:effectLst/>
+                <a:latin typeface="-system-ui"/>
+              </a:rPr>
+              <a:t>. </a:t>
+            </a:r>
+            <a:br>
+              <a:rPr lang="en-US" b="0" i="0" dirty="0">
+                <a:solidFill>
+                  <a:srgbClr val="292929"/>
+                </a:solidFill>
+                <a:effectLst/>
+                <a:latin typeface="-system-ui"/>
+              </a:rPr>
+            </a:br>
+            <a:r>
+              <a:rPr lang="en-US" b="0" i="0" dirty="0">
+                <a:solidFill>
+                  <a:srgbClr val="292929"/>
+                </a:solidFill>
+                <a:effectLst/>
+                <a:latin typeface="-system-ui"/>
+              </a:rPr>
+              <a:t>We'll repeat the </a:t>
+            </a:r>
+            <a:r>
+              <a:rPr lang="en-US" b="0" i="0" dirty="0" err="1">
+                <a:solidFill>
+                  <a:srgbClr val="292929"/>
+                </a:solidFill>
+                <a:effectLst/>
+                <a:latin typeface="-system-ui"/>
+              </a:rPr>
+              <a:t>crossvalidation</a:t>
+            </a:r>
+            <a:r>
+              <a:rPr lang="en-US" b="0" i="0" dirty="0">
+                <a:solidFill>
+                  <a:srgbClr val="292929"/>
+                </a:solidFill>
+                <a:effectLst/>
+                <a:latin typeface="-system-ui"/>
+              </a:rPr>
+              <a:t> process with SVM to see if it results in better accuracy and </a:t>
+            </a:r>
+            <a:r>
+              <a:rPr lang="en-US" b="0" i="0" dirty="0" err="1">
+                <a:solidFill>
+                  <a:srgbClr val="292929"/>
+                </a:solidFill>
+                <a:effectLst/>
+                <a:latin typeface="-system-ui"/>
+              </a:rPr>
+              <a:t>auc</a:t>
+            </a:r>
+            <a:r>
+              <a:rPr lang="en-US" b="0" i="0" dirty="0">
+                <a:solidFill>
+                  <a:srgbClr val="292929"/>
+                </a:solidFill>
+                <a:effectLst/>
+                <a:latin typeface="-system-ui"/>
+              </a:rPr>
+              <a:t>.</a:t>
+            </a:r>
+            <a:br>
+              <a:rPr lang="en-US" b="0" i="0" dirty="0">
+                <a:solidFill>
+                  <a:srgbClr val="292929"/>
+                </a:solidFill>
+                <a:effectLst/>
+                <a:latin typeface="-system-ui"/>
+              </a:rPr>
+            </a:br>
+            <a:r>
+              <a:rPr lang="en-US" b="0" i="0" dirty="0">
+                <a:solidFill>
+                  <a:srgbClr val="292929"/>
+                </a:solidFill>
+                <a:effectLst/>
+                <a:latin typeface="-system-ui"/>
+              </a:rPr>
+              <a:t>We'll also use a random forests model to gauge relative feature importance.</a:t>
+            </a:r>
+          </a:p>
+          <a:p>
+            <a:endParaRPr lang="en-US" dirty="0"/>
+          </a:p>
+        </p:txBody>
+      </p:sp>
+      <p:sp>
+        <p:nvSpPr>
+          <p:cNvPr id="4" name="Slide Number Placeholder 3"/>
+          <p:cNvSpPr>
+            <a:spLocks noGrp="1"/>
+          </p:cNvSpPr>
+          <p:nvPr>
+            <p:ph type="sldNum" sz="quarter" idx="5"/>
+          </p:nvPr>
+        </p:nvSpPr>
+        <p:spPr/>
+        <p:txBody>
+          <a:bodyPr/>
+          <a:lstStyle/>
+          <a:p>
+            <a:fld id="{9BCCD4D3-9FFD-4D42-BD91-737D0D78D7F6}" type="slidenum">
+              <a:rPr lang="en-US" smtClean="0"/>
+              <a:t>10</a:t>
+            </a:fld>
+            <a:endParaRPr lang="en-US"/>
+          </a:p>
+        </p:txBody>
+      </p:sp>
+    </p:spTree>
+    <p:extLst>
+      <p:ext uri="{BB962C8B-B14F-4D97-AF65-F5344CB8AC3E}">
+        <p14:creationId xmlns:p14="http://schemas.microsoft.com/office/powerpoint/2010/main" val="2258524352"/>
+      </p:ext>
+    </p:extLst>
+  </p:cSld>
+  <p:clrMapOvr>
+    <a:masterClrMapping/>
+  </p:clrMapOvr>
+</p:notes>
+</file>
+
+<file path=ppt/notesSlides/notesSlide11.xml><?xml version="1.0" encoding="utf-8"?>
+<p:notes xmlns:a="http://schemas.openxmlformats.org/drawingml/2006/main" xmlns:r="http://schemas.openxmlformats.org/officeDocument/2006/relationships" xmlns:p="http://schemas.openxmlformats.org/presentationml/2006/main">
+  <p:cSld>
+    <p:spTree>
+      <p:nvGrpSpPr>
+        <p:cNvPr id="1" name=""/>
+        <p:cNvGrpSpPr/>
+        <p:nvPr/>
+      </p:nvGrpSpPr>
+      <p:grpSpPr>
+        <a:xfrm>
+          <a:off x="0" y="0"/>
+          <a:ext cx="0" cy="0"/>
+          <a:chOff x="0" y="0"/>
+          <a:chExt cx="0" cy="0"/>
+        </a:xfrm>
+      </p:grpSpPr>
+      <p:sp>
+        <p:nvSpPr>
+          <p:cNvPr id="2" name="Slide Image Placeholder 1"/>
+          <p:cNvSpPr>
+            <a:spLocks noGrp="1" noRot="1" noChangeAspect="1"/>
+          </p:cNvSpPr>
+          <p:nvPr>
+            <p:ph type="sldImg"/>
+          </p:nvPr>
+        </p:nvSpPr>
+        <p:spPr/>
+      </p:sp>
+      <p:sp>
+        <p:nvSpPr>
+          <p:cNvPr id="3" name="Notes Placeholder 2"/>
+          <p:cNvSpPr>
+            <a:spLocks noGrp="1"/>
+          </p:cNvSpPr>
+          <p:nvPr>
+            <p:ph type="body" idx="1"/>
+          </p:nvPr>
+        </p:nvSpPr>
+        <p:spPr/>
+        <p:txBody>
+          <a:bodyPr/>
+          <a:lstStyle/>
+          <a:p>
+            <a:r>
+              <a:rPr lang="en-US" sz="1800" dirty="0">
+                <a:effectLst/>
+                <a:latin typeface="Segoe UI" panose="020B0502040204020203" pitchFamily="34" charset="0"/>
+              </a:rPr>
+              <a:t>Here is an overview of some research papers that we have found. Pereira analyzed customer satisfaction before and after the pandemic and noticed that some factors have become more important as a result of the pandemic, such as cleanliness.</a:t>
+            </a:r>
+          </a:p>
+          <a:p>
+            <a:endParaRPr lang="en-US" sz="1800" dirty="0">
+              <a:effectLst/>
+              <a:latin typeface="Segoe UI" panose="020B0502040204020203" pitchFamily="34" charset="0"/>
+            </a:endParaRPr>
+          </a:p>
+          <a:p>
+            <a:r>
+              <a:rPr lang="en-US" sz="1800" dirty="0" err="1">
+                <a:effectLst/>
+                <a:latin typeface="Segoe UI" panose="020B0502040204020203" pitchFamily="34" charset="0"/>
+              </a:rPr>
+              <a:t>Lucini</a:t>
+            </a:r>
+            <a:r>
+              <a:rPr lang="en-US" sz="1800" dirty="0">
+                <a:effectLst/>
+                <a:latin typeface="Segoe UI" panose="020B0502040204020203" pitchFamily="34" charset="0"/>
+              </a:rPr>
+              <a:t> found practical implications to maximize customer </a:t>
+            </a:r>
+            <a:r>
+              <a:rPr lang="en-US" sz="1800" dirty="0" err="1">
+                <a:effectLst/>
+                <a:latin typeface="Segoe UI" panose="020B0502040204020203" pitchFamily="34" charset="0"/>
+              </a:rPr>
+              <a:t>satisfaction:</a:t>
+            </a:r>
+            <a:r>
+              <a:rPr lang="en-US" sz="3200" dirty="0" err="1"/>
+              <a:t>focus</a:t>
+            </a:r>
+            <a:r>
+              <a:rPr lang="en-US" sz="3200" dirty="0"/>
+              <a:t> on customer service for first class passengers, comfort for premium economy passengers, and checking luggage and waiting time for economy class travelers</a:t>
+            </a:r>
+          </a:p>
+          <a:p>
+            <a:endParaRPr lang="en-US" sz="3200" dirty="0">
+              <a:effectLst/>
+              <a:latin typeface="Segoe UI" panose="020B0502040204020203" pitchFamily="34" charset="0"/>
+            </a:endParaRPr>
+          </a:p>
+          <a:p>
+            <a:pPr marL="0" marR="0" lvl="0" indent="0" algn="l" defTabSz="914400" rtl="0" eaLnBrk="1" fontAlgn="auto" latinLnBrk="0" hangingPunct="1">
+              <a:lnSpc>
+                <a:spcPct val="100000"/>
+              </a:lnSpc>
+              <a:spcBef>
+                <a:spcPts val="0"/>
+              </a:spcBef>
+              <a:spcAft>
+                <a:spcPts val="0"/>
+              </a:spcAft>
+              <a:buClrTx/>
+              <a:buSzTx/>
+              <a:buFontTx/>
+              <a:buNone/>
+              <a:tabLst/>
+              <a:defRPr/>
+            </a:pPr>
+            <a:r>
+              <a:rPr lang="en-US" sz="3200" dirty="0" err="1"/>
+              <a:t>Morgeson</a:t>
+            </a:r>
+            <a:r>
+              <a:rPr lang="en-US" sz="3200" dirty="0"/>
+              <a:t> et al. (2023) focused on the (ACSI) and helped us better explore and analyze it.</a:t>
+            </a:r>
+            <a:r>
+              <a:rPr lang="en-US" sz="3200" baseline="30000" dirty="0"/>
+              <a:t>5</a:t>
+            </a:r>
+          </a:p>
+          <a:p>
+            <a:endParaRPr lang="en-US" sz="1800" dirty="0">
+              <a:effectLst/>
+              <a:latin typeface="Segoe UI" panose="020B0502040204020203" pitchFamily="34" charset="0"/>
+            </a:endParaRPr>
+          </a:p>
+        </p:txBody>
+      </p:sp>
+      <p:sp>
+        <p:nvSpPr>
+          <p:cNvPr id="4" name="Slide Number Placeholder 3"/>
+          <p:cNvSpPr>
+            <a:spLocks noGrp="1"/>
+          </p:cNvSpPr>
+          <p:nvPr>
+            <p:ph type="sldNum" sz="quarter" idx="5"/>
+          </p:nvPr>
+        </p:nvSpPr>
+        <p:spPr/>
+        <p:txBody>
+          <a:bodyPr/>
+          <a:lstStyle/>
+          <a:p>
+            <a:fld id="{9BCCD4D3-9FFD-4D42-BD91-737D0D78D7F6}" type="slidenum">
+              <a:rPr lang="en-US" smtClean="0"/>
+              <a:t>11</a:t>
+            </a:fld>
+            <a:endParaRPr lang="en-US"/>
+          </a:p>
+        </p:txBody>
+      </p:sp>
+    </p:spTree>
+    <p:extLst>
+      <p:ext uri="{BB962C8B-B14F-4D97-AF65-F5344CB8AC3E}">
+        <p14:creationId xmlns:p14="http://schemas.microsoft.com/office/powerpoint/2010/main" val="2572422361"/>
       </p:ext>
     </p:extLst>
   </p:cSld>
@@ -731,13 +1193,27 @@
           <a:lstStyle/>
           <a:p>
             <a:r>
-              <a:rPr lang="en-US" sz="1800" dirty="0">
-                <a:effectLst/>
-                <a:latin typeface="Segoe UI" panose="020B0502040204020203" pitchFamily="34" charset="0"/>
-              </a:rPr>
-              <a:t>Mention that satisfaction is the target value.</a:t>
-            </a:r>
+              <a:rPr lang="en-US" dirty="0"/>
+              <a:t>We intend to use a dataset consisting of airline passenger satisfaction survey results to understand which factors are most important to customers and provide recommendations on how money should be invested or re-allocated.</a:t>
+            </a:r>
+          </a:p>
+          <a:p>
             <a:endParaRPr lang="en-US" dirty="0"/>
+          </a:p>
+          <a:p>
+            <a:r>
+              <a:rPr lang="en-US" dirty="0"/>
+              <a:t>Customer satisfaction is a main driver in attracting and retaining business. By finding the most important factors we can provide key insights for airlines to enhance their services, improve the customer experience and optimize business operations.</a:t>
+            </a:r>
+          </a:p>
+          <a:p>
+            <a:endParaRPr lang="en-US" dirty="0"/>
+          </a:p>
+          <a:p>
+            <a:r>
+              <a:rPr lang="en-US" dirty="0"/>
+              <a:t>Some estimates indicate that increasing customer retention by as little as 5% increases profits by 25-95%.</a:t>
+            </a:r>
           </a:p>
         </p:txBody>
       </p:sp>
@@ -758,7 +1234,7 @@
           <a:p>
             <a:fld id="{9BCCD4D3-9FFD-4D42-BD91-737D0D78D7F6}" type="slidenum">
               <a:rPr lang="en-US" smtClean="0"/>
-              <a:t>3</a:t>
+              <a:t>2</a:t>
             </a:fld>
             <a:endParaRPr lang="en-US"/>
           </a:p>
@@ -767,7 +1243,7 @@
     </p:spTree>
     <p:extLst>
       <p:ext uri="{BB962C8B-B14F-4D97-AF65-F5344CB8AC3E}">
-        <p14:creationId xmlns:p14="http://schemas.microsoft.com/office/powerpoint/2010/main" val="654713510"/>
+        <p14:creationId xmlns:p14="http://schemas.microsoft.com/office/powerpoint/2010/main" val="2814845890"/>
       </p:ext>
     </p:extLst>
   </p:cSld>
@@ -826,7 +1302,22 @@
                 <a:effectLst/>
                 <a:latin typeface="Segoe UI" panose="020B0502040204020203" pitchFamily="34" charset="0"/>
               </a:rPr>
-              <a:t>Getting rid of arrival time because it is highly correlated and has a lot of NA values.</a:t>
+              <a:t>Here is an overview of our dataset which contains user ratings for multiple aspects of air travel.</a:t>
+            </a:r>
+          </a:p>
+          <a:p>
+            <a:endParaRPr lang="en-US" sz="1800" dirty="0">
+              <a:effectLst/>
+              <a:latin typeface="Segoe UI" panose="020B0502040204020203" pitchFamily="34" charset="0"/>
+            </a:endParaRPr>
+          </a:p>
+          <a:p>
+            <a:r>
+              <a:rPr lang="en-US" sz="1800" dirty="0">
+                <a:effectLst/>
+                <a:latin typeface="Segoe UI" panose="020B0502040204020203" pitchFamily="34" charset="0"/>
+              </a:rPr>
+              <a:t>It is important to note that the last row, shown in the orange box, indicates whether the passenger was satisfied or not. This is the dependent variable that we will fit our models to.</a:t>
             </a:r>
             <a:endParaRPr lang="en-US" dirty="0"/>
           </a:p>
@@ -849,7 +1340,7 @@
           <a:p>
             <a:fld id="{9BCCD4D3-9FFD-4D42-BD91-737D0D78D7F6}" type="slidenum">
               <a:rPr lang="en-US" smtClean="0"/>
-              <a:t>5</a:t>
+              <a:t>3</a:t>
             </a:fld>
             <a:endParaRPr lang="en-US"/>
           </a:p>
@@ -858,7 +1349,7 @@
     </p:spTree>
     <p:extLst>
       <p:ext uri="{BB962C8B-B14F-4D97-AF65-F5344CB8AC3E}">
-        <p14:creationId xmlns:p14="http://schemas.microsoft.com/office/powerpoint/2010/main" val="3406354395"/>
+        <p14:creationId xmlns:p14="http://schemas.microsoft.com/office/powerpoint/2010/main" val="654713510"/>
       </p:ext>
     </p:extLst>
   </p:cSld>
@@ -913,32 +1404,24 @@
           <a:lstStyle/>
           <a:p>
             <a:r>
-              <a:rPr lang="en-US" sz="1800" dirty="0">
-                <a:effectLst/>
-                <a:latin typeface="Segoe UI" panose="020B0502040204020203" pitchFamily="34" charset="0"/>
-              </a:rPr>
-              <a:t>Data is pretty clean.</a:t>
-            </a:r>
-            <a:br>
-              <a:rPr lang="en-US" sz="1800" dirty="0">
-                <a:effectLst/>
-                <a:latin typeface="Segoe UI" panose="020B0502040204020203" pitchFamily="34" charset="0"/>
-              </a:rPr>
-            </a:br>
-            <a:br>
-              <a:rPr lang="en-US" sz="1800" dirty="0">
-                <a:effectLst/>
-                <a:latin typeface="Segoe UI" panose="020B0502040204020203" pitchFamily="34" charset="0"/>
-              </a:rPr>
-            </a:br>
-            <a:r>
-              <a:rPr lang="en-US" sz="1800" dirty="0">
-                <a:effectLst/>
-                <a:latin typeface="Segoe UI" panose="020B0502040204020203" pitchFamily="34" charset="0"/>
-              </a:rPr>
-              <a:t>Flight distance according to linear regression</a:t>
-            </a:r>
+              <a:rPr lang="en-US" dirty="0"/>
+              <a:t>The green boxes show our prediction as to what we expect to be the most important factors in customer satisfaction.</a:t>
+            </a:r>
+          </a:p>
+          <a:p>
             <a:endParaRPr lang="en-US" dirty="0"/>
+          </a:p>
+          <a:p>
+            <a:r>
+              <a:rPr lang="en-US" dirty="0"/>
+              <a:t>Some examples are that Longer flight distances lead to lower satisfaction due to travel fatigue.</a:t>
+            </a:r>
+          </a:p>
+          <a:p>
+            <a:r>
+              <a:rPr lang="en-US" dirty="0"/>
+              <a:t>We expect Departure and arrival delays to be the most important factors because people usually have plans that they don’t want to have to reschedule.</a:t>
+            </a:r>
           </a:p>
         </p:txBody>
       </p:sp>
@@ -959,7 +1442,7 @@
           <a:p>
             <a:fld id="{9BCCD4D3-9FFD-4D42-BD91-737D0D78D7F6}" type="slidenum">
               <a:rPr lang="en-US" smtClean="0"/>
-              <a:t>6</a:t>
+              <a:t>4</a:t>
             </a:fld>
             <a:endParaRPr lang="en-US"/>
           </a:p>
@@ -968,7 +1451,7 @@
     </p:spTree>
     <p:extLst>
       <p:ext uri="{BB962C8B-B14F-4D97-AF65-F5344CB8AC3E}">
-        <p14:creationId xmlns:p14="http://schemas.microsoft.com/office/powerpoint/2010/main" val="1477088385"/>
+        <p14:creationId xmlns:p14="http://schemas.microsoft.com/office/powerpoint/2010/main" val="3086426561"/>
       </p:ext>
     </p:extLst>
   </p:cSld>
@@ -1027,22 +1510,7 @@
                 <a:effectLst/>
                 <a:latin typeface="Segoe UI" panose="020B0502040204020203" pitchFamily="34" charset="0"/>
               </a:rPr>
-              <a:t>No transformations done, initial pass. </a:t>
-            </a:r>
-          </a:p>
-          <a:p>
-            <a:endParaRPr lang="en-US" sz="1800" dirty="0">
-              <a:effectLst/>
-              <a:latin typeface="Segoe UI" panose="020B0502040204020203" pitchFamily="34" charset="0"/>
-            </a:endParaRPr>
-          </a:p>
-          <a:p>
-            <a:r>
-              <a:rPr lang="en-US" sz="1800" dirty="0">
-                <a:effectLst/>
-                <a:latin typeface="Segoe UI" panose="020B0502040204020203" pitchFamily="34" charset="0"/>
-              </a:rPr>
-              <a:t>We thought that Flight Distance and Food and Drink would both be important.</a:t>
+              <a:t>Departure delay and arrival delay are highly correlated and arrival delay has missing values so we will be excluding arrival delay.</a:t>
             </a:r>
             <a:endParaRPr lang="en-US" dirty="0"/>
           </a:p>
@@ -1065,7 +1533,7 @@
           <a:p>
             <a:fld id="{9BCCD4D3-9FFD-4D42-BD91-737D0D78D7F6}" type="slidenum">
               <a:rPr lang="en-US" smtClean="0"/>
-              <a:t>7</a:t>
+              <a:t>5</a:t>
             </a:fld>
             <a:endParaRPr lang="en-US"/>
           </a:p>
@@ -1074,7 +1542,7 @@
     </p:spTree>
     <p:extLst>
       <p:ext uri="{BB962C8B-B14F-4D97-AF65-F5344CB8AC3E}">
-        <p14:creationId xmlns:p14="http://schemas.microsoft.com/office/powerpoint/2010/main" val="1664157245"/>
+        <p14:creationId xmlns:p14="http://schemas.microsoft.com/office/powerpoint/2010/main" val="3406354395"/>
       </p:ext>
     </p:extLst>
   </p:cSld>
@@ -1129,35 +1597,125 @@
           <a:lstStyle/>
           <a:p>
             <a:r>
-              <a:rPr lang="en-US" b="0" i="0" dirty="0">
-                <a:solidFill>
-                  <a:srgbClr val="292929"/>
-                </a:solidFill>
+              <a:rPr lang="en-US" sz="1800" dirty="0">
                 <a:effectLst/>
-                <a:latin typeface="-system-ui"/>
+                <a:latin typeface="Segoe UI" panose="020B0502040204020203" pitchFamily="34" charset="0"/>
               </a:rPr>
-              <a:t>There are few correlations that don't make sense, like Inflight </a:t>
-            </a:r>
-            <a:r>
-              <a:rPr lang="en-US" b="0" i="0" dirty="0" err="1">
-                <a:solidFill>
-                  <a:srgbClr val="292929"/>
-                </a:solidFill>
+              <a:t>The data is already very clean, we have eliminated missing values and are investigating whether to exclude values with a z score &gt; 3 as well as manually one-hot </a:t>
+            </a:r>
+            <a:r>
+              <a:rPr lang="en-US" sz="1800" dirty="0" err="1">
                 <a:effectLst/>
-                <a:latin typeface="-system-ui"/>
+                <a:latin typeface="Segoe UI" panose="020B0502040204020203" pitchFamily="34" charset="0"/>
               </a:rPr>
-              <a:t>wifi</a:t>
-            </a:r>
-            <a:r>
-              <a:rPr lang="en-US" b="0" i="0" dirty="0">
-                <a:solidFill>
-                  <a:srgbClr val="292929"/>
-                </a:solidFill>
+              <a:t>enconding</a:t>
+            </a:r>
+            <a:r>
+              <a:rPr lang="en-US" sz="1800" dirty="0">
                 <a:effectLst/>
-                <a:latin typeface="-system-ui"/>
+                <a:latin typeface="Segoe UI" panose="020B0502040204020203" pitchFamily="34" charset="0"/>
               </a:rPr>
-              <a:t> service and ease of online booking, inflight entertainment and cleanliness. The other correlations make sense to some extent.</a:t>
-            </a:r>
+              <a:t> the data to establish baselines.</a:t>
+            </a:r>
+          </a:p>
+          <a:p>
+            <a:endParaRPr lang="en-US" sz="1800" dirty="0">
+              <a:effectLst/>
+              <a:latin typeface="Segoe UI" panose="020B0502040204020203" pitchFamily="34" charset="0"/>
+            </a:endParaRPr>
+          </a:p>
+          <a:p>
+            <a:r>
+              <a:rPr lang="en-US" sz="1800" dirty="0">
+                <a:effectLst/>
+                <a:latin typeface="Segoe UI" panose="020B0502040204020203" pitchFamily="34" charset="0"/>
+              </a:rPr>
+              <a:t>We have found that flight distance is not statistically significant, directly contradicting our hypothesis. Business class is more likely to be satisfied. Some factors just need to be good enough, i.e. cleanliness once it’s clean enough it doesn’t seem to drive significant additional satisfaction.</a:t>
+            </a:r>
+          </a:p>
+          <a:p>
+            <a:endParaRPr lang="en-US" sz="1800" dirty="0">
+              <a:effectLst/>
+              <a:latin typeface="Segoe UI" panose="020B0502040204020203" pitchFamily="34" charset="0"/>
+            </a:endParaRPr>
+          </a:p>
+          <a:p>
+            <a:r>
+              <a:rPr lang="en-US" sz="1800" dirty="0">
+                <a:effectLst/>
+                <a:latin typeface="Segoe UI" panose="020B0502040204020203" pitchFamily="34" charset="0"/>
+              </a:rPr>
+              <a:t>Some of the challenges that we’re facings are that we will not be able to merge flight path data with our dataset due to missing information.</a:t>
+            </a:r>
+          </a:p>
+          <a:p>
+            <a:endParaRPr lang="en-US" sz="1800" dirty="0">
+              <a:effectLst/>
+              <a:latin typeface="Segoe UI" panose="020B0502040204020203" pitchFamily="34" charset="0"/>
+            </a:endParaRPr>
+          </a:p>
+          <a:p>
+            <a:r>
+              <a:rPr lang="en-US" sz="1800" dirty="0">
+                <a:effectLst/>
+                <a:latin typeface="Segoe UI" panose="020B0502040204020203" pitchFamily="34" charset="0"/>
+              </a:rPr>
+              <a:t>We need to better understand how to map a binary satisfaction variable to a Likert scale variable.</a:t>
+            </a:r>
+          </a:p>
+          <a:p>
+            <a:endParaRPr lang="en-US" sz="1800" dirty="0">
+              <a:effectLst/>
+              <a:latin typeface="Segoe UI" panose="020B0502040204020203" pitchFamily="34" charset="0"/>
+            </a:endParaRPr>
+          </a:p>
+          <a:p>
+            <a:pPr marL="0" marR="0" lvl="0" indent="0" algn="l" defTabSz="914400" rtl="0" eaLnBrk="1" fontAlgn="auto" latinLnBrk="0" hangingPunct="1">
+              <a:lnSpc>
+                <a:spcPct val="100000"/>
+              </a:lnSpc>
+              <a:spcBef>
+                <a:spcPts val="0"/>
+              </a:spcBef>
+              <a:spcAft>
+                <a:spcPts val="0"/>
+              </a:spcAft>
+              <a:buClrTx/>
+              <a:buSzTx/>
+              <a:buFontTx/>
+              <a:buNone/>
+              <a:tabLst/>
+              <a:defRPr/>
+            </a:pPr>
+            <a:r>
+              <a:rPr lang="en-US" sz="3200" dirty="0"/>
+              <a:t>American Customer Satisfaction Index  (ACSI) Dataset seems to contradict some of the findings from the primary dataset</a:t>
+            </a:r>
+            <a:r>
+              <a:rPr lang="en-US" sz="3200" baseline="30000" dirty="0"/>
+              <a:t>3 </a:t>
+            </a:r>
+            <a:r>
+              <a:rPr lang="en-US" sz="1800" dirty="0">
+                <a:effectLst/>
+                <a:latin typeface="Segoe UI" panose="020B0502040204020203" pitchFamily="34" charset="0"/>
+              </a:rPr>
+              <a:t> for instance age and Gender are statistically insignificant in the the ACSI, contradicting the Logistic Regression model on Kaggle data</a:t>
+            </a:r>
+          </a:p>
+          <a:p>
+            <a:endParaRPr lang="en-US" sz="1800" dirty="0">
+              <a:effectLst/>
+              <a:latin typeface="Segoe UI" panose="020B0502040204020203" pitchFamily="34" charset="0"/>
+            </a:endParaRPr>
+          </a:p>
+          <a:p>
+            <a:endParaRPr lang="en-US" sz="1800" dirty="0">
+              <a:effectLst/>
+              <a:latin typeface="Segoe UI" panose="020B0502040204020203" pitchFamily="34" charset="0"/>
+            </a:endParaRPr>
+          </a:p>
+          <a:p>
             <a:endParaRPr lang="en-US" dirty="0"/>
           </a:p>
         </p:txBody>
@@ -1179,7 +1737,7 @@
           <a:p>
             <a:fld id="{9BCCD4D3-9FFD-4D42-BD91-737D0D78D7F6}" type="slidenum">
               <a:rPr lang="en-US" smtClean="0"/>
-              <a:t>9</a:t>
+              <a:t>6</a:t>
             </a:fld>
             <a:endParaRPr lang="en-US"/>
           </a:p>
@@ -1188,7 +1746,7 @@
     </p:spTree>
     <p:extLst>
       <p:ext uri="{BB962C8B-B14F-4D97-AF65-F5344CB8AC3E}">
-        <p14:creationId xmlns:p14="http://schemas.microsoft.com/office/powerpoint/2010/main" val="3569220514"/>
+        <p14:creationId xmlns:p14="http://schemas.microsoft.com/office/powerpoint/2010/main" val="1477088385"/>
       </p:ext>
     </p:extLst>
   </p:cSld>
@@ -1247,36 +1805,113 @@
                 <a:effectLst/>
                 <a:latin typeface="Segoe UI" panose="020B0502040204020203" pitchFamily="34" charset="0"/>
               </a:rPr>
-              <a:t>Age and Gender P values were 0.618 and 0.231 </a:t>
-            </a:r>
-            <a:r>
-              <a:rPr lang="en-US" sz="1800" dirty="0" err="1">
-                <a:effectLst/>
-                <a:latin typeface="Segoe UI" panose="020B0502040204020203" pitchFamily="34" charset="0"/>
-              </a:rPr>
-              <a:t>respecitvely</a:t>
-            </a:r>
+              <a:t>This is the output of our first pass logistic regression model without any transformations done on the data.</a:t>
+            </a:r>
+          </a:p>
+          <a:p>
+            <a:endParaRPr lang="en-US" sz="1800" dirty="0">
+              <a:effectLst/>
+              <a:latin typeface="Segoe UI" panose="020B0502040204020203" pitchFamily="34" charset="0"/>
+            </a:endParaRPr>
+          </a:p>
+          <a:p>
             <a:r>
               <a:rPr lang="en-US" sz="1800" dirty="0">
                 <a:effectLst/>
                 <a:latin typeface="Segoe UI" panose="020B0502040204020203" pitchFamily="34" charset="0"/>
               </a:rPr>
-              <a:t> in the ACSI, contradicting the Logistic Regression model on Kaggle data</a:t>
-            </a:r>
-          </a:p>
-          <a:p>
-            <a:endParaRPr lang="en-US" sz="1800" dirty="0">
-              <a:effectLst/>
-              <a:latin typeface="Segoe UI" panose="020B0502040204020203" pitchFamily="34" charset="0"/>
-            </a:endParaRPr>
-          </a:p>
+              <a:t>We thought that Flight Distance and Food and Drink would be important and this model shows them as statistically insignificant.</a:t>
+            </a:r>
+            <a:endParaRPr lang="en-US" dirty="0"/>
+          </a:p>
+        </p:txBody>
+      </p:sp>
+      <p:sp>
+        <p:nvSpPr>
+          <p:cNvPr id="4" name="Slide Number Placeholder 3"/>
+          <p:cNvSpPr>
+            <a:spLocks noGrp="1"/>
+          </p:cNvSpPr>
+          <p:nvPr>
+            <p:ph type="sldNum" sz="quarter" idx="5"/>
+          </p:nvPr>
+        </p:nvSpPr>
+        <p:spPr/>
+        <p:txBody>
+          <a:bodyPr/>
+          <a:lstStyle/>
+          <a:p>
+            <a:fld id="{9BCCD4D3-9FFD-4D42-BD91-737D0D78D7F6}" type="slidenum">
+              <a:rPr lang="en-US" smtClean="0"/>
+              <a:t>7</a:t>
+            </a:fld>
+            <a:endParaRPr lang="en-US"/>
+          </a:p>
+        </p:txBody>
+      </p:sp>
+    </p:spTree>
+    <p:extLst>
+      <p:ext uri="{BB962C8B-B14F-4D97-AF65-F5344CB8AC3E}">
+        <p14:creationId xmlns:p14="http://schemas.microsoft.com/office/powerpoint/2010/main" val="1664157245"/>
+      </p:ext>
+    </p:extLst>
+  </p:cSld>
+  <p:clrMapOvr>
+    <a:masterClrMapping/>
+  </p:clrMapOvr>
+</p:notes>
+</file>
+
+<file path=ppt/notesSlides/notesSlide8.xml><?xml version="1.0" encoding="utf-8"?>
+<p:notes xmlns:a="http://schemas.openxmlformats.org/drawingml/2006/main" xmlns:r="http://schemas.openxmlformats.org/officeDocument/2006/relationships" xmlns:p="http://schemas.openxmlformats.org/presentationml/2006/main">
+  <p:cSld>
+    <p:spTree>
+      <p:nvGrpSpPr>
+        <p:cNvPr id="1" name=""/>
+        <p:cNvGrpSpPr/>
+        <p:nvPr/>
+      </p:nvGrpSpPr>
+      <p:grpSpPr>
+        <a:xfrm>
+          <a:off x="0" y="0"/>
+          <a:ext cx="0" cy="0"/>
+          <a:chOff x="0" y="0"/>
+          <a:chExt cx="0" cy="0"/>
+        </a:xfrm>
+      </p:grpSpPr>
+      <p:sp>
+        <p:nvSpPr>
+          <p:cNvPr id="2" name="Slide Image Placeholder 1"/>
+          <p:cNvSpPr>
+            <a:spLocks noGrp="1" noRot="1" noChangeAspect="1"/>
+          </p:cNvSpPr>
+          <p:nvPr>
+            <p:ph type="sldImg"/>
+          </p:nvPr>
+        </p:nvSpPr>
+        <p:spPr/>
+      </p:sp>
+      <p:sp>
+        <p:nvSpPr>
+          <p:cNvPr id="3" name="Notes Placeholder 2"/>
+          <p:cNvSpPr>
+            <a:spLocks noGrp="1"/>
+          </p:cNvSpPr>
+          <p:nvPr>
+            <p:ph type="body" idx="1"/>
+          </p:nvPr>
+        </p:nvSpPr>
+        <p:spPr/>
+        <p:txBody>
+          <a:bodyPr/>
+          <a:lstStyle/>
           <a:p>
             <a:r>
               <a:rPr lang="en-US" sz="1800" dirty="0">
                 <a:effectLst/>
                 <a:latin typeface="Segoe UI" panose="020B0502040204020203" pitchFamily="34" charset="0"/>
               </a:rPr>
-              <a:t>Cleanliness requirements changed after COVID.</a:t>
+              <a:t>This is the ROC – Area Under the Curve for our first pass model. We achieved an AUC of 0.927.</a:t>
             </a:r>
             <a:endParaRPr lang="en-US" dirty="0"/>
           </a:p>
@@ -1299,7 +1934,7 @@
           <a:p>
             <a:fld id="{9BCCD4D3-9FFD-4D42-BD91-737D0D78D7F6}" type="slidenum">
               <a:rPr lang="en-US" smtClean="0"/>
-              <a:t>11</a:t>
+              <a:t>8</a:t>
             </a:fld>
             <a:endParaRPr lang="en-US"/>
           </a:p>
@@ -1308,7 +1943,94 @@
     </p:spTree>
     <p:extLst>
       <p:ext uri="{BB962C8B-B14F-4D97-AF65-F5344CB8AC3E}">
-        <p14:creationId xmlns:p14="http://schemas.microsoft.com/office/powerpoint/2010/main" val="2572422361"/>
+        <p14:creationId xmlns:p14="http://schemas.microsoft.com/office/powerpoint/2010/main" val="3913242668"/>
+      </p:ext>
+    </p:extLst>
+  </p:cSld>
+  <p:clrMapOvr>
+    <a:masterClrMapping/>
+  </p:clrMapOvr>
+</p:notes>
+</file>
+
+<file path=ppt/notesSlides/notesSlide9.xml><?xml version="1.0" encoding="utf-8"?>
+<p:notes xmlns:a="http://schemas.openxmlformats.org/drawingml/2006/main" xmlns:r="http://schemas.openxmlformats.org/officeDocument/2006/relationships" xmlns:p="http://schemas.openxmlformats.org/presentationml/2006/main">
+  <p:cSld>
+    <p:spTree>
+      <p:nvGrpSpPr>
+        <p:cNvPr id="1" name=""/>
+        <p:cNvGrpSpPr/>
+        <p:nvPr/>
+      </p:nvGrpSpPr>
+      <p:grpSpPr>
+        <a:xfrm>
+          <a:off x="0" y="0"/>
+          <a:ext cx="0" cy="0"/>
+          <a:chOff x="0" y="0"/>
+          <a:chExt cx="0" cy="0"/>
+        </a:xfrm>
+      </p:grpSpPr>
+      <p:sp>
+        <p:nvSpPr>
+          <p:cNvPr id="2" name="Slide Image Placeholder 1"/>
+          <p:cNvSpPr>
+            <a:spLocks noGrp="1" noRot="1" noChangeAspect="1"/>
+          </p:cNvSpPr>
+          <p:nvPr>
+            <p:ph type="sldImg"/>
+          </p:nvPr>
+        </p:nvSpPr>
+        <p:spPr/>
+      </p:sp>
+      <p:sp>
+        <p:nvSpPr>
+          <p:cNvPr id="3" name="Notes Placeholder 2"/>
+          <p:cNvSpPr>
+            <a:spLocks noGrp="1"/>
+          </p:cNvSpPr>
+          <p:nvPr>
+            <p:ph type="body" idx="1"/>
+          </p:nvPr>
+        </p:nvSpPr>
+        <p:spPr/>
+        <p:txBody>
+          <a:bodyPr/>
+          <a:lstStyle/>
+          <a:p>
+            <a:r>
+              <a:rPr lang="en-US" dirty="0"/>
+              <a:t>We’ve evaluated the distributions and most factors have a relatively normal distribution but some are heavily biased towards the low end such as flight distance as seen on the left picture. In this case, applying a log transformation helps normalize the distribution as shown on the right picture.</a:t>
+            </a:r>
+          </a:p>
+        </p:txBody>
+      </p:sp>
+      <p:sp>
+        <p:nvSpPr>
+          <p:cNvPr id="4" name="Slide Number Placeholder 3"/>
+          <p:cNvSpPr>
+            <a:spLocks noGrp="1"/>
+          </p:cNvSpPr>
+          <p:nvPr>
+            <p:ph type="sldNum" sz="quarter" idx="5"/>
+          </p:nvPr>
+        </p:nvSpPr>
+        <p:spPr/>
+        <p:txBody>
+          <a:bodyPr/>
+          <a:lstStyle/>
+          <a:p>
+            <a:fld id="{9BCCD4D3-9FFD-4D42-BD91-737D0D78D7F6}" type="slidenum">
+              <a:rPr lang="en-US" smtClean="0"/>
+              <a:t>9</a:t>
+            </a:fld>
+            <a:endParaRPr lang="en-US"/>
+          </a:p>
+        </p:txBody>
+      </p:sp>
+    </p:spTree>
+    <p:extLst>
+      <p:ext uri="{BB962C8B-B14F-4D97-AF65-F5344CB8AC3E}">
+        <p14:creationId xmlns:p14="http://schemas.microsoft.com/office/powerpoint/2010/main" val="458872430"/>
       </p:ext>
     </p:extLst>
   </p:cSld>
@@ -1542,7 +2264,7 @@
           <a:p>
             <a:fld id="{1955A8DF-052F-408C-B32C-6128C7E474DA}" type="datetimeFigureOut">
               <a:rPr lang="en-US" smtClean="0"/>
-              <a:t>6/28/2023</a:t>
+              <a:t>6/29/2023</a:t>
             </a:fld>
             <a:endParaRPr lang="en-US"/>
           </a:p>
@@ -1712,7 +2434,7 @@
           <a:p>
             <a:fld id="{1955A8DF-052F-408C-B32C-6128C7E474DA}" type="datetimeFigureOut">
               <a:rPr lang="en-US" smtClean="0"/>
-              <a:t>6/28/2023</a:t>
+              <a:t>6/29/2023</a:t>
             </a:fld>
             <a:endParaRPr lang="en-US"/>
           </a:p>
@@ -1892,7 +2614,7 @@
           <a:p>
             <a:fld id="{1955A8DF-052F-408C-B32C-6128C7E474DA}" type="datetimeFigureOut">
               <a:rPr lang="en-US" smtClean="0"/>
-              <a:t>6/28/2023</a:t>
+              <a:t>6/29/2023</a:t>
             </a:fld>
             <a:endParaRPr lang="en-US"/>
           </a:p>
@@ -2062,7 +2784,7 @@
           <a:p>
             <a:fld id="{1955A8DF-052F-408C-B32C-6128C7E474DA}" type="datetimeFigureOut">
               <a:rPr lang="en-US" smtClean="0"/>
-              <a:t>6/28/2023</a:t>
+              <a:t>6/29/2023</a:t>
             </a:fld>
             <a:endParaRPr lang="en-US"/>
           </a:p>
@@ -2316,7 +3038,7 @@
           <a:p>
             <a:fld id="{1955A8DF-052F-408C-B32C-6128C7E474DA}" type="datetimeFigureOut">
               <a:rPr lang="en-US" smtClean="0"/>
-              <a:t>6/28/2023</a:t>
+              <a:t>6/29/2023</a:t>
             </a:fld>
             <a:endParaRPr lang="en-US"/>
           </a:p>
@@ -2604,7 +3326,7 @@
           <a:p>
             <a:fld id="{1955A8DF-052F-408C-B32C-6128C7E474DA}" type="datetimeFigureOut">
               <a:rPr lang="en-US" smtClean="0"/>
-              <a:t>6/28/2023</a:t>
+              <a:t>6/29/2023</a:t>
             </a:fld>
             <a:endParaRPr lang="en-US"/>
           </a:p>
@@ -3046,7 +3768,7 @@
           <a:p>
             <a:fld id="{1955A8DF-052F-408C-B32C-6128C7E474DA}" type="datetimeFigureOut">
               <a:rPr lang="en-US" smtClean="0"/>
-              <a:t>6/28/2023</a:t>
+              <a:t>6/29/2023</a:t>
             </a:fld>
             <a:endParaRPr lang="en-US"/>
           </a:p>
@@ -3164,7 +3886,7 @@
           <a:p>
             <a:fld id="{1955A8DF-052F-408C-B32C-6128C7E474DA}" type="datetimeFigureOut">
               <a:rPr lang="en-US" smtClean="0"/>
-              <a:t>6/28/2023</a:t>
+              <a:t>6/29/2023</a:t>
             </a:fld>
             <a:endParaRPr lang="en-US"/>
           </a:p>
@@ -3259,7 +3981,7 @@
           <a:p>
             <a:fld id="{1955A8DF-052F-408C-B32C-6128C7E474DA}" type="datetimeFigureOut">
               <a:rPr lang="en-US" smtClean="0"/>
-              <a:t>6/28/2023</a:t>
+              <a:t>6/29/2023</a:t>
             </a:fld>
             <a:endParaRPr lang="en-US"/>
           </a:p>
@@ -3547,7 +4269,7 @@
           <a:p>
             <a:fld id="{1955A8DF-052F-408C-B32C-6128C7E474DA}" type="datetimeFigureOut">
               <a:rPr lang="en-US" smtClean="0"/>
-              <a:t>6/28/2023</a:t>
+              <a:t>6/29/2023</a:t>
             </a:fld>
             <a:endParaRPr lang="en-US"/>
           </a:p>
@@ -3820,7 +4542,7 @@
           <a:p>
             <a:fld id="{1955A8DF-052F-408C-B32C-6128C7E474DA}" type="datetimeFigureOut">
               <a:rPr lang="en-US" smtClean="0"/>
-              <a:t>6/28/2023</a:t>
+              <a:t>6/29/2023</a:t>
             </a:fld>
             <a:endParaRPr lang="en-US"/>
           </a:p>
@@ -4117,7 +4839,7 @@
           <a:p>
             <a:fld id="{1955A8DF-052F-408C-B32C-6128C7E474DA}" type="datetimeFigureOut">
               <a:rPr lang="en-US" smtClean="0"/>
-              <a:t>6/28/2023</a:t>
+              <a:t>6/29/2023</a:t>
             </a:fld>
             <a:endParaRPr lang="en-US"/>
           </a:p>
@@ -4978,18 +5700,6 @@
               <a:t>5</a:t>
             </a:r>
           </a:p>
-          <a:p>
-            <a:pPr lvl="1"/>
-            <a:r>
-              <a:rPr lang="en-US" dirty="0"/>
-              <a:t>ACSI Dataset seems to contradict some of the findings from the primary dataset</a:t>
-            </a:r>
-            <a:r>
-              <a:rPr lang="en-US" baseline="30000" dirty="0"/>
-              <a:t>3</a:t>
-            </a:r>
-            <a:endParaRPr lang="en-US" dirty="0"/>
-          </a:p>
         </p:txBody>
       </p:sp>
     </p:spTree>
@@ -5175,484 +5885,6 @@
 </p:sld>
 </file>
 
-<file path=ppt/slides/slide13.xml><?xml version="1.0" encoding="utf-8"?>
-<p:sld xmlns:a="http://schemas.openxmlformats.org/drawingml/2006/main" xmlns:r="http://schemas.openxmlformats.org/officeDocument/2006/relationships" xmlns:p="http://schemas.openxmlformats.org/presentationml/2006/main">
-  <p:cSld>
-    <p:spTree>
-      <p:nvGrpSpPr>
-        <p:cNvPr id="1" name=""/>
-        <p:cNvGrpSpPr/>
-        <p:nvPr/>
-      </p:nvGrpSpPr>
-      <p:grpSpPr>
-        <a:xfrm>
-          <a:off x="0" y="0"/>
-          <a:ext cx="0" cy="0"/>
-          <a:chOff x="0" y="0"/>
-          <a:chExt cx="0" cy="0"/>
-        </a:xfrm>
-      </p:grpSpPr>
-      <p:sp>
-        <p:nvSpPr>
-          <p:cNvPr id="4" name="Title 3">
-            <a:extLst>
-              <a:ext uri="{FF2B5EF4-FFF2-40B4-BE49-F238E27FC236}">
-                <a16:creationId xmlns:a16="http://schemas.microsoft.com/office/drawing/2014/main" id="{2A57183B-6D6C-F8E5-9A36-5D7DD1BFF97B}"/>
-              </a:ext>
-            </a:extLst>
-          </p:cNvPr>
-          <p:cNvSpPr>
-            <a:spLocks noGrp="1"/>
-          </p:cNvSpPr>
-          <p:nvPr>
-            <p:ph type="title"/>
-          </p:nvPr>
-        </p:nvSpPr>
-        <p:spPr/>
-        <p:txBody>
-          <a:bodyPr/>
-          <a:lstStyle/>
-          <a:p>
-            <a:r>
-              <a:rPr lang="en-US"/>
-              <a:t>Project Requirements</a:t>
-            </a:r>
-            <a:br>
-              <a:rPr lang="en-US"/>
-            </a:br>
-            <a:br>
-              <a:rPr lang="en-US"/>
-            </a:br>
-            <a:r>
-              <a:rPr lang="en-US"/>
-              <a:t>Delete once done</a:t>
-            </a:r>
-            <a:endParaRPr lang="en-US" dirty="0"/>
-          </a:p>
-        </p:txBody>
-      </p:sp>
-      <p:sp>
-        <p:nvSpPr>
-          <p:cNvPr id="5" name="Content Placeholder 4">
-            <a:extLst>
-              <a:ext uri="{FF2B5EF4-FFF2-40B4-BE49-F238E27FC236}">
-                <a16:creationId xmlns:a16="http://schemas.microsoft.com/office/drawing/2014/main" id="{84EBB694-C084-1AEB-4E61-EB59207B5ECC}"/>
-              </a:ext>
-            </a:extLst>
-          </p:cNvPr>
-          <p:cNvSpPr>
-            <a:spLocks noGrp="1"/>
-          </p:cNvSpPr>
-          <p:nvPr>
-            <p:ph idx="1"/>
-          </p:nvPr>
-        </p:nvSpPr>
-        <p:spPr/>
-        <p:txBody>
-          <a:bodyPr>
-            <a:normAutofit fontScale="85000" lnSpcReduction="20000"/>
-          </a:bodyPr>
-          <a:lstStyle/>
-          <a:p>
-            <a:pPr marL="0" marR="0">
-              <a:lnSpc>
-                <a:spcPct val="107000"/>
-              </a:lnSpc>
-              <a:spcBef>
-                <a:spcPts val="1600"/>
-              </a:spcBef>
-              <a:spcAft>
-                <a:spcPts val="400"/>
-              </a:spcAft>
-            </a:pPr>
-            <a:r>
-              <a:rPr lang="en-US" sz="1800" b="1" dirty="0">
-                <a:solidFill>
-                  <a:srgbClr val="434343"/>
-                </a:solidFill>
-                <a:effectLst/>
-                <a:ea typeface="Georgia" panose="02040502050405020303" pitchFamily="18" charset="0"/>
-                <a:cs typeface="Georgia" panose="02040502050405020303" pitchFamily="18" charset="0"/>
-              </a:rPr>
-              <a:t>What to Include &amp; What is Required? </a:t>
-            </a:r>
-          </a:p>
-          <a:p>
-            <a:pPr marL="342900" marR="0" lvl="0" indent="-342900">
-              <a:spcBef>
-                <a:spcPts val="0"/>
-              </a:spcBef>
-              <a:spcAft>
-                <a:spcPts val="0"/>
-              </a:spcAft>
-              <a:buFont typeface="+mj-lt"/>
-              <a:buAutoNum type="arabicPeriod"/>
-            </a:pPr>
-            <a:r>
-              <a:rPr lang="en-US" sz="1800" u="none" strike="noStrike" dirty="0">
-                <a:effectLst/>
-                <a:ea typeface="Nunito" pitchFamily="2" charset="0"/>
-                <a:cs typeface="Nunito" pitchFamily="2" charset="0"/>
-              </a:rPr>
-              <a:t>4-5 minutes of video/audio content that presents your group’s project proposal</a:t>
-            </a:r>
-          </a:p>
-          <a:p>
-            <a:pPr marL="342900" marR="0" lvl="0" indent="-342900">
-              <a:spcBef>
-                <a:spcPts val="0"/>
-              </a:spcBef>
-              <a:spcAft>
-                <a:spcPts val="0"/>
-              </a:spcAft>
-              <a:buFont typeface="+mj-lt"/>
-              <a:buAutoNum type="arabicPeriod"/>
-            </a:pPr>
-            <a:r>
-              <a:rPr lang="en-US" sz="1800" u="none" strike="noStrike" dirty="0">
-                <a:effectLst/>
-                <a:highlight>
-                  <a:srgbClr val="00FF00"/>
-                </a:highlight>
-                <a:ea typeface="Nunito" pitchFamily="2" charset="0"/>
-                <a:cs typeface="Nunito" pitchFamily="2" charset="0"/>
-              </a:rPr>
-              <a:t>Team members' names should be listed in the presentation.</a:t>
-            </a:r>
-          </a:p>
-          <a:p>
-            <a:pPr marL="342900" marR="0" lvl="0" indent="-342900">
-              <a:spcBef>
-                <a:spcPts val="0"/>
-              </a:spcBef>
-              <a:spcAft>
-                <a:spcPts val="0"/>
-              </a:spcAft>
-              <a:buFont typeface="+mj-lt"/>
-              <a:buAutoNum type="arabicPeriod"/>
-            </a:pPr>
-            <a:r>
-              <a:rPr lang="en-US" sz="1800" u="none" strike="noStrike" dirty="0">
-                <a:effectLst/>
-                <a:ea typeface="Nunito" pitchFamily="2" charset="0"/>
-                <a:cs typeface="Nunito" pitchFamily="2" charset="0"/>
-              </a:rPr>
-              <a:t>Speaker should mention who they are before speaking – during video</a:t>
-            </a:r>
-          </a:p>
-          <a:p>
-            <a:pPr marL="342900" marR="0" lvl="0" indent="-342900">
-              <a:spcBef>
-                <a:spcPts val="0"/>
-              </a:spcBef>
-              <a:spcAft>
-                <a:spcPts val="0"/>
-              </a:spcAft>
-              <a:buFont typeface="+mj-lt"/>
-              <a:buAutoNum type="arabicPeriod"/>
-            </a:pPr>
-            <a:r>
-              <a:rPr lang="en-US" sz="1800" u="none" strike="noStrike" dirty="0">
-                <a:effectLst/>
-                <a:highlight>
-                  <a:srgbClr val="00FF00"/>
-                </a:highlight>
-                <a:ea typeface="Nunito" pitchFamily="2" charset="0"/>
-                <a:cs typeface="Nunito" pitchFamily="2" charset="0"/>
-              </a:rPr>
-              <a:t>Necessary background information/framing of the problem.</a:t>
-            </a:r>
-          </a:p>
-          <a:p>
-            <a:pPr marL="342900" marR="0" lvl="0" indent="-342900">
-              <a:spcBef>
-                <a:spcPts val="0"/>
-              </a:spcBef>
-              <a:spcAft>
-                <a:spcPts val="0"/>
-              </a:spcAft>
-              <a:buFont typeface="+mj-lt"/>
-              <a:buAutoNum type="arabicPeriod"/>
-            </a:pPr>
-            <a:r>
-              <a:rPr lang="en-US" sz="1800" u="none" strike="noStrike" dirty="0">
-                <a:effectLst/>
-                <a:highlight>
-                  <a:srgbClr val="00FF00"/>
-                </a:highlight>
-                <a:ea typeface="Nunito" pitchFamily="2" charset="0"/>
-                <a:cs typeface="Nunito" pitchFamily="2" charset="0"/>
-              </a:rPr>
-              <a:t>Include an overview of the problem in general as well as your planned approach (it is ok if this approach changes later in the project as you learn more information)</a:t>
-            </a:r>
-          </a:p>
-          <a:p>
-            <a:pPr marL="342900" marR="0" lvl="0" indent="-342900">
-              <a:spcBef>
-                <a:spcPts val="0"/>
-              </a:spcBef>
-              <a:spcAft>
-                <a:spcPts val="0"/>
-              </a:spcAft>
-              <a:buFont typeface="+mj-lt"/>
-              <a:buAutoNum type="arabicPeriod"/>
-            </a:pPr>
-            <a:r>
-              <a:rPr lang="en-US" sz="1800" u="none" strike="noStrike" dirty="0">
-                <a:effectLst/>
-                <a:highlight>
-                  <a:srgbClr val="00FF00"/>
-                </a:highlight>
-                <a:ea typeface="Nunito" pitchFamily="2" charset="0"/>
-                <a:cs typeface="Nunito" pitchFamily="2" charset="0"/>
-              </a:rPr>
-              <a:t>Any initial hypotheses?</a:t>
-            </a:r>
-          </a:p>
-          <a:p>
-            <a:pPr marL="342900" marR="0" lvl="0" indent="-342900">
-              <a:spcBef>
-                <a:spcPts val="0"/>
-              </a:spcBef>
-              <a:spcAft>
-                <a:spcPts val="0"/>
-              </a:spcAft>
-              <a:buFont typeface="+mj-lt"/>
-              <a:buAutoNum type="arabicPeriod"/>
-            </a:pPr>
-            <a:r>
-              <a:rPr lang="en-US" sz="1800" u="none" strike="noStrike" dirty="0">
-                <a:effectLst/>
-                <a:ea typeface="Nunito" pitchFamily="2" charset="0"/>
-                <a:cs typeface="Nunito" pitchFamily="2" charset="0"/>
-              </a:rPr>
-              <a:t>What type of models do you plan to use?</a:t>
-            </a:r>
-          </a:p>
-          <a:p>
-            <a:pPr marL="342900" marR="0" lvl="0" indent="-342900">
-              <a:spcBef>
-                <a:spcPts val="0"/>
-              </a:spcBef>
-              <a:spcAft>
-                <a:spcPts val="0"/>
-              </a:spcAft>
-              <a:buFont typeface="+mj-lt"/>
-              <a:buAutoNum type="arabicPeriod"/>
-            </a:pPr>
-            <a:r>
-              <a:rPr lang="en-US" sz="1800" u="none" strike="noStrike" dirty="0">
-                <a:effectLst/>
-                <a:highlight>
-                  <a:srgbClr val="00FF00"/>
-                </a:highlight>
-                <a:ea typeface="Nunito" pitchFamily="2" charset="0"/>
-                <a:cs typeface="Nunito" pitchFamily="2" charset="0"/>
-              </a:rPr>
-              <a:t>How has your data cleaning progressed?</a:t>
-            </a:r>
-          </a:p>
-          <a:p>
-            <a:pPr marL="342900" marR="0" lvl="0" indent="-342900">
-              <a:spcBef>
-                <a:spcPts val="0"/>
-              </a:spcBef>
-              <a:spcAft>
-                <a:spcPts val="0"/>
-              </a:spcAft>
-              <a:buFont typeface="+mj-lt"/>
-              <a:buAutoNum type="arabicPeriod"/>
-            </a:pPr>
-            <a:r>
-              <a:rPr lang="en-US" sz="1800" u="none" strike="noStrike" dirty="0">
-                <a:effectLst/>
-                <a:highlight>
-                  <a:srgbClr val="00FF00"/>
-                </a:highlight>
-                <a:ea typeface="Nunito" pitchFamily="2" charset="0"/>
-                <a:cs typeface="Nunito" pitchFamily="2" charset="0"/>
-              </a:rPr>
-              <a:t>If you encounter any unexpected problems, challenges, or interesting findings please mention these. Discussion of things that didn’t work is also encouraged. </a:t>
-            </a:r>
-          </a:p>
-          <a:p>
-            <a:pPr marL="342900" marR="0" lvl="0" indent="-342900">
-              <a:spcBef>
-                <a:spcPts val="0"/>
-              </a:spcBef>
-              <a:spcAft>
-                <a:spcPts val="0"/>
-              </a:spcAft>
-              <a:buFont typeface="+mj-lt"/>
-              <a:buAutoNum type="arabicPeriod"/>
-            </a:pPr>
-            <a:r>
-              <a:rPr lang="en-US" sz="1800" u="none" strike="noStrike" dirty="0">
-                <a:effectLst/>
-                <a:highlight>
-                  <a:srgbClr val="00FF00"/>
-                </a:highlight>
-                <a:ea typeface="Nunito" pitchFamily="2" charset="0"/>
-                <a:cs typeface="Nunito" pitchFamily="2" charset="0"/>
-              </a:rPr>
-              <a:t>You could include things like any new datasets that you have found, any analysis that you have done on the datasets, or any other impactful and measurable progress that you have made thus far. </a:t>
-            </a:r>
-          </a:p>
-          <a:p>
-            <a:pPr marL="342900" marR="0" lvl="0" indent="-342900">
-              <a:spcBef>
-                <a:spcPts val="0"/>
-              </a:spcBef>
-              <a:spcAft>
-                <a:spcPts val="0"/>
-              </a:spcAft>
-              <a:buFont typeface="+mj-lt"/>
-              <a:buAutoNum type="arabicPeriod"/>
-            </a:pPr>
-            <a:r>
-              <a:rPr lang="en-US" sz="1800" u="none" strike="noStrike" dirty="0">
-                <a:effectLst/>
-                <a:ea typeface="Nunito" pitchFamily="2" charset="0"/>
-                <a:cs typeface="Nunito" pitchFamily="2" charset="0"/>
-              </a:rPr>
-              <a:t>The team should review 2-3 research articles/papers/Kaggle kernels/ etc. related to your problem statement and then discuss them.. Be sure to cite the reference at the end of the slide show or visual medium.</a:t>
-            </a:r>
-          </a:p>
-          <a:p>
-            <a:pPr marL="342900" marR="0" lvl="0" indent="-342900">
-              <a:spcBef>
-                <a:spcPts val="0"/>
-              </a:spcBef>
-              <a:spcAft>
-                <a:spcPts val="0"/>
-              </a:spcAft>
-              <a:buFont typeface="+mj-lt"/>
-              <a:buAutoNum type="arabicPeriod"/>
-            </a:pPr>
-            <a:r>
-              <a:rPr lang="en-US" sz="1800" u="none" strike="noStrike" dirty="0">
-                <a:effectLst/>
-                <a:ea typeface="Nunito" pitchFamily="2" charset="0"/>
-                <a:cs typeface="Nunito" pitchFamily="2" charset="0"/>
-              </a:rPr>
-              <a:t>If you have any graphs or key visuals to include, be sure to add titles, captions, labels, axes, legends, and most importantly context where necessary!</a:t>
-            </a:r>
-          </a:p>
-          <a:p>
-            <a:pPr marL="342900" marR="0" lvl="0" indent="-342900">
-              <a:spcBef>
-                <a:spcPts val="0"/>
-              </a:spcBef>
-              <a:spcAft>
-                <a:spcPts val="0"/>
-              </a:spcAft>
-              <a:buFont typeface="+mj-lt"/>
-              <a:buAutoNum type="arabicPeriod"/>
-            </a:pPr>
-            <a:r>
-              <a:rPr lang="en-US" sz="1800" u="none" strike="noStrike" dirty="0">
-                <a:effectLst/>
-                <a:ea typeface="Nunito" pitchFamily="2" charset="0"/>
-                <a:cs typeface="Nunito" pitchFamily="2" charset="0"/>
-              </a:rPr>
-              <a:t>Visuals and Slides are necessary; DO NOT just read your written project proposal</a:t>
-            </a:r>
-          </a:p>
-          <a:p>
-            <a:pPr marL="342900" marR="0" lvl="0" indent="-342900">
-              <a:spcBef>
-                <a:spcPts val="0"/>
-              </a:spcBef>
-              <a:spcAft>
-                <a:spcPts val="0"/>
-              </a:spcAft>
-              <a:buFont typeface="+mj-lt"/>
-              <a:buAutoNum type="arabicPeriod"/>
-            </a:pPr>
-            <a:r>
-              <a:rPr lang="en-US" sz="1800" u="none" strike="noStrike" dirty="0">
-                <a:effectLst/>
-                <a:ea typeface="Nunito" pitchFamily="2" charset="0"/>
-                <a:cs typeface="Nunito" pitchFamily="2" charset="0"/>
-              </a:rPr>
-              <a:t>Include audio narration</a:t>
-            </a:r>
-          </a:p>
-          <a:p>
-            <a:pPr marL="342900" marR="0" lvl="0" indent="-342900">
-              <a:spcBef>
-                <a:spcPts val="0"/>
-              </a:spcBef>
-              <a:spcAft>
-                <a:spcPts val="0"/>
-              </a:spcAft>
-              <a:buFont typeface="+mj-lt"/>
-              <a:buAutoNum type="arabicPeriod"/>
-            </a:pPr>
-            <a:r>
-              <a:rPr lang="en-US" sz="1800" u="none" strike="noStrike" dirty="0">
-                <a:effectLst/>
-                <a:ea typeface="Nunito" pitchFamily="2" charset="0"/>
-                <a:cs typeface="Nunito" pitchFamily="2" charset="0"/>
-              </a:rPr>
-              <a:t>We do not require all group members to be part of the video given the limited time allocated </a:t>
-            </a:r>
-          </a:p>
-          <a:p>
-            <a:pPr marL="342900" marR="0" lvl="0" indent="-342900">
-              <a:spcBef>
-                <a:spcPts val="0"/>
-              </a:spcBef>
-              <a:spcAft>
-                <a:spcPts val="0"/>
-              </a:spcAft>
-              <a:buFont typeface="+mj-lt"/>
-              <a:buAutoNum type="arabicPeriod"/>
-            </a:pPr>
-            <a:r>
-              <a:rPr lang="en-US" sz="1800" u="none" strike="noStrike" dirty="0">
-                <a:effectLst/>
-                <a:ea typeface="Nunito" pitchFamily="2" charset="0"/>
-                <a:cs typeface="Nunito" pitchFamily="2" charset="0"/>
-              </a:rPr>
-              <a:t>Sources cited on the last slide (no need to read them just include them).</a:t>
-            </a:r>
-          </a:p>
-          <a:p>
-            <a:pPr marL="342900" marR="0" lvl="0" indent="-342900">
-              <a:spcBef>
-                <a:spcPts val="0"/>
-              </a:spcBef>
-              <a:spcAft>
-                <a:spcPts val="0"/>
-              </a:spcAft>
-              <a:buFont typeface="+mj-lt"/>
-              <a:buAutoNum type="arabicPeriod"/>
-            </a:pPr>
-            <a:r>
-              <a:rPr lang="en-US" sz="1800" u="none" strike="noStrike" dirty="0">
-                <a:effectLst/>
-                <a:ea typeface="Nunito" pitchFamily="2" charset="0"/>
-                <a:cs typeface="Nunito" pitchFamily="2" charset="0"/>
-              </a:rPr>
-              <a:t>4-5 minutes is a limited time window to cover all these things but do your best to manage this time wisely and play to your strengths and present a clear idea of your project</a:t>
-            </a:r>
-          </a:p>
-        </p:txBody>
-      </p:sp>
-    </p:spTree>
-    <p:extLst>
-      <p:ext uri="{BB962C8B-B14F-4D97-AF65-F5344CB8AC3E}">
-        <p14:creationId xmlns:p14="http://schemas.microsoft.com/office/powerpoint/2010/main" val="2259079471"/>
-      </p:ext>
-    </p:extLst>
-  </p:cSld>
-  <p:clrMapOvr>
-    <a:masterClrMapping/>
-  </p:clrMapOvr>
-</p:sld>
-</file>
-
 <file path=ppt/slides/slide2.xml><?xml version="1.0" encoding="utf-8"?>
 <p:sld xmlns:a="http://schemas.openxmlformats.org/drawingml/2006/main" xmlns:r="http://schemas.openxmlformats.org/officeDocument/2006/relationships" xmlns:p="http://schemas.openxmlformats.org/presentationml/2006/main">
   <p:cSld>
@@ -6144,7 +6376,7 @@
           <p:nvPr/>
         </p:nvPicPr>
         <p:blipFill rotWithShape="1">
-          <a:blip r:embed="rId2"/>
+          <a:blip r:embed="rId3"/>
           <a:srcRect t="11845"/>
           <a:stretch/>
         </p:blipFill>
@@ -6796,7 +7028,7 @@
         <p:spPr/>
         <p:txBody>
           <a:bodyPr>
-            <a:normAutofit lnSpcReduction="10000"/>
+            <a:normAutofit fontScale="92500" lnSpcReduction="20000"/>
           </a:bodyPr>
           <a:lstStyle/>
           <a:p>
@@ -6881,6 +7113,17 @@
               <a:rPr lang="en-US" dirty="0"/>
               <a:t>Understanding how to map a binary satisfaction variable to a Likert scale variable</a:t>
             </a:r>
+          </a:p>
+          <a:p>
+            <a:r>
+              <a:rPr lang="en-US" dirty="0"/>
+              <a:t>American Customer Satisfaction Index  (ACSI) Dataset seems to contradict some of the findings from the primary dataset</a:t>
+            </a:r>
+            <a:r>
+              <a:rPr lang="en-US" baseline="30000" dirty="0"/>
+              <a:t>3</a:t>
+            </a:r>
+            <a:endParaRPr lang="en-US" dirty="0"/>
           </a:p>
         </p:txBody>
       </p:sp>
@@ -7262,6 +7505,113 @@
         </p:nvSpPr>
         <p:spPr/>
         <p:txBody>
+          <a:bodyPr/>
+          <a:lstStyle/>
+          <a:p>
+            <a:r>
+              <a:rPr lang="en-US" dirty="0"/>
+              <a:t>Modelling: First Pass Logistic Regression</a:t>
+            </a:r>
+          </a:p>
+        </p:txBody>
+      </p:sp>
+      <p:pic>
+        <p:nvPicPr>
+          <p:cNvPr id="6" name="Picture 2">
+            <a:extLst>
+              <a:ext uri="{FF2B5EF4-FFF2-40B4-BE49-F238E27FC236}">
+                <a16:creationId xmlns:a16="http://schemas.microsoft.com/office/drawing/2014/main" id="{8076B872-D24D-D4EF-B55C-311F36B8BCA2}"/>
+              </a:ext>
+            </a:extLst>
+          </p:cNvPr>
+          <p:cNvPicPr>
+            <a:picLocks noGrp="1" noChangeAspect="1" noChangeArrowheads="1"/>
+          </p:cNvPicPr>
+          <p:nvPr>
+            <p:ph idx="1"/>
+          </p:nvPr>
+        </p:nvPicPr>
+        <p:blipFill>
+          <a:blip r:embed="rId3">
+            <a:extLst>
+              <a:ext uri="{28A0092B-C50C-407E-A947-70E740481C1C}">
+                <a14:useLocalDpi xmlns:a14="http://schemas.microsoft.com/office/drawing/2010/main" val="0"/>
+              </a:ext>
+            </a:extLst>
+          </a:blip>
+          <a:srcRect/>
+          <a:stretch>
+            <a:fillRect/>
+          </a:stretch>
+        </p:blipFill>
+        <p:spPr bwMode="auto">
+          <a:xfrm>
+            <a:off x="3868738" y="1065847"/>
+            <a:ext cx="7315200" cy="4716780"/>
+          </a:xfrm>
+          <a:prstGeom prst="rect">
+            <a:avLst/>
+          </a:prstGeom>
+          <a:noFill/>
+          <a:extLst>
+            <a:ext uri="{909E8E84-426E-40DD-AFC4-6F175D3DCCD1}">
+              <a14:hiddenFill xmlns:a14="http://schemas.microsoft.com/office/drawing/2010/main">
+                <a:solidFill>
+                  <a:srgbClr val="FFFFFF"/>
+                </a:solidFill>
+              </a14:hiddenFill>
+            </a:ext>
+          </a:extLst>
+        </p:spPr>
+      </p:pic>
+    </p:spTree>
+    <p:extLst>
+      <p:ext uri="{BB962C8B-B14F-4D97-AF65-F5344CB8AC3E}">
+        <p14:creationId xmlns:p14="http://schemas.microsoft.com/office/powerpoint/2010/main" val="2113175173"/>
+      </p:ext>
+    </p:extLst>
+  </p:cSld>
+  <p:clrMapOvr>
+    <a:masterClrMapping/>
+  </p:clrMapOvr>
+</p:sld>
+</file>
+
+<file path=ppt/slides/slide9.xml><?xml version="1.0" encoding="utf-8"?>
+<p:sld xmlns:a="http://schemas.openxmlformats.org/drawingml/2006/main" xmlns:r="http://schemas.openxmlformats.org/officeDocument/2006/relationships" xmlns:p="http://schemas.openxmlformats.org/presentationml/2006/main">
+  <p:cSld>
+    <p:spTree>
+      <p:nvGrpSpPr>
+        <p:cNvPr id="1" name=""/>
+        <p:cNvGrpSpPr/>
+        <p:nvPr/>
+      </p:nvGrpSpPr>
+      <p:grpSpPr>
+        <a:xfrm>
+          <a:off x="0" y="0"/>
+          <a:ext cx="0" cy="0"/>
+          <a:chOff x="0" y="0"/>
+          <a:chExt cx="0" cy="0"/>
+        </a:xfrm>
+      </p:grpSpPr>
+      <p:sp>
+        <p:nvSpPr>
+          <p:cNvPr id="2" name="Title 1">
+            <a:extLst>
+              <a:ext uri="{FF2B5EF4-FFF2-40B4-BE49-F238E27FC236}">
+                <a16:creationId xmlns:a16="http://schemas.microsoft.com/office/drawing/2014/main" id="{BC8107AF-A697-F007-FBC6-663EEACE8539}"/>
+              </a:ext>
+            </a:extLst>
+          </p:cNvPr>
+          <p:cNvSpPr>
+            <a:spLocks noGrp="1"/>
+          </p:cNvSpPr>
+          <p:nvPr>
+            <p:ph type="title"/>
+          </p:nvPr>
+        </p:nvSpPr>
+        <p:spPr/>
+        <p:txBody>
           <a:bodyPr>
             <a:normAutofit/>
           </a:bodyPr>
@@ -7291,7 +7641,7 @@
           </p:nvPr>
         </p:nvPicPr>
         <p:blipFill>
-          <a:blip r:embed="rId2"/>
+          <a:blip r:embed="rId3"/>
           <a:stretch>
             <a:fillRect/>
           </a:stretch>
@@ -7323,7 +7673,7 @@
           </p:nvPr>
         </p:nvPicPr>
         <p:blipFill>
-          <a:blip r:embed="rId3"/>
+          <a:blip r:embed="rId4"/>
           <a:stretch>
             <a:fillRect/>
           </a:stretch>
@@ -7342,134 +7692,6 @@
     <p:extLst>
       <p:ext uri="{BB962C8B-B14F-4D97-AF65-F5344CB8AC3E}">
         <p14:creationId xmlns:p14="http://schemas.microsoft.com/office/powerpoint/2010/main" val="521541812"/>
-      </p:ext>
-    </p:extLst>
-  </p:cSld>
-  <p:clrMapOvr>
-    <a:masterClrMapping/>
-  </p:clrMapOvr>
-</p:sld>
-</file>
-
-<file path=ppt/slides/slide9.xml><?xml version="1.0" encoding="utf-8"?>
-<p:sld xmlns:a="http://schemas.openxmlformats.org/drawingml/2006/main" xmlns:r="http://schemas.openxmlformats.org/officeDocument/2006/relationships" xmlns:p="http://schemas.openxmlformats.org/presentationml/2006/main" show="0">
-  <p:cSld>
-    <p:spTree>
-      <p:nvGrpSpPr>
-        <p:cNvPr id="1" name=""/>
-        <p:cNvGrpSpPr/>
-        <p:nvPr/>
-      </p:nvGrpSpPr>
-      <p:grpSpPr>
-        <a:xfrm>
-          <a:off x="0" y="0"/>
-          <a:ext cx="0" cy="0"/>
-          <a:chOff x="0" y="0"/>
-          <a:chExt cx="0" cy="0"/>
-        </a:xfrm>
-      </p:grpSpPr>
-      <p:sp>
-        <p:nvSpPr>
-          <p:cNvPr id="2" name="Title 1">
-            <a:extLst>
-              <a:ext uri="{FF2B5EF4-FFF2-40B4-BE49-F238E27FC236}">
-                <a16:creationId xmlns:a16="http://schemas.microsoft.com/office/drawing/2014/main" id="{BC8107AF-A697-F007-FBC6-663EEACE8539}"/>
-              </a:ext>
-            </a:extLst>
-          </p:cNvPr>
-          <p:cNvSpPr>
-            <a:spLocks noGrp="1"/>
-          </p:cNvSpPr>
-          <p:nvPr>
-            <p:ph type="title"/>
-          </p:nvPr>
-        </p:nvSpPr>
-        <p:spPr/>
-        <p:txBody>
-          <a:bodyPr>
-            <a:normAutofit/>
-          </a:bodyPr>
-          <a:lstStyle/>
-          <a:p>
-            <a:r>
-              <a:rPr lang="en-US" sz="3200" dirty="0"/>
-              <a:t>Correlations</a:t>
-            </a:r>
-          </a:p>
-        </p:txBody>
-      </p:sp>
-      <p:pic>
-        <p:nvPicPr>
-          <p:cNvPr id="1028" name="Picture 4">
-            <a:extLst>
-              <a:ext uri="{FF2B5EF4-FFF2-40B4-BE49-F238E27FC236}">
-                <a16:creationId xmlns:a16="http://schemas.microsoft.com/office/drawing/2014/main" id="{30103BDC-F197-1BF9-1057-8B9504983A74}"/>
-              </a:ext>
-            </a:extLst>
-          </p:cNvPr>
-          <p:cNvPicPr>
-            <a:picLocks noGrp="1" noChangeAspect="1" noChangeArrowheads="1"/>
-          </p:cNvPicPr>
-          <p:nvPr>
-            <p:ph type="pic" idx="1"/>
-          </p:nvPr>
-        </p:nvPicPr>
-        <p:blipFill>
-          <a:blip r:embed="rId3">
-            <a:extLst>
-              <a:ext uri="{28A0092B-C50C-407E-A947-70E740481C1C}">
-                <a14:useLocalDpi xmlns:a14="http://schemas.microsoft.com/office/drawing/2010/main" val="0"/>
-              </a:ext>
-            </a:extLst>
-          </a:blip>
-          <a:srcRect l="5916" r="5916"/>
-          <a:stretch/>
-        </p:blipFill>
-        <p:spPr bwMode="auto">
-          <a:prstGeom prst="rect">
-            <a:avLst/>
-          </a:prstGeom>
-          <a:noFill/>
-          <a:extLst>
-            <a:ext uri="{909E8E84-426E-40DD-AFC4-6F175D3DCCD1}">
-              <a14:hiddenFill xmlns:a14="http://schemas.microsoft.com/office/drawing/2010/main">
-                <a:solidFill>
-                  <a:srgbClr val="FFFFFF"/>
-                </a:solidFill>
-              </a14:hiddenFill>
-            </a:ext>
-          </a:extLst>
-        </p:spPr>
-      </p:pic>
-      <p:sp>
-        <p:nvSpPr>
-          <p:cNvPr id="12" name="Text Placeholder 11">
-            <a:extLst>
-              <a:ext uri="{FF2B5EF4-FFF2-40B4-BE49-F238E27FC236}">
-                <a16:creationId xmlns:a16="http://schemas.microsoft.com/office/drawing/2014/main" id="{17778BA2-3DC9-6508-17DA-2D113072365F}"/>
-              </a:ext>
-            </a:extLst>
-          </p:cNvPr>
-          <p:cNvSpPr>
-            <a:spLocks noGrp="1"/>
-          </p:cNvSpPr>
-          <p:nvPr>
-            <p:ph type="body" sz="half" idx="2"/>
-          </p:nvPr>
-        </p:nvSpPr>
-        <p:spPr/>
-        <p:txBody>
-          <a:bodyPr/>
-          <a:lstStyle/>
-          <a:p>
-            <a:endParaRPr lang="en-US"/>
-          </a:p>
-        </p:txBody>
-      </p:sp>
-    </p:spTree>
-    <p:extLst>
-      <p:ext uri="{BB962C8B-B14F-4D97-AF65-F5344CB8AC3E}">
-        <p14:creationId xmlns:p14="http://schemas.microsoft.com/office/powerpoint/2010/main" val="2352494914"/>
       </p:ext>
     </p:extLst>
   </p:cSld>

</xml_diff>

<commit_message>
Uploading summary of research papers for progress report
</commit_message>
<xml_diff>
--- a/Project Proposal/Team_6_Prop_Vid_Slides.pptx
+++ b/Project Proposal/Team_6_Prop_Vid_Slides.pptx
@@ -785,7 +785,7 @@
                 <a:effectLst/>
                 <a:latin typeface="-system-ui"/>
               </a:rPr>
-              <a:t>We'll compare the f-statistics of the transformations to the original logistic regression and make a decision as to whether it's an improvement.</a:t>
+              <a:t>We'll compare the adjusted R squared of the transformations to the original logistic regression and make a decision as to whether it's an improvement.</a:t>
             </a:r>
             <a:br>
               <a:rPr lang="en-US" b="0" i="0" dirty="0">
@@ -823,7 +823,7 @@
                 <a:effectLst/>
                 <a:latin typeface="-system-ui"/>
               </a:rPr>
-              <a:t>Once we have a suitable set of variables we'll run the full regression and check the f-statistic against the untransformed regression to assess whether there has been an overall improvement.</a:t>
+              <a:t>Once we have a suitable set of variables we'll run the full regression and check the R squared against the untransformed regression to assess whether there has been an overall improvement.</a:t>
             </a:r>
           </a:p>
           <a:p>

</xml_diff>